<commit_message>
Minor text tweaks in presentation
</commit_message>
<xml_diff>
--- a/project/presentation.pptx
+++ b/project/presentation.pptx
@@ -12061,7 +12061,7 @@
                 <a:effectLst/>
                 <a:latin typeface="Open Sans" panose="020B0606030504020204" pitchFamily="34" charset="0"/>
               </a:rPr>
-              <a:t>We have to reliably communicate very complex ideas to a large number of people. </a:t>
+              <a:t>We must reliably communicate very complex ideas to many people. </a:t>
             </a:r>
           </a:p>
           <a:p>
@@ -14038,7 +14038,7 @@
                 <a:effectLst/>
                 <a:latin typeface="Open Sans" panose="020B0606030504020204" pitchFamily="34" charset="0"/>
               </a:rPr>
-              <a:t>This project is 25% of your semester grade, so it is essential that you yourself enough time to complete it.</a:t>
+              <a:t>This project is 25% of your semester grade, so it is essential that you give yourself enough time to complete it.</a:t>
             </a:r>
           </a:p>
           <a:p>
@@ -15062,49 +15062,88 @@
           <a:lstStyle/>
           <a:p>
             <a:r>
-              <a:rPr lang="en-US" sz="1700" b="1" dirty="0"/>
+              <a:rPr lang="en-US" sz="1600" b="1" dirty="0">
+                <a:solidFill>
+                  <a:schemeClr val="tx1">
+                    <a:lumMod val="85000"/>
+                  </a:schemeClr>
+                </a:solidFill>
+                <a:latin typeface="Open Sans" panose="020B0606030504020204" pitchFamily="34" charset="0"/>
+                <a:ea typeface="Open Sans" panose="020B0606030504020204" pitchFamily="34" charset="0"/>
+                <a:cs typeface="Open Sans" panose="020B0606030504020204" pitchFamily="34" charset="0"/>
+              </a:rPr>
               <a:t>I will try to assist you, but I will not write your code.</a:t>
             </a:r>
           </a:p>
           <a:p>
             <a:r>
-              <a:rPr lang="en-US" sz="1600" dirty="0">
-                <a:latin typeface="Calibri" panose="020F0502020204030204" pitchFamily="34" charset="0"/>
-                <a:cs typeface="Calibri" panose="020F0502020204030204" pitchFamily="34" charset="0"/>
-              </a:rPr>
-              <a:t>Come to some or all of the project workdays at the end of the semester for help. See the Syllabus for the dates. Last minute frantic emails just before the project is due are unlikely to get a helpful response.</a:t>
-            </a:r>
-          </a:p>
-          <a:p>
-            <a:r>
-              <a:rPr lang="en-US" sz="1600" dirty="0">
-                <a:latin typeface="Calibri" panose="020F0502020204030204" pitchFamily="34" charset="0"/>
-                <a:cs typeface="Calibri" panose="020F0502020204030204" pitchFamily="34" charset="0"/>
+              <a:rPr lang="en-US" sz="1400" dirty="0">
+                <a:solidFill>
+                  <a:schemeClr val="tx1">
+                    <a:lumMod val="85000"/>
+                  </a:schemeClr>
+                </a:solidFill>
+                <a:latin typeface="Open Sans" panose="020B0606030504020204" pitchFamily="34" charset="0"/>
+                <a:ea typeface="Open Sans" panose="020B0606030504020204" pitchFamily="34" charset="0"/>
+                <a:cs typeface="Open Sans" panose="020B0606030504020204" pitchFamily="34" charset="0"/>
+              </a:rPr>
+              <a:t>Come to some or all the project workdays at the end of the semester for help. See the Syllabus for the dates. Last minute frantic emails just before the project is due are unlikely to get a helpful response.</a:t>
+            </a:r>
+          </a:p>
+          <a:p>
+            <a:r>
+              <a:rPr lang="en-US" sz="1400" dirty="0">
+                <a:solidFill>
+                  <a:schemeClr val="tx1">
+                    <a:lumMod val="85000"/>
+                  </a:schemeClr>
+                </a:solidFill>
+                <a:latin typeface="Open Sans" panose="020B0606030504020204" pitchFamily="34" charset="0"/>
+                <a:ea typeface="Open Sans" panose="020B0606030504020204" pitchFamily="34" charset="0"/>
+                <a:cs typeface="Open Sans" panose="020B0606030504020204" pitchFamily="34" charset="0"/>
               </a:rPr>
               <a:t>When you are stuck, you are welcome to ask for advice from classmates or visit the KSU computer lab to get you moving again, </a:t>
             </a:r>
             <a:r>
-              <a:rPr lang="en-US" sz="1600" i="1" dirty="0">
-                <a:latin typeface="Calibri" panose="020F0502020204030204" pitchFamily="34" charset="0"/>
-                <a:cs typeface="Calibri" panose="020F0502020204030204" pitchFamily="34" charset="0"/>
+              <a:rPr lang="en-US" sz="1400" i="1" dirty="0">
+                <a:solidFill>
+                  <a:schemeClr val="tx1">
+                    <a:lumMod val="85000"/>
+                  </a:schemeClr>
+                </a:solidFill>
+                <a:latin typeface="Open Sans" panose="020B0606030504020204" pitchFamily="34" charset="0"/>
+                <a:ea typeface="Open Sans" panose="020B0606030504020204" pitchFamily="34" charset="0"/>
+                <a:cs typeface="Open Sans" panose="020B0606030504020204" pitchFamily="34" charset="0"/>
               </a:rPr>
               <a:t>but your work must be your own.</a:t>
             </a:r>
           </a:p>
           <a:p>
             <a:r>
-              <a:rPr lang="en-US" sz="1600" dirty="0">
-                <a:latin typeface="Calibri" panose="020F0502020204030204" pitchFamily="34" charset="0"/>
-                <a:cs typeface="Calibri" panose="020F0502020204030204" pitchFamily="34" charset="0"/>
+              <a:rPr lang="en-US" sz="1400" dirty="0">
+                <a:solidFill>
+                  <a:schemeClr val="tx1">
+                    <a:lumMod val="85000"/>
+                  </a:schemeClr>
+                </a:solidFill>
+                <a:latin typeface="Open Sans" panose="020B0606030504020204" pitchFamily="34" charset="0"/>
+                <a:ea typeface="Open Sans" panose="020B0606030504020204" pitchFamily="34" charset="0"/>
+                <a:cs typeface="Open Sans" panose="020B0606030504020204" pitchFamily="34" charset="0"/>
               </a:rPr>
               <a:t>I am not a miracle worker. You need to do your best to solve your problem (or at least understand it) before asking for help.</a:t>
             </a:r>
           </a:p>
           <a:p>
             <a:r>
-              <a:rPr lang="en-US" sz="1600" dirty="0">
-                <a:latin typeface="Calibri" panose="020F0502020204030204" pitchFamily="34" charset="0"/>
-                <a:cs typeface="Calibri" panose="020F0502020204030204" pitchFamily="34" charset="0"/>
+              <a:rPr lang="en-US" sz="1400" dirty="0">
+                <a:solidFill>
+                  <a:schemeClr val="tx1">
+                    <a:lumMod val="85000"/>
+                  </a:schemeClr>
+                </a:solidFill>
+                <a:latin typeface="Open Sans" panose="020B0606030504020204" pitchFamily="34" charset="0"/>
+                <a:ea typeface="Open Sans" panose="020B0606030504020204" pitchFamily="34" charset="0"/>
+                <a:cs typeface="Open Sans" panose="020B0606030504020204" pitchFamily="34" charset="0"/>
               </a:rPr>
               <a:t>I am most proficient with C#, so consider picking that language if you anticipate needing a lot of help.</a:t>
             </a:r>
@@ -15143,39 +15182,102 @@
               <a:buNone/>
             </a:pPr>
             <a:r>
-              <a:rPr lang="en-US" sz="1600" dirty="0"/>
+              <a:rPr lang="en-US" sz="1400" dirty="0">
+                <a:solidFill>
+                  <a:schemeClr val="tx1">
+                    <a:lumMod val="85000"/>
+                  </a:schemeClr>
+                </a:solidFill>
+                <a:latin typeface="Open Sans" panose="020B0606030504020204" pitchFamily="34" charset="0"/>
+                <a:ea typeface="Open Sans" panose="020B0606030504020204" pitchFamily="34" charset="0"/>
+                <a:cs typeface="Open Sans" panose="020B0606030504020204" pitchFamily="34" charset="0"/>
+              </a:rPr>
               <a:t>When you ask me for coding assistance:</a:t>
             </a:r>
           </a:p>
           <a:p>
             <a:r>
-              <a:rPr lang="en-US" sz="1600" dirty="0"/>
+              <a:rPr lang="en-US" sz="1400" dirty="0">
+                <a:solidFill>
+                  <a:schemeClr val="tx1">
+                    <a:lumMod val="85000"/>
+                  </a:schemeClr>
+                </a:solidFill>
+                <a:latin typeface="Open Sans" panose="020B0606030504020204" pitchFamily="34" charset="0"/>
+                <a:ea typeface="Open Sans" panose="020B0606030504020204" pitchFamily="34" charset="0"/>
+                <a:cs typeface="Open Sans" panose="020B0606030504020204" pitchFamily="34" charset="0"/>
+              </a:rPr>
               <a:t>Be very specific. If you are vague, I cannot help you. ”It’s not working.” is not specific.</a:t>
             </a:r>
           </a:p>
           <a:p>
             <a:r>
-              <a:rPr lang="en-US" sz="1600" dirty="0"/>
+              <a:rPr lang="en-US" sz="1400" dirty="0">
+                <a:solidFill>
+                  <a:schemeClr val="tx1">
+                    <a:lumMod val="85000"/>
+                  </a:schemeClr>
+                </a:solidFill>
+                <a:latin typeface="Open Sans" panose="020B0606030504020204" pitchFamily="34" charset="0"/>
+                <a:ea typeface="Open Sans" panose="020B0606030504020204" pitchFamily="34" charset="0"/>
+                <a:cs typeface="Open Sans" panose="020B0606030504020204" pitchFamily="34" charset="0"/>
+              </a:rPr>
               <a:t>Always include your team’s GitHub repository URL.</a:t>
             </a:r>
           </a:p>
           <a:p>
             <a:r>
-              <a:rPr lang="en-US" sz="1600" dirty="0"/>
+              <a:rPr lang="en-US" sz="1400" dirty="0">
+                <a:solidFill>
+                  <a:schemeClr val="tx1">
+                    <a:lumMod val="85000"/>
+                  </a:schemeClr>
+                </a:solidFill>
+                <a:latin typeface="Open Sans" panose="020B0606030504020204" pitchFamily="34" charset="0"/>
+                <a:ea typeface="Open Sans" panose="020B0606030504020204" pitchFamily="34" charset="0"/>
+                <a:cs typeface="Open Sans" panose="020B0606030504020204" pitchFamily="34" charset="0"/>
+              </a:rPr>
               <a:t>Check the offending code into your GitHub repository so I can look at it and possibly run it. If your code is not in your GitHub repository, I will not attempt to compile or run it. Also consider creating a separate source branch (do some reading if that means nothing) before sharing problematic code with me to avoid breaking operational code.</a:t>
             </a:r>
           </a:p>
           <a:p>
             <a:r>
-              <a:rPr lang="en-US" sz="1600" dirty="0"/>
+              <a:rPr lang="en-US" sz="1400" dirty="0">
+                <a:solidFill>
+                  <a:schemeClr val="tx1">
+                    <a:lumMod val="85000"/>
+                  </a:schemeClr>
+                </a:solidFill>
+                <a:latin typeface="Open Sans" panose="020B0606030504020204" pitchFamily="34" charset="0"/>
+                <a:ea typeface="Open Sans" panose="020B0606030504020204" pitchFamily="34" charset="0"/>
+                <a:cs typeface="Open Sans" panose="020B0606030504020204" pitchFamily="34" charset="0"/>
+              </a:rPr>
               <a:t>To compile and run your code, your </a:t>
             </a:r>
             <a:r>
-              <a:rPr lang="en-US" sz="1600" b="1" dirty="0"/>
+              <a:rPr lang="en-US" sz="1400" b="1" dirty="0">
+                <a:solidFill>
+                  <a:schemeClr val="tx1">
+                    <a:lumMod val="85000"/>
+                  </a:schemeClr>
+                </a:solidFill>
+                <a:latin typeface="Open Sans" panose="020B0606030504020204" pitchFamily="34" charset="0"/>
+                <a:ea typeface="Open Sans" panose="020B0606030504020204" pitchFamily="34" charset="0"/>
+                <a:cs typeface="Open Sans" panose="020B0606030504020204" pitchFamily="34" charset="0"/>
+              </a:rPr>
               <a:t>README.md </a:t>
             </a:r>
             <a:r>
-              <a:rPr lang="en-US" sz="1600" dirty="0"/>
+              <a:rPr lang="en-US" sz="1400" dirty="0">
+                <a:solidFill>
+                  <a:schemeClr val="tx1">
+                    <a:lumMod val="85000"/>
+                  </a:schemeClr>
+                </a:solidFill>
+                <a:latin typeface="Open Sans" panose="020B0606030504020204" pitchFamily="34" charset="0"/>
+                <a:ea typeface="Open Sans" panose="020B0606030504020204" pitchFamily="34" charset="0"/>
+                <a:cs typeface="Open Sans" panose="020B0606030504020204" pitchFamily="34" charset="0"/>
+              </a:rPr>
               <a:t>must have the environment configuration instructions and execution steps. Keep those accurate and up-to-date.</a:t>
             </a:r>
           </a:p>
@@ -15267,28 +15369,78 @@
               <a:buAutoNum type="arabicPeriod"/>
             </a:pPr>
             <a:r>
-              <a:rPr lang="en-US" dirty="0"/>
+              <a:rPr lang="en-US" dirty="0">
+                <a:solidFill>
+                  <a:schemeClr val="tx1">
+                    <a:lumMod val="85000"/>
+                  </a:schemeClr>
+                </a:solidFill>
+                <a:latin typeface="Open Sans" panose="020B0606030504020204" pitchFamily="34" charset="0"/>
+                <a:ea typeface="Open Sans" panose="020B0606030504020204" pitchFamily="34" charset="0"/>
+                <a:cs typeface="Open Sans" panose="020B0606030504020204" pitchFamily="34" charset="0"/>
+              </a:rPr>
               <a:t>Pick your team and submit your team members and GitHub repository URL to the project spreadsheet by Thursday, February 8</a:t>
             </a:r>
             <a:r>
-              <a:rPr lang="en-US" baseline="30000" dirty="0"/>
+              <a:rPr lang="en-US" baseline="30000" dirty="0">
+                <a:solidFill>
+                  <a:schemeClr val="tx1">
+                    <a:lumMod val="85000"/>
+                  </a:schemeClr>
+                </a:solidFill>
+                <a:latin typeface="Open Sans" panose="020B0606030504020204" pitchFamily="34" charset="0"/>
+                <a:ea typeface="Open Sans" panose="020B0606030504020204" pitchFamily="34" charset="0"/>
+                <a:cs typeface="Open Sans" panose="020B0606030504020204" pitchFamily="34" charset="0"/>
+              </a:rPr>
               <a:t>th</a:t>
             </a:r>
             <a:r>
-              <a:rPr lang="en-US" dirty="0"/>
+              <a:rPr lang="en-US" dirty="0">
+                <a:solidFill>
+                  <a:schemeClr val="tx1">
+                    <a:lumMod val="85000"/>
+                  </a:schemeClr>
+                </a:solidFill>
+                <a:latin typeface="Open Sans" panose="020B0606030504020204" pitchFamily="34" charset="0"/>
+                <a:ea typeface="Open Sans" panose="020B0606030504020204" pitchFamily="34" charset="0"/>
+                <a:cs typeface="Open Sans" panose="020B0606030504020204" pitchFamily="34" charset="0"/>
+              </a:rPr>
               <a:t>.</a:t>
             </a:r>
             <a:br>
-              <a:rPr lang="en-US" dirty="0"/>
+              <a:rPr lang="en-US" dirty="0">
+                <a:solidFill>
+                  <a:schemeClr val="tx1">
+                    <a:lumMod val="85000"/>
+                  </a:schemeClr>
+                </a:solidFill>
+                <a:latin typeface="Open Sans" panose="020B0606030504020204" pitchFamily="34" charset="0"/>
+                <a:ea typeface="Open Sans" panose="020B0606030504020204" pitchFamily="34" charset="0"/>
+                <a:cs typeface="Open Sans" panose="020B0606030504020204" pitchFamily="34" charset="0"/>
+              </a:rPr>
             </a:br>
             <a:br>
-              <a:rPr lang="en-US" sz="1400" dirty="0"/>
+              <a:rPr lang="en-US" sz="1400" dirty="0">
+                <a:solidFill>
+                  <a:schemeClr val="tx1">
+                    <a:lumMod val="85000"/>
+                  </a:schemeClr>
+                </a:solidFill>
+                <a:latin typeface="Open Sans" panose="020B0606030504020204" pitchFamily="34" charset="0"/>
+                <a:ea typeface="Open Sans" panose="020B0606030504020204" pitchFamily="34" charset="0"/>
+                <a:cs typeface="Open Sans" panose="020B0606030504020204" pitchFamily="34" charset="0"/>
+              </a:rPr>
             </a:br>
             <a:r>
               <a:rPr lang="en-US" sz="1400" dirty="0">
                 <a:solidFill>
-                  <a:srgbClr val="FFFF00"/>
-                </a:solidFill>
+                  <a:schemeClr val="tx1">
+                    <a:lumMod val="85000"/>
+                  </a:schemeClr>
+                </a:solidFill>
+                <a:latin typeface="Open Sans" panose="020B0606030504020204" pitchFamily="34" charset="0"/>
+                <a:ea typeface="Open Sans" panose="020B0606030504020204" pitchFamily="34" charset="0"/>
+                <a:cs typeface="Open Sans" panose="020B0606030504020204" pitchFamily="34" charset="0"/>
                 <a:hlinkClick r:id="rId2">
                   <a:extLst>
                     <a:ext uri="{A12FA001-AC4F-418D-AE19-62706E023703}">
@@ -15302,19 +15454,51 @@
             <a:r>
               <a:rPr lang="en-US" sz="1400" dirty="0">
                 <a:solidFill>
-                  <a:srgbClr val="FFFF00"/>
-                </a:solidFill>
+                  <a:schemeClr val="tx1">
+                    <a:lumMod val="85000"/>
+                  </a:schemeClr>
+                </a:solidFill>
+                <a:latin typeface="Open Sans" panose="020B0606030504020204" pitchFamily="34" charset="0"/>
+                <a:ea typeface="Open Sans" panose="020B0606030504020204" pitchFamily="34" charset="0"/>
+                <a:cs typeface="Open Sans" panose="020B0606030504020204" pitchFamily="34" charset="0"/>
               </a:rPr>
               <a:t> </a:t>
             </a:r>
             <a:br>
-              <a:rPr lang="en-US" dirty="0"/>
+              <a:rPr lang="en-US" dirty="0">
+                <a:solidFill>
+                  <a:schemeClr val="tx1">
+                    <a:lumMod val="85000"/>
+                  </a:schemeClr>
+                </a:solidFill>
+                <a:latin typeface="Open Sans" panose="020B0606030504020204" pitchFamily="34" charset="0"/>
+                <a:ea typeface="Open Sans" panose="020B0606030504020204" pitchFamily="34" charset="0"/>
+                <a:cs typeface="Open Sans" panose="020B0606030504020204" pitchFamily="34" charset="0"/>
+              </a:rPr>
             </a:br>
             <a:br>
-              <a:rPr lang="en-US" dirty="0"/>
+              <a:rPr lang="en-US" dirty="0">
+                <a:solidFill>
+                  <a:schemeClr val="tx1">
+                    <a:lumMod val="85000"/>
+                  </a:schemeClr>
+                </a:solidFill>
+                <a:latin typeface="Open Sans" panose="020B0606030504020204" pitchFamily="34" charset="0"/>
+                <a:ea typeface="Open Sans" panose="020B0606030504020204" pitchFamily="34" charset="0"/>
+                <a:cs typeface="Open Sans" panose="020B0606030504020204" pitchFamily="34" charset="0"/>
+              </a:rPr>
             </a:br>
             <a:r>
-              <a:rPr lang="en-US" sz="1200" i="1" dirty="0"/>
+              <a:rPr lang="en-US" sz="1200" i="1" dirty="0">
+                <a:solidFill>
+                  <a:schemeClr val="tx1">
+                    <a:lumMod val="85000"/>
+                  </a:schemeClr>
+                </a:solidFill>
+                <a:latin typeface="Open Sans" panose="020B0606030504020204" pitchFamily="34" charset="0"/>
+                <a:ea typeface="Open Sans" panose="020B0606030504020204" pitchFamily="34" charset="0"/>
+                <a:cs typeface="Open Sans" panose="020B0606030504020204" pitchFamily="34" charset="0"/>
+              </a:rPr>
               <a:t>* This is your first project grade. Do not miss this date.</a:t>
             </a:r>
           </a:p>
@@ -15324,28 +15508,78 @@
               <a:buAutoNum type="arabicPeriod"/>
             </a:pPr>
             <a:r>
-              <a:rPr lang="en-US" dirty="0"/>
+              <a:rPr lang="en-US" dirty="0">
+                <a:solidFill>
+                  <a:schemeClr val="tx1">
+                    <a:lumMod val="85000"/>
+                  </a:schemeClr>
+                </a:solidFill>
+                <a:latin typeface="Open Sans" panose="020B0606030504020204" pitchFamily="34" charset="0"/>
+                <a:ea typeface="Open Sans" panose="020B0606030504020204" pitchFamily="34" charset="0"/>
+                <a:cs typeface="Open Sans" panose="020B0606030504020204" pitchFamily="34" charset="0"/>
+              </a:rPr>
               <a:t>Read the </a:t>
             </a:r>
             <a:r>
-              <a:rPr lang="en-US" b="1" dirty="0"/>
+              <a:rPr lang="en-US" b="1" dirty="0">
+                <a:solidFill>
+                  <a:schemeClr val="tx1">
+                    <a:lumMod val="85000"/>
+                  </a:schemeClr>
+                </a:solidFill>
+                <a:latin typeface="Open Sans" panose="020B0606030504020204" pitchFamily="34" charset="0"/>
+                <a:ea typeface="Open Sans" panose="020B0606030504020204" pitchFamily="34" charset="0"/>
+                <a:cs typeface="Open Sans" panose="020B0606030504020204" pitchFamily="34" charset="0"/>
+              </a:rPr>
               <a:t>Project Documentation </a:t>
             </a:r>
             <a:r>
-              <a:rPr lang="en-US" dirty="0"/>
+              <a:rPr lang="en-US" dirty="0">
+                <a:solidFill>
+                  <a:schemeClr val="tx1">
+                    <a:lumMod val="85000"/>
+                  </a:schemeClr>
+                </a:solidFill>
+                <a:latin typeface="Open Sans" panose="020B0606030504020204" pitchFamily="34" charset="0"/>
+                <a:ea typeface="Open Sans" panose="020B0606030504020204" pitchFamily="34" charset="0"/>
+                <a:cs typeface="Open Sans" panose="020B0606030504020204" pitchFamily="34" charset="0"/>
+              </a:rPr>
               <a:t>thoroughly.</a:t>
             </a:r>
             <a:br>
-              <a:rPr lang="en-US" dirty="0"/>
+              <a:rPr lang="en-US" dirty="0">
+                <a:solidFill>
+                  <a:schemeClr val="tx1">
+                    <a:lumMod val="85000"/>
+                  </a:schemeClr>
+                </a:solidFill>
+                <a:latin typeface="Open Sans" panose="020B0606030504020204" pitchFamily="34" charset="0"/>
+                <a:ea typeface="Open Sans" panose="020B0606030504020204" pitchFamily="34" charset="0"/>
+                <a:cs typeface="Open Sans" panose="020B0606030504020204" pitchFamily="34" charset="0"/>
+              </a:rPr>
             </a:br>
             <a:br>
-              <a:rPr lang="en-US" sz="900" dirty="0"/>
+              <a:rPr lang="en-US" sz="900" dirty="0">
+                <a:solidFill>
+                  <a:schemeClr val="tx1">
+                    <a:lumMod val="85000"/>
+                  </a:schemeClr>
+                </a:solidFill>
+                <a:latin typeface="Open Sans" panose="020B0606030504020204" pitchFamily="34" charset="0"/>
+                <a:ea typeface="Open Sans" panose="020B0606030504020204" pitchFamily="34" charset="0"/>
+                <a:cs typeface="Open Sans" panose="020B0606030504020204" pitchFamily="34" charset="0"/>
+              </a:rPr>
             </a:br>
             <a:r>
               <a:rPr lang="en-US" sz="1400" dirty="0">
                 <a:solidFill>
-                  <a:srgbClr val="FFFF00"/>
-                </a:solidFill>
+                  <a:schemeClr val="tx1">
+                    <a:lumMod val="85000"/>
+                  </a:schemeClr>
+                </a:solidFill>
+                <a:latin typeface="Open Sans" panose="020B0606030504020204" pitchFamily="34" charset="0"/>
+                <a:ea typeface="Open Sans" panose="020B0606030504020204" pitchFamily="34" charset="0"/>
+                <a:cs typeface="Open Sans" panose="020B0606030504020204" pitchFamily="34" charset="0"/>
                 <a:hlinkClick r:id="rId3">
                   <a:extLst>
                     <a:ext uri="{A12FA001-AC4F-418D-AE19-62706E023703}">
@@ -15356,7 +15590,16 @@
               </a:rPr>
               <a:t>https://github.com/jeff-adkisson/swe-3643-spring-2024/blob/master/project/README.md</a:t>
             </a:r>
-            <a:endParaRPr lang="en-US" sz="1400" dirty="0"/>
+            <a:endParaRPr lang="en-US" sz="1400" dirty="0">
+              <a:solidFill>
+                <a:schemeClr val="tx1">
+                  <a:lumMod val="85000"/>
+                </a:schemeClr>
+              </a:solidFill>
+              <a:latin typeface="Open Sans" panose="020B0606030504020204" pitchFamily="34" charset="0"/>
+              <a:ea typeface="Open Sans" panose="020B0606030504020204" pitchFamily="34" charset="0"/>
+              <a:cs typeface="Open Sans" panose="020B0606030504020204" pitchFamily="34" charset="0"/>
+            </a:endParaRPr>
           </a:p>
           <a:p>
             <a:pPr marL="342900" indent="-342900">
@@ -15364,20 +15607,52 @@
               <a:buAutoNum type="arabicPeriod"/>
             </a:pPr>
             <a:r>
-              <a:rPr lang="en-US" dirty="0"/>
+              <a:rPr lang="en-US" dirty="0">
+                <a:solidFill>
+                  <a:schemeClr val="tx1">
+                    <a:lumMod val="85000"/>
+                  </a:schemeClr>
+                </a:solidFill>
+                <a:latin typeface="Open Sans" panose="020B0606030504020204" pitchFamily="34" charset="0"/>
+                <a:ea typeface="Open Sans" panose="020B0606030504020204" pitchFamily="34" charset="0"/>
+                <a:cs typeface="Open Sans" panose="020B0606030504020204" pitchFamily="34" charset="0"/>
+              </a:rPr>
               <a:t>Do some research, then pick a language and web server framework from the available choices.</a:t>
             </a:r>
             <a:br>
-              <a:rPr lang="en-US" dirty="0"/>
+              <a:rPr lang="en-US" dirty="0">
+                <a:solidFill>
+                  <a:schemeClr val="tx1">
+                    <a:lumMod val="85000"/>
+                  </a:schemeClr>
+                </a:solidFill>
+                <a:latin typeface="Open Sans" panose="020B0606030504020204" pitchFamily="34" charset="0"/>
+                <a:ea typeface="Open Sans" panose="020B0606030504020204" pitchFamily="34" charset="0"/>
+                <a:cs typeface="Open Sans" panose="020B0606030504020204" pitchFamily="34" charset="0"/>
+              </a:rPr>
             </a:br>
             <a:br>
-              <a:rPr lang="en-US" sz="900" dirty="0"/>
+              <a:rPr lang="en-US" sz="900" dirty="0">
+                <a:solidFill>
+                  <a:schemeClr val="tx1">
+                    <a:lumMod val="85000"/>
+                  </a:schemeClr>
+                </a:solidFill>
+                <a:latin typeface="Open Sans" panose="020B0606030504020204" pitchFamily="34" charset="0"/>
+                <a:ea typeface="Open Sans" panose="020B0606030504020204" pitchFamily="34" charset="0"/>
+                <a:cs typeface="Open Sans" panose="020B0606030504020204" pitchFamily="34" charset="0"/>
+              </a:rPr>
             </a:br>
             <a:r>
               <a:rPr lang="en-US" sz="1400" dirty="0">
                 <a:solidFill>
-                  <a:srgbClr val="FFFF00"/>
-                </a:solidFill>
+                  <a:schemeClr val="tx1">
+                    <a:lumMod val="85000"/>
+                  </a:schemeClr>
+                </a:solidFill>
+                <a:latin typeface="Open Sans" panose="020B0606030504020204" pitchFamily="34" charset="0"/>
+                <a:ea typeface="Open Sans" panose="020B0606030504020204" pitchFamily="34" charset="0"/>
+                <a:cs typeface="Open Sans" panose="020B0606030504020204" pitchFamily="34" charset="0"/>
                 <a:hlinkClick r:id="rId4">
                   <a:extLst>
                     <a:ext uri="{A12FA001-AC4F-418D-AE19-62706E023703}">
@@ -15391,22 +15666,41 @@
             <a:r>
               <a:rPr lang="en-US" sz="1400" dirty="0">
                 <a:solidFill>
-                  <a:srgbClr val="FFFF00"/>
-                </a:solidFill>
+                  <a:schemeClr val="tx1">
+                    <a:lumMod val="85000"/>
+                  </a:schemeClr>
+                </a:solidFill>
+                <a:latin typeface="Open Sans" panose="020B0606030504020204" pitchFamily="34" charset="0"/>
+                <a:ea typeface="Open Sans" panose="020B0606030504020204" pitchFamily="34" charset="0"/>
+                <a:cs typeface="Open Sans" panose="020B0606030504020204" pitchFamily="34" charset="0"/>
               </a:rPr>
               <a:t> </a:t>
             </a:r>
             <a:endParaRPr lang="en-US" sz="1400" i="1" dirty="0">
               <a:solidFill>
-                <a:srgbClr val="FFFF00"/>
+                <a:schemeClr val="tx1">
+                  <a:lumMod val="85000"/>
+                </a:schemeClr>
               </a:solidFill>
+              <a:latin typeface="Open Sans" panose="020B0606030504020204" pitchFamily="34" charset="0"/>
+              <a:ea typeface="Open Sans" panose="020B0606030504020204" pitchFamily="34" charset="0"/>
+              <a:cs typeface="Open Sans" panose="020B0606030504020204" pitchFamily="34" charset="0"/>
             </a:endParaRPr>
           </a:p>
           <a:p>
             <a:pPr marL="0" indent="0">
               <a:buNone/>
             </a:pPr>
-            <a:endParaRPr lang="en-US" dirty="0"/>
+            <a:endParaRPr lang="en-US" dirty="0">
+              <a:solidFill>
+                <a:schemeClr val="tx1">
+                  <a:lumMod val="85000"/>
+                </a:schemeClr>
+              </a:solidFill>
+              <a:latin typeface="Open Sans" panose="020B0606030504020204" pitchFamily="34" charset="0"/>
+              <a:ea typeface="Open Sans" panose="020B0606030504020204" pitchFamily="34" charset="0"/>
+              <a:cs typeface="Open Sans" panose="020B0606030504020204" pitchFamily="34" charset="0"/>
+            </a:endParaRPr>
           </a:p>
         </p:txBody>
       </p:sp>
@@ -15438,12 +15732,17 @@
               <a:buAutoNum type="arabicPeriod" startAt="4"/>
             </a:pPr>
             <a:r>
-              <a:rPr lang="en-US"/>
-              <a:t>Start coding. </a:t>
-            </a:r>
-            <a:r>
-              <a:rPr lang="en-US" dirty="0"/>
-              <a:t>Ask questions at every lecture.</a:t>
+              <a:rPr lang="en-US" dirty="0">
+                <a:solidFill>
+                  <a:schemeClr val="tx1">
+                    <a:lumMod val="85000"/>
+                  </a:schemeClr>
+                </a:solidFill>
+                <a:latin typeface="Open Sans" panose="020B0606030504020204" pitchFamily="34" charset="0"/>
+                <a:ea typeface="Open Sans" panose="020B0606030504020204" pitchFamily="34" charset="0"/>
+                <a:cs typeface="Open Sans" panose="020B0606030504020204" pitchFamily="34" charset="0"/>
+              </a:rPr>
+              <a:t>Start coding. Ask questions at every lecture.</a:t>
             </a:r>
           </a:p>
           <a:p>
@@ -15453,12 +15752,29 @@
             </a:pPr>
             <a:r>
               <a:rPr lang="en-US" i="0" u="none" strike="noStrike" dirty="0">
+                <a:solidFill>
+                  <a:schemeClr val="tx1">
+                    <a:lumMod val="85000"/>
+                  </a:schemeClr>
+                </a:solidFill>
                 <a:effectLst/>
+                <a:latin typeface="Open Sans" panose="020B0606030504020204" pitchFamily="34" charset="0"/>
+                <a:ea typeface="Open Sans" panose="020B0606030504020204" pitchFamily="34" charset="0"/>
+                <a:cs typeface="Open Sans" panose="020B0606030504020204" pitchFamily="34" charset="0"/>
               </a:rPr>
               <a:t>Submit your </a:t>
             </a:r>
             <a:r>
-              <a:rPr lang="en-US" dirty="0"/>
+              <a:rPr lang="en-US" dirty="0">
+                <a:solidFill>
+                  <a:schemeClr val="tx1">
+                    <a:lumMod val="85000"/>
+                  </a:schemeClr>
+                </a:solidFill>
+                <a:latin typeface="Open Sans" panose="020B0606030504020204" pitchFamily="34" charset="0"/>
+                <a:ea typeface="Open Sans" panose="020B0606030504020204" pitchFamily="34" charset="0"/>
+                <a:cs typeface="Open Sans" panose="020B0606030504020204" pitchFamily="34" charset="0"/>
+              </a:rPr>
               <a:t>Progress Reports via D2L.</a:t>
             </a:r>
           </a:p>
@@ -15466,23 +15782,55 @@
             <a:pPr lvl="1"/>
             <a:r>
               <a:rPr lang="en-US" i="0" u="none" strike="noStrike" dirty="0">
+                <a:solidFill>
+                  <a:schemeClr val="tx1">
+                    <a:lumMod val="85000"/>
+                  </a:schemeClr>
+                </a:solidFill>
                 <a:effectLst/>
+                <a:latin typeface="Open Sans" panose="020B0606030504020204" pitchFamily="34" charset="0"/>
+                <a:ea typeface="Open Sans" panose="020B0606030504020204" pitchFamily="34" charset="0"/>
+                <a:cs typeface="Open Sans" panose="020B0606030504020204" pitchFamily="34" charset="0"/>
               </a:rPr>
               <a:t>Progress Report 1 - Monday 3/18 </a:t>
             </a:r>
             <a:br>
               <a:rPr lang="en-US" i="0" u="none" strike="noStrike" dirty="0">
+                <a:solidFill>
+                  <a:schemeClr val="tx1">
+                    <a:lumMod val="85000"/>
+                  </a:schemeClr>
+                </a:solidFill>
                 <a:effectLst/>
+                <a:latin typeface="Open Sans" panose="020B0606030504020204" pitchFamily="34" charset="0"/>
+                <a:ea typeface="Open Sans" panose="020B0606030504020204" pitchFamily="34" charset="0"/>
+                <a:cs typeface="Open Sans" panose="020B0606030504020204" pitchFamily="34" charset="0"/>
               </a:rPr>
             </a:br>
             <a:br>
               <a:rPr lang="en-US" sz="500" i="0" u="none" strike="noStrike" dirty="0">
+                <a:solidFill>
+                  <a:schemeClr val="tx1">
+                    <a:lumMod val="85000"/>
+                  </a:schemeClr>
+                </a:solidFill>
                 <a:effectLst/>
+                <a:latin typeface="Open Sans" panose="020B0606030504020204" pitchFamily="34" charset="0"/>
+                <a:ea typeface="Open Sans" panose="020B0606030504020204" pitchFamily="34" charset="0"/>
+                <a:cs typeface="Open Sans" panose="020B0606030504020204" pitchFamily="34" charset="0"/>
               </a:rPr>
             </a:br>
             <a:r>
               <a:rPr lang="en-US" sz="900" i="1" u="none" strike="noStrike" dirty="0">
+                <a:solidFill>
+                  <a:schemeClr val="tx1">
+                    <a:lumMod val="85000"/>
+                  </a:schemeClr>
+                </a:solidFill>
                 <a:effectLst/>
+                <a:latin typeface="Open Sans" panose="020B0606030504020204" pitchFamily="34" charset="0"/>
+                <a:ea typeface="Open Sans" panose="020B0606030504020204" pitchFamily="34" charset="0"/>
+                <a:cs typeface="Open Sans" panose="020B0606030504020204" pitchFamily="34" charset="0"/>
               </a:rPr>
               <a:t>I recommend having your web application fully operational by this point.</a:t>
             </a:r>
@@ -15491,23 +15839,55 @@
             <a:pPr lvl="1"/>
             <a:r>
               <a:rPr lang="en-US" i="0" u="none" strike="noStrike" dirty="0">
+                <a:solidFill>
+                  <a:schemeClr val="tx1">
+                    <a:lumMod val="85000"/>
+                  </a:schemeClr>
+                </a:solidFill>
                 <a:effectLst/>
+                <a:latin typeface="Open Sans" panose="020B0606030504020204" pitchFamily="34" charset="0"/>
+                <a:ea typeface="Open Sans" panose="020B0606030504020204" pitchFamily="34" charset="0"/>
+                <a:cs typeface="Open Sans" panose="020B0606030504020204" pitchFamily="34" charset="0"/>
               </a:rPr>
               <a:t>Progress Report 2 - Monday 4/15 </a:t>
             </a:r>
             <a:br>
               <a:rPr lang="en-US" i="0" u="none" strike="noStrike" dirty="0">
+                <a:solidFill>
+                  <a:schemeClr val="tx1">
+                    <a:lumMod val="85000"/>
+                  </a:schemeClr>
+                </a:solidFill>
                 <a:effectLst/>
+                <a:latin typeface="Open Sans" panose="020B0606030504020204" pitchFamily="34" charset="0"/>
+                <a:ea typeface="Open Sans" panose="020B0606030504020204" pitchFamily="34" charset="0"/>
+                <a:cs typeface="Open Sans" panose="020B0606030504020204" pitchFamily="34" charset="0"/>
               </a:rPr>
             </a:br>
             <a:br>
               <a:rPr lang="en-US" sz="600" i="0" u="none" strike="noStrike" dirty="0">
+                <a:solidFill>
+                  <a:schemeClr val="tx1">
+                    <a:lumMod val="85000"/>
+                  </a:schemeClr>
+                </a:solidFill>
                 <a:effectLst/>
+                <a:latin typeface="Open Sans" panose="020B0606030504020204" pitchFamily="34" charset="0"/>
+                <a:ea typeface="Open Sans" panose="020B0606030504020204" pitchFamily="34" charset="0"/>
+                <a:cs typeface="Open Sans" panose="020B0606030504020204" pitchFamily="34" charset="0"/>
               </a:rPr>
             </a:br>
             <a:r>
               <a:rPr lang="en-US" sz="900" i="1" u="none" strike="noStrike" dirty="0">
+                <a:solidFill>
+                  <a:schemeClr val="tx1">
+                    <a:lumMod val="85000"/>
+                  </a:schemeClr>
+                </a:solidFill>
                 <a:effectLst/>
+                <a:latin typeface="Open Sans" panose="020B0606030504020204" pitchFamily="34" charset="0"/>
+                <a:ea typeface="Open Sans" panose="020B0606030504020204" pitchFamily="34" charset="0"/>
+                <a:cs typeface="Open Sans" panose="020B0606030504020204" pitchFamily="34" charset="0"/>
               </a:rPr>
               <a:t>I recommend having 100% unit test coverage by this point.</a:t>
             </a:r>
@@ -15518,17 +15898,53 @@
               <a:buAutoNum type="arabicPeriod" startAt="4"/>
             </a:pPr>
             <a:r>
-              <a:rPr lang="en-US" dirty="0"/>
+              <a:rPr lang="en-US" dirty="0">
+                <a:solidFill>
+                  <a:schemeClr val="tx1">
+                    <a:lumMod val="85000"/>
+                  </a:schemeClr>
+                </a:solidFill>
+                <a:latin typeface="Open Sans" panose="020B0606030504020204" pitchFamily="34" charset="0"/>
+                <a:ea typeface="Open Sans" panose="020B0606030504020204" pitchFamily="34" charset="0"/>
+                <a:cs typeface="Open Sans" panose="020B0606030504020204" pitchFamily="34" charset="0"/>
+              </a:rPr>
               <a:t>Come to some or all the project workdays at the end of the semester (see Syllabus for dates) if you need help.</a:t>
             </a:r>
             <a:br>
-              <a:rPr lang="en-US" dirty="0"/>
+              <a:rPr lang="en-US" dirty="0">
+                <a:solidFill>
+                  <a:schemeClr val="tx1">
+                    <a:lumMod val="85000"/>
+                  </a:schemeClr>
+                </a:solidFill>
+                <a:latin typeface="Open Sans" panose="020B0606030504020204" pitchFamily="34" charset="0"/>
+                <a:ea typeface="Open Sans" panose="020B0606030504020204" pitchFamily="34" charset="0"/>
+                <a:cs typeface="Open Sans" panose="020B0606030504020204" pitchFamily="34" charset="0"/>
+              </a:rPr>
             </a:br>
             <a:br>
-              <a:rPr lang="en-US" sz="900" dirty="0"/>
+              <a:rPr lang="en-US" sz="900" dirty="0">
+                <a:solidFill>
+                  <a:schemeClr val="tx1">
+                    <a:lumMod val="85000"/>
+                  </a:schemeClr>
+                </a:solidFill>
+                <a:latin typeface="Open Sans" panose="020B0606030504020204" pitchFamily="34" charset="0"/>
+                <a:ea typeface="Open Sans" panose="020B0606030504020204" pitchFamily="34" charset="0"/>
+                <a:cs typeface="Open Sans" panose="020B0606030504020204" pitchFamily="34" charset="0"/>
+              </a:rPr>
             </a:br>
             <a:r>
-              <a:rPr lang="en-US" sz="900" i="1" dirty="0"/>
+              <a:rPr lang="en-US" sz="900" i="1" dirty="0">
+                <a:solidFill>
+                  <a:schemeClr val="tx1">
+                    <a:lumMod val="85000"/>
+                  </a:schemeClr>
+                </a:solidFill>
+                <a:latin typeface="Open Sans" panose="020B0606030504020204" pitchFamily="34" charset="0"/>
+                <a:ea typeface="Open Sans" panose="020B0606030504020204" pitchFamily="34" charset="0"/>
+                <a:cs typeface="Open Sans" panose="020B0606030504020204" pitchFamily="34" charset="0"/>
+              </a:rPr>
               <a:t>If you show up with nothing done on these dates, there is not much I can do to help you.</a:t>
             </a:r>
           </a:p>
@@ -15538,11 +15954,28 @@
               <a:buAutoNum type="arabicPeriod" startAt="4"/>
             </a:pPr>
             <a:r>
-              <a:rPr lang="en-US" dirty="0"/>
+              <a:rPr lang="en-US" dirty="0">
+                <a:solidFill>
+                  <a:schemeClr val="tx1">
+                    <a:lumMod val="85000"/>
+                  </a:schemeClr>
+                </a:solidFill>
+                <a:latin typeface="Open Sans" panose="020B0606030504020204" pitchFamily="34" charset="0"/>
+                <a:ea typeface="Open Sans" panose="020B0606030504020204" pitchFamily="34" charset="0"/>
+                <a:cs typeface="Open Sans" panose="020B0606030504020204" pitchFamily="34" charset="0"/>
+              </a:rPr>
               <a:t>Check-in your completed project to your team GitHub repo by Friday 4/26 at 11:59 PM. All repos will be cloned by the instructor at midnight.</a:t>
             </a:r>
             <a:endParaRPr lang="en-US" b="0" u="none" strike="noStrike" dirty="0">
+              <a:solidFill>
+                <a:schemeClr val="tx1">
+                  <a:lumMod val="85000"/>
+                </a:schemeClr>
+              </a:solidFill>
               <a:effectLst/>
+              <a:latin typeface="Open Sans" panose="020B0606030504020204" pitchFamily="34" charset="0"/>
+              <a:ea typeface="Open Sans" panose="020B0606030504020204" pitchFamily="34" charset="0"/>
+              <a:cs typeface="Open Sans" panose="020B0606030504020204" pitchFamily="34" charset="0"/>
             </a:endParaRPr>
           </a:p>
           <a:p>
@@ -15550,7 +15983,16 @@
               <a:buFont typeface="+mj-lt"/>
               <a:buAutoNum type="arabicPeriod" startAt="4"/>
             </a:pPr>
-            <a:endParaRPr lang="en-US" dirty="0"/>
+            <a:endParaRPr lang="en-US" dirty="0">
+              <a:solidFill>
+                <a:schemeClr val="tx1">
+                  <a:lumMod val="85000"/>
+                </a:schemeClr>
+              </a:solidFill>
+              <a:latin typeface="Open Sans" panose="020B0606030504020204" pitchFamily="34" charset="0"/>
+              <a:ea typeface="Open Sans" panose="020B0606030504020204" pitchFamily="34" charset="0"/>
+              <a:cs typeface="Open Sans" panose="020B0606030504020204" pitchFamily="34" charset="0"/>
+            </a:endParaRPr>
           </a:p>
         </p:txBody>
       </p:sp>

</xml_diff>

<commit_message>
Final version of intro material
</commit_message>
<xml_diff>
--- a/project/presentation.pptx
+++ b/project/presentation.pptx
@@ -13,27 +13,28 @@
     <p:sldId id="264" r:id="rId7"/>
     <p:sldId id="265" r:id="rId8"/>
     <p:sldId id="266" r:id="rId9"/>
-    <p:sldId id="268" r:id="rId10"/>
-    <p:sldId id="269" r:id="rId11"/>
-    <p:sldId id="283" r:id="rId12"/>
-    <p:sldId id="270" r:id="rId13"/>
-    <p:sldId id="259" r:id="rId14"/>
-    <p:sldId id="271" r:id="rId15"/>
-    <p:sldId id="272" r:id="rId16"/>
-    <p:sldId id="273" r:id="rId17"/>
-    <p:sldId id="274" r:id="rId18"/>
-    <p:sldId id="275" r:id="rId19"/>
-    <p:sldId id="276" r:id="rId20"/>
-    <p:sldId id="277" r:id="rId21"/>
-    <p:sldId id="278" r:id="rId22"/>
-    <p:sldId id="279" r:id="rId23"/>
-    <p:sldId id="280" r:id="rId24"/>
-    <p:sldId id="281" r:id="rId25"/>
-    <p:sldId id="282" r:id="rId26"/>
-    <p:sldId id="284" r:id="rId27"/>
-    <p:sldId id="285" r:id="rId28"/>
-    <p:sldId id="287" r:id="rId29"/>
-    <p:sldId id="286" r:id="rId30"/>
+    <p:sldId id="288" r:id="rId10"/>
+    <p:sldId id="268" r:id="rId11"/>
+    <p:sldId id="269" r:id="rId12"/>
+    <p:sldId id="283" r:id="rId13"/>
+    <p:sldId id="270" r:id="rId14"/>
+    <p:sldId id="259" r:id="rId15"/>
+    <p:sldId id="271" r:id="rId16"/>
+    <p:sldId id="272" r:id="rId17"/>
+    <p:sldId id="273" r:id="rId18"/>
+    <p:sldId id="274" r:id="rId19"/>
+    <p:sldId id="275" r:id="rId20"/>
+    <p:sldId id="276" r:id="rId21"/>
+    <p:sldId id="277" r:id="rId22"/>
+    <p:sldId id="278" r:id="rId23"/>
+    <p:sldId id="279" r:id="rId24"/>
+    <p:sldId id="280" r:id="rId25"/>
+    <p:sldId id="281" r:id="rId26"/>
+    <p:sldId id="282" r:id="rId27"/>
+    <p:sldId id="284" r:id="rId28"/>
+    <p:sldId id="285" r:id="rId29"/>
+    <p:sldId id="287" r:id="rId30"/>
+    <p:sldId id="286" r:id="rId31"/>
   </p:sldIdLst>
   <p:sldSz cx="12192000" cy="6858000"/>
   <p:notesSz cx="6858000" cy="9144000"/>
@@ -132,6 +133,11 @@
       </a:defRPr>
     </a:lvl9pPr>
   </p:defaultTextStyle>
+  <p:extLst>
+    <p:ext uri="{EFAFB233-063F-42B5-8137-9DF3F51BA10A}">
+      <p15:sldGuideLst xmlns:p15="http://schemas.microsoft.com/office/powerpoint/2012/main"/>
+    </p:ext>
+  </p:extLst>
 </p:presentation>
 </file>
 
@@ -364,7 +370,7 @@
           <a:p>
             <a:fld id="{BBF693B9-5486-E049-A11D-2335760C7CD9}" type="datetimeFigureOut">
               <a:rPr lang="en-US" smtClean="0"/>
-              <a:t>1/30/24</a:t>
+              <a:t>1/31/24</a:t>
             </a:fld>
             <a:endParaRPr lang="en-US" dirty="0"/>
           </a:p>
@@ -697,7 +703,7 @@
           <a:p>
             <a:fld id="{BBF693B9-5486-E049-A11D-2335760C7CD9}" type="datetimeFigureOut">
               <a:rPr lang="en-US" smtClean="0"/>
-              <a:t>1/30/24</a:t>
+              <a:t>1/31/24</a:t>
             </a:fld>
             <a:endParaRPr lang="en-US" dirty="0"/>
           </a:p>
@@ -975,7 +981,7 @@
           <a:p>
             <a:fld id="{BBF693B9-5486-E049-A11D-2335760C7CD9}" type="datetimeFigureOut">
               <a:rPr lang="en-US" smtClean="0"/>
-              <a:t>1/30/24</a:t>
+              <a:t>1/31/24</a:t>
             </a:fld>
             <a:endParaRPr lang="en-US" dirty="0"/>
           </a:p>
@@ -1543,7 +1549,7 @@
           <a:p>
             <a:fld id="{BBF693B9-5486-E049-A11D-2335760C7CD9}" type="datetimeFigureOut">
               <a:rPr lang="en-US" smtClean="0"/>
-              <a:t>1/30/24</a:t>
+              <a:t>1/31/24</a:t>
             </a:fld>
             <a:endParaRPr lang="en-US" dirty="0"/>
           </a:p>
@@ -1821,7 +1827,7 @@
           <a:p>
             <a:fld id="{BBF693B9-5486-E049-A11D-2335760C7CD9}" type="datetimeFigureOut">
               <a:rPr lang="en-US" smtClean="0"/>
-              <a:t>1/30/24</a:t>
+              <a:t>1/31/24</a:t>
             </a:fld>
             <a:endParaRPr lang="en-US" dirty="0"/>
           </a:p>
@@ -2383,7 +2389,7 @@
           <a:p>
             <a:fld id="{BBF693B9-5486-E049-A11D-2335760C7CD9}" type="datetimeFigureOut">
               <a:rPr lang="en-US" smtClean="0"/>
-              <a:t>1/30/24</a:t>
+              <a:t>1/31/24</a:t>
             </a:fld>
             <a:endParaRPr lang="en-US" dirty="0"/>
           </a:p>
@@ -2710,7 +2716,7 @@
           <a:p>
             <a:fld id="{BBF693B9-5486-E049-A11D-2335760C7CD9}" type="datetimeFigureOut">
               <a:rPr lang="en-US" smtClean="0"/>
-              <a:t>1/30/24</a:t>
+              <a:t>1/31/24</a:t>
             </a:fld>
             <a:endParaRPr lang="en-US" dirty="0"/>
           </a:p>
@@ -2887,7 +2893,7 @@
           <a:p>
             <a:fld id="{BBF693B9-5486-E049-A11D-2335760C7CD9}" type="datetimeFigureOut">
               <a:rPr lang="en-US" smtClean="0"/>
-              <a:t>1/30/24</a:t>
+              <a:t>1/31/24</a:t>
             </a:fld>
             <a:endParaRPr lang="en-US" dirty="0"/>
           </a:p>
@@ -3125,7 +3131,7 @@
           <a:p>
             <a:fld id="{BBF693B9-5486-E049-A11D-2335760C7CD9}" type="datetimeFigureOut">
               <a:rPr lang="en-US" smtClean="0"/>
-              <a:t>1/30/24</a:t>
+              <a:t>1/31/24</a:t>
             </a:fld>
             <a:endParaRPr lang="en-US" dirty="0"/>
           </a:p>
@@ -3325,7 +3331,7 @@
           <a:p>
             <a:fld id="{BBF693B9-5486-E049-A11D-2335760C7CD9}" type="datetimeFigureOut">
               <a:rPr lang="en-US" smtClean="0"/>
-              <a:t>1/30/24</a:t>
+              <a:t>1/31/24</a:t>
             </a:fld>
             <a:endParaRPr lang="en-US" dirty="0"/>
           </a:p>
@@ -3601,7 +3607,7 @@
           <a:p>
             <a:fld id="{BBF693B9-5486-E049-A11D-2335760C7CD9}" type="datetimeFigureOut">
               <a:rPr lang="en-US" smtClean="0"/>
-              <a:t>1/30/24</a:t>
+              <a:t>1/31/24</a:t>
             </a:fld>
             <a:endParaRPr lang="en-US" dirty="0"/>
           </a:p>
@@ -3867,7 +3873,7 @@
           <a:p>
             <a:fld id="{BBF693B9-5486-E049-A11D-2335760C7CD9}" type="datetimeFigureOut">
               <a:rPr lang="en-US" smtClean="0"/>
-              <a:t>1/30/24</a:t>
+              <a:t>1/31/24</a:t>
             </a:fld>
             <a:endParaRPr lang="en-US" dirty="0"/>
           </a:p>
@@ -4241,7 +4247,7 @@
           <a:p>
             <a:fld id="{BBF693B9-5486-E049-A11D-2335760C7CD9}" type="datetimeFigureOut">
               <a:rPr lang="en-US" smtClean="0"/>
-              <a:t>1/30/24</a:t>
+              <a:t>1/31/24</a:t>
             </a:fld>
             <a:endParaRPr lang="en-US" dirty="0"/>
           </a:p>
@@ -4389,7 +4395,7 @@
           <a:p>
             <a:fld id="{BBF693B9-5486-E049-A11D-2335760C7CD9}" type="datetimeFigureOut">
               <a:rPr lang="en-US" smtClean="0"/>
-              <a:t>1/30/24</a:t>
+              <a:t>1/31/24</a:t>
             </a:fld>
             <a:endParaRPr lang="en-US" dirty="0"/>
           </a:p>
@@ -4514,7 +4520,7 @@
           <a:p>
             <a:fld id="{BBF693B9-5486-E049-A11D-2335760C7CD9}" type="datetimeFigureOut">
               <a:rPr lang="en-US" smtClean="0"/>
-              <a:t>1/30/24</a:t>
+              <a:t>1/31/24</a:t>
             </a:fld>
             <a:endParaRPr lang="en-US" dirty="0"/>
           </a:p>
@@ -4799,7 +4805,7 @@
           <a:p>
             <a:fld id="{BBF693B9-5486-E049-A11D-2335760C7CD9}" type="datetimeFigureOut">
               <a:rPr lang="en-US" smtClean="0"/>
-              <a:t>1/30/24</a:t>
+              <a:t>1/31/24</a:t>
             </a:fld>
             <a:endParaRPr lang="en-US" dirty="0"/>
           </a:p>
@@ -5122,7 +5128,7 @@
           <a:p>
             <a:fld id="{BBF693B9-5486-E049-A11D-2335760C7CD9}" type="datetimeFigureOut">
               <a:rPr lang="en-US" smtClean="0"/>
-              <a:t>1/30/24</a:t>
+              <a:t>1/31/24</a:t>
             </a:fld>
             <a:endParaRPr lang="en-US" dirty="0"/>
           </a:p>
@@ -5336,7 +5342,7 @@
           <a:p>
             <a:fld id="{BBF693B9-5486-E049-A11D-2335760C7CD9}" type="datetimeFigureOut">
               <a:rPr lang="en-US" smtClean="0"/>
-              <a:t>1/30/24</a:t>
+              <a:t>1/31/24</a:t>
             </a:fld>
             <a:endParaRPr lang="en-US" dirty="0"/>
           </a:p>
@@ -6347,6 +6353,271 @@
           <p:cNvPr id="2" name="Title 1">
             <a:extLst>
               <a:ext uri="{FF2B5EF4-FFF2-40B4-BE49-F238E27FC236}">
+                <a16:creationId xmlns:a16="http://schemas.microsoft.com/office/drawing/2014/main" id="{849CCA69-BCDF-A430-7E7F-CDD4DFCAA72E}"/>
+              </a:ext>
+            </a:extLst>
+          </p:cNvPr>
+          <p:cNvSpPr>
+            <a:spLocks noGrp="1"/>
+          </p:cNvSpPr>
+          <p:nvPr>
+            <p:ph type="title"/>
+          </p:nvPr>
+        </p:nvSpPr>
+        <p:spPr/>
+        <p:txBody>
+          <a:bodyPr/>
+          <a:lstStyle/>
+          <a:p>
+            <a:r>
+              <a:rPr lang="en-US" dirty="0"/>
+              <a:t>Your development team</a:t>
+            </a:r>
+          </a:p>
+        </p:txBody>
+      </p:sp>
+      <p:sp>
+        <p:nvSpPr>
+          <p:cNvPr id="3" name="Content Placeholder 2">
+            <a:extLst>
+              <a:ext uri="{FF2B5EF4-FFF2-40B4-BE49-F238E27FC236}">
+                <a16:creationId xmlns:a16="http://schemas.microsoft.com/office/drawing/2014/main" id="{B95E9312-9D6C-3C8D-EE43-7CDC21DC1CF7}"/>
+              </a:ext>
+            </a:extLst>
+          </p:cNvPr>
+          <p:cNvSpPr>
+            <a:spLocks noGrp="1"/>
+          </p:cNvSpPr>
+          <p:nvPr>
+            <p:ph sz="half" idx="1"/>
+          </p:nvPr>
+        </p:nvSpPr>
+        <p:spPr/>
+        <p:txBody>
+          <a:bodyPr anchor="t">
+            <a:normAutofit fontScale="92500" lnSpcReduction="20000"/>
+          </a:bodyPr>
+          <a:lstStyle/>
+          <a:p>
+            <a:pPr marL="0" indent="0">
+              <a:buNone/>
+            </a:pPr>
+            <a:r>
+              <a:rPr lang="en-US" sz="2600" b="1" i="0" u="none" strike="noStrike" dirty="0">
+                <a:solidFill>
+                  <a:srgbClr val="B1B4B9"/>
+                </a:solidFill>
+                <a:effectLst/>
+                <a:latin typeface="Open Sans" panose="020B0606030504020204" pitchFamily="34" charset="0"/>
+              </a:rPr>
+              <a:t>Team of 1: Work Alone</a:t>
+            </a:r>
+          </a:p>
+          <a:p>
+            <a:pPr marL="0" indent="0">
+              <a:buNone/>
+            </a:pPr>
+            <a:r>
+              <a:rPr lang="en-US" b="0" i="0" u="none" strike="noStrike" dirty="0">
+                <a:solidFill>
+                  <a:srgbClr val="B1B4B9"/>
+                </a:solidFill>
+                <a:effectLst/>
+                <a:latin typeface="Open Sans" panose="020B0606030504020204" pitchFamily="34" charset="0"/>
+              </a:rPr>
+              <a:t>You will execute the entire project alone. This is a good option if you are confident in your abilities, prefer to work alone, like to have high levels of control over your projects, or have a hard time scheduling with another person. </a:t>
+            </a:r>
+          </a:p>
+          <a:p>
+            <a:pPr marL="0" indent="0">
+              <a:buNone/>
+            </a:pPr>
+            <a:r>
+              <a:rPr lang="en-US" b="1" i="0" u="none" strike="noStrike" dirty="0">
+                <a:solidFill>
+                  <a:srgbClr val="B1B4B9"/>
+                </a:solidFill>
+                <a:effectLst/>
+                <a:latin typeface="Open Sans" panose="020B0606030504020204" pitchFamily="34" charset="0"/>
+              </a:rPr>
+              <a:t>If you work alone, you are responsible for all the work.</a:t>
+            </a:r>
+            <a:r>
+              <a:rPr lang="en-US" b="0" i="0" u="none" strike="noStrike" dirty="0">
+                <a:solidFill>
+                  <a:srgbClr val="B1B4B9"/>
+                </a:solidFill>
+                <a:effectLst/>
+                <a:latin typeface="Open Sans" panose="020B0606030504020204" pitchFamily="34" charset="0"/>
+              </a:rPr>
+              <a:t> </a:t>
+            </a:r>
+          </a:p>
+          <a:p>
+            <a:pPr marL="0" indent="0">
+              <a:buNone/>
+            </a:pPr>
+            <a:r>
+              <a:rPr lang="en-US" b="0" i="1" u="none" strike="noStrike" dirty="0">
+                <a:solidFill>
+                  <a:srgbClr val="B1B4B9"/>
+                </a:solidFill>
+                <a:effectLst/>
+                <a:latin typeface="Open Sans" panose="020B0606030504020204" pitchFamily="34" charset="0"/>
+              </a:rPr>
+              <a:t>This was always my preferred choice when I was a student because it left me in 100% control of my success.</a:t>
+            </a:r>
+          </a:p>
+          <a:p>
+            <a:endParaRPr lang="en-US" dirty="0"/>
+          </a:p>
+        </p:txBody>
+      </p:sp>
+      <p:sp>
+        <p:nvSpPr>
+          <p:cNvPr id="4" name="Content Placeholder 3">
+            <a:extLst>
+              <a:ext uri="{FF2B5EF4-FFF2-40B4-BE49-F238E27FC236}">
+                <a16:creationId xmlns:a16="http://schemas.microsoft.com/office/drawing/2014/main" id="{510B76A3-1F2F-4D5F-69F7-39F1D6152726}"/>
+              </a:ext>
+            </a:extLst>
+          </p:cNvPr>
+          <p:cNvSpPr>
+            <a:spLocks noGrp="1"/>
+          </p:cNvSpPr>
+          <p:nvPr>
+            <p:ph sz="half" idx="2"/>
+          </p:nvPr>
+        </p:nvSpPr>
+        <p:spPr/>
+        <p:txBody>
+          <a:bodyPr anchor="t">
+            <a:normAutofit fontScale="92500" lnSpcReduction="20000"/>
+          </a:bodyPr>
+          <a:lstStyle/>
+          <a:p>
+            <a:pPr marL="0" indent="0">
+              <a:buNone/>
+            </a:pPr>
+            <a:r>
+              <a:rPr lang="en-US" sz="2600" b="1" i="0" u="none" strike="noStrike" dirty="0">
+                <a:solidFill>
+                  <a:srgbClr val="B1B4B9"/>
+                </a:solidFill>
+                <a:effectLst/>
+                <a:latin typeface="Open Sans" panose="020B0606030504020204" pitchFamily="34" charset="0"/>
+              </a:rPr>
+              <a:t>Team of 2: Work with a Partner</a:t>
+            </a:r>
+            <a:r>
+              <a:rPr lang="en-US" sz="2600" b="1" i="0" u="none" strike="noStrike" dirty="0">
+                <a:solidFill>
+                  <a:srgbClr val="B1B4B9"/>
+                </a:solidFill>
+                <a:effectLst/>
+                <a:latin typeface="var(--monospace)"/>
+              </a:rPr>
+              <a:t> </a:t>
+            </a:r>
+          </a:p>
+          <a:p>
+            <a:pPr marL="0" indent="0">
+              <a:buNone/>
+            </a:pPr>
+            <a:r>
+              <a:rPr lang="en-US" b="0" i="0" u="none" strike="noStrike" dirty="0">
+                <a:solidFill>
+                  <a:srgbClr val="B1B4B9"/>
+                </a:solidFill>
+                <a:effectLst/>
+                <a:latin typeface="Open Sans" panose="020B0606030504020204" pitchFamily="34" charset="0"/>
+              </a:rPr>
+              <a:t>You and a teammate will execute the entire project and share the same grade. This is a good option if you find someone who is a good complement to your abilities or shares a similar schedule as you. </a:t>
+            </a:r>
+          </a:p>
+          <a:p>
+            <a:pPr marL="0" indent="0">
+              <a:buNone/>
+            </a:pPr>
+            <a:r>
+              <a:rPr lang="en-US" b="1" i="0" u="none" strike="noStrike" dirty="0">
+                <a:solidFill>
+                  <a:srgbClr val="B1B4B9"/>
+                </a:solidFill>
+                <a:effectLst/>
+                <a:latin typeface="Open Sans" panose="020B0606030504020204" pitchFamily="34" charset="0"/>
+              </a:rPr>
+              <a:t>Remember - you will share the same grade, so choose wisely.</a:t>
+            </a:r>
+            <a:r>
+              <a:rPr lang="en-US" b="0" i="0" u="none" strike="noStrike" dirty="0">
+                <a:solidFill>
+                  <a:srgbClr val="B1B4B9"/>
+                </a:solidFill>
+                <a:effectLst/>
+                <a:latin typeface="Open Sans" panose="020B0606030504020204" pitchFamily="34" charset="0"/>
+              </a:rPr>
+              <a:t> </a:t>
+            </a:r>
+          </a:p>
+          <a:p>
+            <a:pPr marL="0" indent="0">
+              <a:buNone/>
+            </a:pPr>
+            <a:r>
+              <a:rPr lang="en-US" b="0" i="1" u="none" strike="noStrike" dirty="0">
+                <a:solidFill>
+                  <a:srgbClr val="B1B4B9"/>
+                </a:solidFill>
+                <a:effectLst/>
+                <a:latin typeface="Open Sans" panose="020B0606030504020204" pitchFamily="34" charset="0"/>
+              </a:rPr>
+              <a:t>Sometimes teammates let you down and you must shoulder the burden to ensure your own personal success is not impacted. The possibility exists that your teammate will drop the course. You must be ready to deliver if your teammate does not deliver.</a:t>
+            </a:r>
+          </a:p>
+          <a:p>
+            <a:pPr marL="0" indent="0">
+              <a:buNone/>
+            </a:pPr>
+            <a:endParaRPr lang="en-US" dirty="0"/>
+          </a:p>
+        </p:txBody>
+      </p:sp>
+    </p:spTree>
+    <p:extLst>
+      <p:ext uri="{BB962C8B-B14F-4D97-AF65-F5344CB8AC3E}">
+        <p14:creationId xmlns:p14="http://schemas.microsoft.com/office/powerpoint/2010/main" val="1170814739"/>
+      </p:ext>
+    </p:extLst>
+  </p:cSld>
+  <p:clrMapOvr>
+    <a:masterClrMapping/>
+  </p:clrMapOvr>
+</p:sld>
+</file>
+
+<file path=ppt/slides/slide11.xml><?xml version="1.0" encoding="utf-8"?>
+<p:sld xmlns:a="http://schemas.openxmlformats.org/drawingml/2006/main" xmlns:r="http://schemas.openxmlformats.org/officeDocument/2006/relationships" xmlns:p="http://schemas.openxmlformats.org/presentationml/2006/main">
+  <p:cSld>
+    <p:spTree>
+      <p:nvGrpSpPr>
+        <p:cNvPr id="1" name=""/>
+        <p:cNvGrpSpPr/>
+        <p:nvPr/>
+      </p:nvGrpSpPr>
+      <p:grpSpPr>
+        <a:xfrm>
+          <a:off x="0" y="0"/>
+          <a:ext cx="0" cy="0"/>
+          <a:chOff x="0" y="0"/>
+          <a:chExt cx="0" cy="0"/>
+        </a:xfrm>
+      </p:grpSpPr>
+      <p:sp>
+        <p:nvSpPr>
+          <p:cNvPr id="2" name="Title 1">
+            <a:extLst>
+              <a:ext uri="{FF2B5EF4-FFF2-40B4-BE49-F238E27FC236}">
                 <a16:creationId xmlns:a16="http://schemas.microsoft.com/office/drawing/2014/main" id="{C54C32E1-CEEB-A69E-E701-CA8CC4C6EAAF}"/>
               </a:ext>
             </a:extLst>
@@ -6740,7 +7011,7 @@
 </p:sld>
 </file>
 
-<file path=ppt/slides/slide11.xml><?xml version="1.0" encoding="utf-8"?>
+<file path=ppt/slides/slide12.xml><?xml version="1.0" encoding="utf-8"?>
 <p:sld xmlns:a="http://schemas.openxmlformats.org/drawingml/2006/main" xmlns:r="http://schemas.openxmlformats.org/officeDocument/2006/relationships" xmlns:p="http://schemas.openxmlformats.org/presentationml/2006/main">
   <p:cSld>
     <p:spTree>
@@ -7161,7 +7432,7 @@
 </p:sld>
 </file>
 
-<file path=ppt/slides/slide12.xml><?xml version="1.0" encoding="utf-8"?>
+<file path=ppt/slides/slide13.xml><?xml version="1.0" encoding="utf-8"?>
 <p:sld xmlns:a="http://schemas.openxmlformats.org/drawingml/2006/main" xmlns:r="http://schemas.openxmlformats.org/officeDocument/2006/relationships" xmlns:p="http://schemas.openxmlformats.org/presentationml/2006/main">
   <p:cSld>
     <p:spTree>
@@ -7513,7 +7784,7 @@
 </p:sld>
 </file>
 
-<file path=ppt/slides/slide13.xml><?xml version="1.0" encoding="utf-8"?>
+<file path=ppt/slides/slide14.xml><?xml version="1.0" encoding="utf-8"?>
 <p:sld xmlns:a="http://schemas.openxmlformats.org/drawingml/2006/main" xmlns:r="http://schemas.openxmlformats.org/officeDocument/2006/relationships" xmlns:p="http://schemas.openxmlformats.org/presentationml/2006/main">
   <p:cSld>
     <p:spTree>
@@ -8439,7 +8710,7 @@
 </p:sld>
 </file>
 
-<file path=ppt/slides/slide14.xml><?xml version="1.0" encoding="utf-8"?>
+<file path=ppt/slides/slide15.xml><?xml version="1.0" encoding="utf-8"?>
 <p:sld xmlns:a="http://schemas.openxmlformats.org/drawingml/2006/main" xmlns:r="http://schemas.openxmlformats.org/officeDocument/2006/relationships" xmlns:p="http://schemas.openxmlformats.org/presentationml/2006/main">
   <p:cSld>
     <p:spTree>
@@ -8900,7 +9171,7 @@
 </p:sld>
 </file>
 
-<file path=ppt/slides/slide15.xml><?xml version="1.0" encoding="utf-8"?>
+<file path=ppt/slides/slide16.xml><?xml version="1.0" encoding="utf-8"?>
 <p:sld xmlns:a="http://schemas.openxmlformats.org/drawingml/2006/main" xmlns:r="http://schemas.openxmlformats.org/officeDocument/2006/relationships" xmlns:p="http://schemas.openxmlformats.org/presentationml/2006/main">
   <p:cSld>
     <p:spTree>
@@ -9129,7 +9400,7 @@
 </p:sld>
 </file>
 
-<file path=ppt/slides/slide16.xml><?xml version="1.0" encoding="utf-8"?>
+<file path=ppt/slides/slide17.xml><?xml version="1.0" encoding="utf-8"?>
 <p:sld xmlns:a="http://schemas.openxmlformats.org/drawingml/2006/main" xmlns:r="http://schemas.openxmlformats.org/officeDocument/2006/relationships" xmlns:p="http://schemas.openxmlformats.org/presentationml/2006/main">
   <p:cSld>
     <p:spTree>
@@ -9563,7 +9834,7 @@
 </p:sld>
 </file>
 
-<file path=ppt/slides/slide17.xml><?xml version="1.0" encoding="utf-8"?>
+<file path=ppt/slides/slide18.xml><?xml version="1.0" encoding="utf-8"?>
 <p:sld xmlns:a="http://schemas.openxmlformats.org/drawingml/2006/main" xmlns:r="http://schemas.openxmlformats.org/officeDocument/2006/relationships" xmlns:p="http://schemas.openxmlformats.org/presentationml/2006/main">
   <p:cSld>
     <p:spTree>
@@ -9792,7 +10063,7 @@
 </p:sld>
 </file>
 
-<file path=ppt/slides/slide18.xml><?xml version="1.0" encoding="utf-8"?>
+<file path=ppt/slides/slide19.xml><?xml version="1.0" encoding="utf-8"?>
 <p:sld xmlns:a="http://schemas.openxmlformats.org/drawingml/2006/main" xmlns:r="http://schemas.openxmlformats.org/officeDocument/2006/relationships" xmlns:p="http://schemas.openxmlformats.org/presentationml/2006/main">
   <p:cSld>
     <p:spTree>
@@ -10266,283 +10537,6 @@
       <p:bldP spid="5" grpId="0"/>
     </p:bldLst>
   </p:timing>
-</p:sld>
-</file>
-
-<file path=ppt/slides/slide19.xml><?xml version="1.0" encoding="utf-8"?>
-<p:sld xmlns:a="http://schemas.openxmlformats.org/drawingml/2006/main" xmlns:r="http://schemas.openxmlformats.org/officeDocument/2006/relationships" xmlns:p="http://schemas.openxmlformats.org/presentationml/2006/main">
-  <p:cSld>
-    <p:spTree>
-      <p:nvGrpSpPr>
-        <p:cNvPr id="1" name=""/>
-        <p:cNvGrpSpPr/>
-        <p:nvPr/>
-      </p:nvGrpSpPr>
-      <p:grpSpPr>
-        <a:xfrm>
-          <a:off x="0" y="0"/>
-          <a:ext cx="0" cy="0"/>
-          <a:chOff x="0" y="0"/>
-          <a:chExt cx="0" cy="0"/>
-        </a:xfrm>
-      </p:grpSpPr>
-      <p:sp>
-        <p:nvSpPr>
-          <p:cNvPr id="2" name="Title 1">
-            <a:extLst>
-              <a:ext uri="{FF2B5EF4-FFF2-40B4-BE49-F238E27FC236}">
-                <a16:creationId xmlns:a16="http://schemas.microsoft.com/office/drawing/2014/main" id="{0521AAFF-650A-19C7-70DD-ADD3627B3549}"/>
-              </a:ext>
-            </a:extLst>
-          </p:cNvPr>
-          <p:cNvSpPr>
-            <a:spLocks noGrp="1"/>
-          </p:cNvSpPr>
-          <p:nvPr>
-            <p:ph type="title"/>
-          </p:nvPr>
-        </p:nvSpPr>
-        <p:spPr/>
-        <p:txBody>
-          <a:bodyPr/>
-          <a:lstStyle/>
-          <a:p>
-            <a:r>
-              <a:rPr lang="en-US" dirty="0"/>
-              <a:t>Documentation</a:t>
-            </a:r>
-            <a:r>
-              <a:rPr lang="en-US" i="0" u="none" strike="noStrike" dirty="0">
-                <a:effectLst/>
-              </a:rPr>
-              <a:t> Written in Markdown</a:t>
-            </a:r>
-          </a:p>
-        </p:txBody>
-      </p:sp>
-      <p:sp>
-        <p:nvSpPr>
-          <p:cNvPr id="3" name="Content Placeholder 2">
-            <a:extLst>
-              <a:ext uri="{FF2B5EF4-FFF2-40B4-BE49-F238E27FC236}">
-                <a16:creationId xmlns:a16="http://schemas.microsoft.com/office/drawing/2014/main" id="{5EAF0460-25BC-5D86-28AC-E9DA391C949A}"/>
-              </a:ext>
-            </a:extLst>
-          </p:cNvPr>
-          <p:cNvSpPr>
-            <a:spLocks noGrp="1"/>
-          </p:cNvSpPr>
-          <p:nvPr>
-            <p:ph sz="half" idx="1"/>
-          </p:nvPr>
-        </p:nvSpPr>
-        <p:spPr/>
-        <p:txBody>
-          <a:bodyPr anchor="t">
-            <a:normAutofit lnSpcReduction="10000"/>
-          </a:bodyPr>
-          <a:lstStyle/>
-          <a:p>
-            <a:pPr marL="0" indent="0">
-              <a:buNone/>
-            </a:pPr>
-            <a:r>
-              <a:rPr lang="en-US" b="0" i="0" u="none" strike="noStrike" dirty="0">
-                <a:solidFill>
-                  <a:srgbClr val="B1B4B9"/>
-                </a:solidFill>
-                <a:effectLst/>
-                <a:latin typeface="Open Sans" panose="020B0606030504020204" pitchFamily="34" charset="0"/>
-              </a:rPr>
-              <a:t>All documentation will be written in Markdown and checked into your team GitHub repository.</a:t>
-            </a:r>
-          </a:p>
-          <a:p>
-            <a:pPr marL="0" indent="0">
-              <a:buNone/>
-            </a:pPr>
-            <a:endParaRPr lang="en-US" dirty="0"/>
-          </a:p>
-        </p:txBody>
-      </p:sp>
-      <p:sp>
-        <p:nvSpPr>
-          <p:cNvPr id="4" name="Content Placeholder 3">
-            <a:extLst>
-              <a:ext uri="{FF2B5EF4-FFF2-40B4-BE49-F238E27FC236}">
-                <a16:creationId xmlns:a16="http://schemas.microsoft.com/office/drawing/2014/main" id="{ADCE5590-0AB0-C33D-ED0D-81B89FEB92DA}"/>
-              </a:ext>
-            </a:extLst>
-          </p:cNvPr>
-          <p:cNvSpPr>
-            <a:spLocks noGrp="1"/>
-          </p:cNvSpPr>
-          <p:nvPr>
-            <p:ph sz="half" idx="2"/>
-          </p:nvPr>
-        </p:nvSpPr>
-        <p:spPr/>
-        <p:txBody>
-          <a:bodyPr anchor="t">
-            <a:normAutofit lnSpcReduction="10000"/>
-          </a:bodyPr>
-          <a:lstStyle/>
-          <a:p>
-            <a:pPr marL="0" indent="0" algn="l">
-              <a:buNone/>
-            </a:pPr>
-            <a:r>
-              <a:rPr lang="en-US" b="0" i="0" u="none" strike="noStrike" dirty="0">
-                <a:solidFill>
-                  <a:srgbClr val="B1B4B9"/>
-                </a:solidFill>
-                <a:effectLst/>
-                <a:latin typeface="Open Sans" panose="020B0606030504020204" pitchFamily="34" charset="0"/>
-              </a:rPr>
-              <a:t>Project documentation will include a </a:t>
-            </a:r>
-            <a:r>
-              <a:rPr lang="en-US" b="1" i="0" u="none" strike="noStrike" dirty="0">
-                <a:solidFill>
-                  <a:srgbClr val="B1B4B9"/>
-                </a:solidFill>
-                <a:effectLst/>
-                <a:latin typeface="Open Sans" panose="020B0606030504020204" pitchFamily="34" charset="0"/>
-              </a:rPr>
-              <a:t>README.md </a:t>
-            </a:r>
-            <a:r>
-              <a:rPr lang="en-US" b="0" i="0" u="none" strike="noStrike" dirty="0">
-                <a:solidFill>
-                  <a:srgbClr val="B1B4B9"/>
-                </a:solidFill>
-                <a:effectLst/>
-                <a:latin typeface="Open Sans" panose="020B0606030504020204" pitchFamily="34" charset="0"/>
-              </a:rPr>
-              <a:t>file in the root directory of your GitHub repository that includes:</a:t>
-            </a:r>
-          </a:p>
-          <a:p>
-            <a:pPr algn="l">
-              <a:buFont typeface="Arial" panose="020B0604020202020204" pitchFamily="34" charset="0"/>
-              <a:buChar char="•"/>
-            </a:pPr>
-            <a:r>
-              <a:rPr lang="en-US" b="0" i="0" u="none" strike="noStrike" dirty="0">
-                <a:solidFill>
-                  <a:srgbClr val="B1B4B9"/>
-                </a:solidFill>
-                <a:effectLst/>
-                <a:latin typeface="Open Sans" panose="020B0606030504020204" pitchFamily="34" charset="0"/>
-              </a:rPr>
-              <a:t>A short description of what is in the repository.</a:t>
-            </a:r>
-          </a:p>
-          <a:p>
-            <a:pPr algn="l">
-              <a:buFont typeface="Arial" panose="020B0604020202020204" pitchFamily="34" charset="0"/>
-              <a:buChar char="•"/>
-            </a:pPr>
-            <a:r>
-              <a:rPr lang="en-US" b="0" i="0" u="none" strike="noStrike" dirty="0">
-                <a:solidFill>
-                  <a:srgbClr val="B1B4B9"/>
-                </a:solidFill>
-                <a:effectLst/>
-                <a:latin typeface="Open Sans" panose="020B0606030504020204" pitchFamily="34" charset="0"/>
-              </a:rPr>
-              <a:t>Instructions how to build and execute the application from the command line, including all environment dependencies.</a:t>
-            </a:r>
-          </a:p>
-          <a:p>
-            <a:pPr algn="l">
-              <a:buFont typeface="Arial" panose="020B0604020202020204" pitchFamily="34" charset="0"/>
-              <a:buChar char="•"/>
-            </a:pPr>
-            <a:r>
-              <a:rPr lang="en-US" b="0" i="0" u="none" strike="noStrike" dirty="0">
-                <a:solidFill>
-                  <a:srgbClr val="B1B4B9"/>
-                </a:solidFill>
-                <a:effectLst/>
-                <a:latin typeface="Open Sans" panose="020B0606030504020204" pitchFamily="34" charset="0"/>
-              </a:rPr>
-              <a:t>Instructions how to execute the unit tests and Playwright tests from the command line.</a:t>
-            </a:r>
-          </a:p>
-          <a:p>
-            <a:pPr algn="l">
-              <a:buFont typeface="Arial" panose="020B0604020202020204" pitchFamily="34" charset="0"/>
-              <a:buChar char="•"/>
-            </a:pPr>
-            <a:r>
-              <a:rPr lang="en-US" b="0" i="0" u="none" strike="noStrike" dirty="0">
-                <a:solidFill>
-                  <a:srgbClr val="B1B4B9"/>
-                </a:solidFill>
-                <a:effectLst/>
-                <a:latin typeface="Open Sans" panose="020B0606030504020204" pitchFamily="34" charset="0"/>
-              </a:rPr>
-              <a:t>A link to your Final Video Presentation.</a:t>
-            </a:r>
-          </a:p>
-        </p:txBody>
-      </p:sp>
-      <p:pic>
-        <p:nvPicPr>
-          <p:cNvPr id="1026" name="Picture 2" descr="Basic Markdown Syntax Explained [With Free Cheat Sheet]">
-            <a:extLst>
-              <a:ext uri="{FF2B5EF4-FFF2-40B4-BE49-F238E27FC236}">
-                <a16:creationId xmlns:a16="http://schemas.microsoft.com/office/drawing/2014/main" id="{ED7FA0D9-CB41-6B1F-D797-8D7DD7DC61CC}"/>
-              </a:ext>
-            </a:extLst>
-          </p:cNvPr>
-          <p:cNvPicPr>
-            <a:picLocks noChangeAspect="1" noChangeArrowheads="1"/>
-          </p:cNvPicPr>
-          <p:nvPr/>
-        </p:nvPicPr>
-        <p:blipFill rotWithShape="1">
-          <a:blip r:embed="rId2">
-            <a:extLst>
-              <a:ext uri="{28A0092B-C50C-407E-A947-70E740481C1C}">
-                <a14:useLocalDpi xmlns:a14="http://schemas.microsoft.com/office/drawing/2010/main" val="0"/>
-              </a:ext>
-            </a:extLst>
-          </a:blip>
-          <a:srcRect l="845" t="26379" r="22124" b="4837"/>
-          <a:stretch/>
-        </p:blipFill>
-        <p:spPr bwMode="auto">
-          <a:xfrm>
-            <a:off x="769767" y="3265714"/>
-            <a:ext cx="4827403" cy="2311558"/>
-          </a:xfrm>
-          <a:prstGeom prst="rect">
-            <a:avLst/>
-          </a:prstGeom>
-          <a:noFill/>
-          <a:extLst>
-            <a:ext uri="{909E8E84-426E-40DD-AFC4-6F175D3DCCD1}">
-              <a14:hiddenFill xmlns:a14="http://schemas.microsoft.com/office/drawing/2010/main">
-                <a:solidFill>
-                  <a:srgbClr val="FFFFFF"/>
-                </a:solidFill>
-              </a14:hiddenFill>
-            </a:ext>
-          </a:extLst>
-        </p:spPr>
-      </p:pic>
-    </p:spTree>
-    <p:extLst>
-      <p:ext uri="{BB962C8B-B14F-4D97-AF65-F5344CB8AC3E}">
-        <p14:creationId xmlns:p14="http://schemas.microsoft.com/office/powerpoint/2010/main" val="2755079794"/>
-      </p:ext>
-    </p:extLst>
-  </p:cSld>
-  <p:clrMapOvr>
-    <a:masterClrMapping/>
-  </p:clrMapOvr>
 </p:sld>
 </file>
 
@@ -11664,6 +11658,283 @@
           <p:cNvPr id="2" name="Title 1">
             <a:extLst>
               <a:ext uri="{FF2B5EF4-FFF2-40B4-BE49-F238E27FC236}">
+                <a16:creationId xmlns:a16="http://schemas.microsoft.com/office/drawing/2014/main" id="{0521AAFF-650A-19C7-70DD-ADD3627B3549}"/>
+              </a:ext>
+            </a:extLst>
+          </p:cNvPr>
+          <p:cNvSpPr>
+            <a:spLocks noGrp="1"/>
+          </p:cNvSpPr>
+          <p:nvPr>
+            <p:ph type="title"/>
+          </p:nvPr>
+        </p:nvSpPr>
+        <p:spPr/>
+        <p:txBody>
+          <a:bodyPr/>
+          <a:lstStyle/>
+          <a:p>
+            <a:r>
+              <a:rPr lang="en-US" dirty="0"/>
+              <a:t>Documentation</a:t>
+            </a:r>
+            <a:r>
+              <a:rPr lang="en-US" i="0" u="none" strike="noStrike" dirty="0">
+                <a:effectLst/>
+              </a:rPr>
+              <a:t> Written in Markdown</a:t>
+            </a:r>
+          </a:p>
+        </p:txBody>
+      </p:sp>
+      <p:sp>
+        <p:nvSpPr>
+          <p:cNvPr id="3" name="Content Placeholder 2">
+            <a:extLst>
+              <a:ext uri="{FF2B5EF4-FFF2-40B4-BE49-F238E27FC236}">
+                <a16:creationId xmlns:a16="http://schemas.microsoft.com/office/drawing/2014/main" id="{5EAF0460-25BC-5D86-28AC-E9DA391C949A}"/>
+              </a:ext>
+            </a:extLst>
+          </p:cNvPr>
+          <p:cNvSpPr>
+            <a:spLocks noGrp="1"/>
+          </p:cNvSpPr>
+          <p:nvPr>
+            <p:ph sz="half" idx="1"/>
+          </p:nvPr>
+        </p:nvSpPr>
+        <p:spPr/>
+        <p:txBody>
+          <a:bodyPr anchor="t">
+            <a:normAutofit lnSpcReduction="10000"/>
+          </a:bodyPr>
+          <a:lstStyle/>
+          <a:p>
+            <a:pPr marL="0" indent="0">
+              <a:buNone/>
+            </a:pPr>
+            <a:r>
+              <a:rPr lang="en-US" b="0" i="0" u="none" strike="noStrike" dirty="0">
+                <a:solidFill>
+                  <a:srgbClr val="B1B4B9"/>
+                </a:solidFill>
+                <a:effectLst/>
+                <a:latin typeface="Open Sans" panose="020B0606030504020204" pitchFamily="34" charset="0"/>
+              </a:rPr>
+              <a:t>All documentation will be written in Markdown and checked into your team GitHub repository.</a:t>
+            </a:r>
+          </a:p>
+          <a:p>
+            <a:pPr marL="0" indent="0">
+              <a:buNone/>
+            </a:pPr>
+            <a:endParaRPr lang="en-US" dirty="0"/>
+          </a:p>
+        </p:txBody>
+      </p:sp>
+      <p:sp>
+        <p:nvSpPr>
+          <p:cNvPr id="4" name="Content Placeholder 3">
+            <a:extLst>
+              <a:ext uri="{FF2B5EF4-FFF2-40B4-BE49-F238E27FC236}">
+                <a16:creationId xmlns:a16="http://schemas.microsoft.com/office/drawing/2014/main" id="{ADCE5590-0AB0-C33D-ED0D-81B89FEB92DA}"/>
+              </a:ext>
+            </a:extLst>
+          </p:cNvPr>
+          <p:cNvSpPr>
+            <a:spLocks noGrp="1"/>
+          </p:cNvSpPr>
+          <p:nvPr>
+            <p:ph sz="half" idx="2"/>
+          </p:nvPr>
+        </p:nvSpPr>
+        <p:spPr/>
+        <p:txBody>
+          <a:bodyPr anchor="t">
+            <a:normAutofit lnSpcReduction="10000"/>
+          </a:bodyPr>
+          <a:lstStyle/>
+          <a:p>
+            <a:pPr marL="0" indent="0" algn="l">
+              <a:buNone/>
+            </a:pPr>
+            <a:r>
+              <a:rPr lang="en-US" b="0" i="0" u="none" strike="noStrike" dirty="0">
+                <a:solidFill>
+                  <a:srgbClr val="B1B4B9"/>
+                </a:solidFill>
+                <a:effectLst/>
+                <a:latin typeface="Open Sans" panose="020B0606030504020204" pitchFamily="34" charset="0"/>
+              </a:rPr>
+              <a:t>Project documentation will include a </a:t>
+            </a:r>
+            <a:r>
+              <a:rPr lang="en-US" b="1" i="0" u="none" strike="noStrike" dirty="0">
+                <a:solidFill>
+                  <a:srgbClr val="B1B4B9"/>
+                </a:solidFill>
+                <a:effectLst/>
+                <a:latin typeface="Open Sans" panose="020B0606030504020204" pitchFamily="34" charset="0"/>
+              </a:rPr>
+              <a:t>README.md </a:t>
+            </a:r>
+            <a:r>
+              <a:rPr lang="en-US" b="0" i="0" u="none" strike="noStrike" dirty="0">
+                <a:solidFill>
+                  <a:srgbClr val="B1B4B9"/>
+                </a:solidFill>
+                <a:effectLst/>
+                <a:latin typeface="Open Sans" panose="020B0606030504020204" pitchFamily="34" charset="0"/>
+              </a:rPr>
+              <a:t>file in the root directory of your GitHub repository that includes:</a:t>
+            </a:r>
+          </a:p>
+          <a:p>
+            <a:pPr algn="l">
+              <a:buFont typeface="Arial" panose="020B0604020202020204" pitchFamily="34" charset="0"/>
+              <a:buChar char="•"/>
+            </a:pPr>
+            <a:r>
+              <a:rPr lang="en-US" b="0" i="0" u="none" strike="noStrike" dirty="0">
+                <a:solidFill>
+                  <a:srgbClr val="B1B4B9"/>
+                </a:solidFill>
+                <a:effectLst/>
+                <a:latin typeface="Open Sans" panose="020B0606030504020204" pitchFamily="34" charset="0"/>
+              </a:rPr>
+              <a:t>A short description of what is in the repository.</a:t>
+            </a:r>
+          </a:p>
+          <a:p>
+            <a:pPr algn="l">
+              <a:buFont typeface="Arial" panose="020B0604020202020204" pitchFamily="34" charset="0"/>
+              <a:buChar char="•"/>
+            </a:pPr>
+            <a:r>
+              <a:rPr lang="en-US" b="0" i="0" u="none" strike="noStrike" dirty="0">
+                <a:solidFill>
+                  <a:srgbClr val="B1B4B9"/>
+                </a:solidFill>
+                <a:effectLst/>
+                <a:latin typeface="Open Sans" panose="020B0606030504020204" pitchFamily="34" charset="0"/>
+              </a:rPr>
+              <a:t>Instructions how to build and execute the application from the command line, including all environment dependencies.</a:t>
+            </a:r>
+          </a:p>
+          <a:p>
+            <a:pPr algn="l">
+              <a:buFont typeface="Arial" panose="020B0604020202020204" pitchFamily="34" charset="0"/>
+              <a:buChar char="•"/>
+            </a:pPr>
+            <a:r>
+              <a:rPr lang="en-US" b="0" i="0" u="none" strike="noStrike" dirty="0">
+                <a:solidFill>
+                  <a:srgbClr val="B1B4B9"/>
+                </a:solidFill>
+                <a:effectLst/>
+                <a:latin typeface="Open Sans" panose="020B0606030504020204" pitchFamily="34" charset="0"/>
+              </a:rPr>
+              <a:t>Instructions how to execute the unit tests and Playwright tests from the command line.</a:t>
+            </a:r>
+          </a:p>
+          <a:p>
+            <a:pPr algn="l">
+              <a:buFont typeface="Arial" panose="020B0604020202020204" pitchFamily="34" charset="0"/>
+              <a:buChar char="•"/>
+            </a:pPr>
+            <a:r>
+              <a:rPr lang="en-US" b="0" i="0" u="none" strike="noStrike" dirty="0">
+                <a:solidFill>
+                  <a:srgbClr val="B1B4B9"/>
+                </a:solidFill>
+                <a:effectLst/>
+                <a:latin typeface="Open Sans" panose="020B0606030504020204" pitchFamily="34" charset="0"/>
+              </a:rPr>
+              <a:t>A link to your Final Video Presentation.</a:t>
+            </a:r>
+          </a:p>
+        </p:txBody>
+      </p:sp>
+      <p:pic>
+        <p:nvPicPr>
+          <p:cNvPr id="1026" name="Picture 2" descr="Basic Markdown Syntax Explained [With Free Cheat Sheet]">
+            <a:extLst>
+              <a:ext uri="{FF2B5EF4-FFF2-40B4-BE49-F238E27FC236}">
+                <a16:creationId xmlns:a16="http://schemas.microsoft.com/office/drawing/2014/main" id="{ED7FA0D9-CB41-6B1F-D797-8D7DD7DC61CC}"/>
+              </a:ext>
+            </a:extLst>
+          </p:cNvPr>
+          <p:cNvPicPr>
+            <a:picLocks noChangeAspect="1" noChangeArrowheads="1"/>
+          </p:cNvPicPr>
+          <p:nvPr/>
+        </p:nvPicPr>
+        <p:blipFill rotWithShape="1">
+          <a:blip r:embed="rId2">
+            <a:extLst>
+              <a:ext uri="{28A0092B-C50C-407E-A947-70E740481C1C}">
+                <a14:useLocalDpi xmlns:a14="http://schemas.microsoft.com/office/drawing/2010/main" val="0"/>
+              </a:ext>
+            </a:extLst>
+          </a:blip>
+          <a:srcRect l="845" t="26379" r="22124" b="4837"/>
+          <a:stretch/>
+        </p:blipFill>
+        <p:spPr bwMode="auto">
+          <a:xfrm>
+            <a:off x="769767" y="3265714"/>
+            <a:ext cx="4827403" cy="2311558"/>
+          </a:xfrm>
+          <a:prstGeom prst="rect">
+            <a:avLst/>
+          </a:prstGeom>
+          <a:noFill/>
+          <a:extLst>
+            <a:ext uri="{909E8E84-426E-40DD-AFC4-6F175D3DCCD1}">
+              <a14:hiddenFill xmlns:a14="http://schemas.microsoft.com/office/drawing/2010/main">
+                <a:solidFill>
+                  <a:srgbClr val="FFFFFF"/>
+                </a:solidFill>
+              </a14:hiddenFill>
+            </a:ext>
+          </a:extLst>
+        </p:spPr>
+      </p:pic>
+    </p:spTree>
+    <p:extLst>
+      <p:ext uri="{BB962C8B-B14F-4D97-AF65-F5344CB8AC3E}">
+        <p14:creationId xmlns:p14="http://schemas.microsoft.com/office/powerpoint/2010/main" val="2755079794"/>
+      </p:ext>
+    </p:extLst>
+  </p:cSld>
+  <p:clrMapOvr>
+    <a:masterClrMapping/>
+  </p:clrMapOvr>
+</p:sld>
+</file>
+
+<file path=ppt/slides/slide21.xml><?xml version="1.0" encoding="utf-8"?>
+<p:sld xmlns:a="http://schemas.openxmlformats.org/drawingml/2006/main" xmlns:r="http://schemas.openxmlformats.org/officeDocument/2006/relationships" xmlns:p="http://schemas.openxmlformats.org/presentationml/2006/main">
+  <p:cSld>
+    <p:spTree>
+      <p:nvGrpSpPr>
+        <p:cNvPr id="1" name=""/>
+        <p:cNvGrpSpPr/>
+        <p:nvPr/>
+      </p:nvGrpSpPr>
+      <p:grpSpPr>
+        <a:xfrm>
+          <a:off x="0" y="0"/>
+          <a:ext cx="0" cy="0"/>
+          <a:chOff x="0" y="0"/>
+          <a:chExt cx="0" cy="0"/>
+        </a:xfrm>
+      </p:grpSpPr>
+      <p:sp>
+        <p:nvSpPr>
+          <p:cNvPr id="2" name="Title 1">
+            <a:extLst>
+              <a:ext uri="{FF2B5EF4-FFF2-40B4-BE49-F238E27FC236}">
                 <a16:creationId xmlns:a16="http://schemas.microsoft.com/office/drawing/2014/main" id="{40E63CEC-2CE0-4AB7-DF80-1745E8587F24}"/>
               </a:ext>
             </a:extLst>
@@ -11803,7 +12074,7 @@
         <p:spPr>
           <a:xfrm>
             <a:off x="5821895" y="2142067"/>
-            <a:ext cx="4316018" cy="3815732"/>
+            <a:ext cx="3803599" cy="3815732"/>
           </a:xfrm>
         </p:spPr>
         <p:txBody>
@@ -11834,21 +12105,6 @@
                 <a:latin typeface="Open Sans" panose="020B0606030504020204" pitchFamily="34" charset="0"/>
               </a:rPr>
               <a:t> It is cross platform, visually clean, and has strong spell checking (a curiously unique feature in the Markdown world). I recommend giving it a try. I use it for all my work. It is a licensed tool, but the cost is very low ($15!).</a:t>
-            </a:r>
-          </a:p>
-          <a:p>
-            <a:pPr marL="0" indent="0">
-              <a:buNone/>
-            </a:pPr>
-            <a:r>
-              <a:rPr lang="en-US" b="0" i="0" u="none" strike="noStrike" dirty="0">
-                <a:solidFill>
-                  <a:srgbClr val="B1B4B9"/>
-                </a:solidFill>
-                <a:effectLst/>
-                <a:latin typeface="Open Sans" panose="020B0606030504020204" pitchFamily="34" charset="0"/>
-              </a:rPr>
-              <a:t>Markdown is not tool specific, so whether you use Typora, an IDE, VS Code, or even write it by hand, the output will (generally) operate identically.</a:t>
             </a:r>
           </a:p>
           <a:p>
@@ -11931,7 +12187,7 @@
         </p:blipFill>
         <p:spPr bwMode="auto">
           <a:xfrm>
-            <a:off x="9580889" y="2228048"/>
+            <a:off x="9625494" y="2239199"/>
             <a:ext cx="2039375" cy="583306"/>
           </a:xfrm>
           <a:prstGeom prst="rect">
@@ -11949,250 +12205,12 @@
           </a:extLst>
         </p:spPr>
       </p:pic>
-    </p:spTree>
-    <p:extLst>
-      <p:ext uri="{BB962C8B-B14F-4D97-AF65-F5344CB8AC3E}">
-        <p14:creationId xmlns:p14="http://schemas.microsoft.com/office/powerpoint/2010/main" val="1868038843"/>
-      </p:ext>
-    </p:extLst>
-  </p:cSld>
-  <p:clrMapOvr>
-    <a:masterClrMapping/>
-  </p:clrMapOvr>
-</p:sld>
-</file>
-
-<file path=ppt/slides/slide21.xml><?xml version="1.0" encoding="utf-8"?>
-<p:sld xmlns:a="http://schemas.openxmlformats.org/drawingml/2006/main" xmlns:r="http://schemas.openxmlformats.org/officeDocument/2006/relationships" xmlns:p="http://schemas.openxmlformats.org/presentationml/2006/main">
-  <p:cSld>
-    <p:spTree>
-      <p:nvGrpSpPr>
-        <p:cNvPr id="1" name=""/>
-        <p:cNvGrpSpPr/>
-        <p:nvPr/>
-      </p:nvGrpSpPr>
-      <p:grpSpPr>
-        <a:xfrm>
-          <a:off x="0" y="0"/>
-          <a:ext cx="0" cy="0"/>
-          <a:chOff x="0" y="0"/>
-          <a:chExt cx="0" cy="0"/>
-        </a:xfrm>
-      </p:grpSpPr>
       <p:sp>
         <p:nvSpPr>
-          <p:cNvPr id="2" name="Title 1">
+          <p:cNvPr id="6" name="Title 1">
             <a:extLst>
               <a:ext uri="{FF2B5EF4-FFF2-40B4-BE49-F238E27FC236}">
-                <a16:creationId xmlns:a16="http://schemas.microsoft.com/office/drawing/2014/main" id="{2F659A74-6F85-0206-3C89-78A1FCE2F014}"/>
-              </a:ext>
-            </a:extLst>
-          </p:cNvPr>
-          <p:cNvSpPr>
-            <a:spLocks noGrp="1"/>
-          </p:cNvSpPr>
-          <p:nvPr>
-            <p:ph type="title"/>
-          </p:nvPr>
-        </p:nvSpPr>
-        <p:spPr/>
-        <p:txBody>
-          <a:bodyPr/>
-          <a:lstStyle/>
-          <a:p>
-            <a:r>
-              <a:rPr lang="en-US" dirty="0"/>
-              <a:t>Learn to Write great documentation</a:t>
-            </a:r>
-          </a:p>
-        </p:txBody>
-      </p:sp>
-      <p:sp>
-        <p:nvSpPr>
-          <p:cNvPr id="3" name="Content Placeholder 2">
-            <a:extLst>
-              <a:ext uri="{FF2B5EF4-FFF2-40B4-BE49-F238E27FC236}">
-                <a16:creationId xmlns:a16="http://schemas.microsoft.com/office/drawing/2014/main" id="{89CCD4E8-21C6-7996-18D1-34222197D797}"/>
-              </a:ext>
-            </a:extLst>
-          </p:cNvPr>
-          <p:cNvSpPr>
-            <a:spLocks noGrp="1"/>
-          </p:cNvSpPr>
-          <p:nvPr>
-            <p:ph sz="half" idx="1"/>
-          </p:nvPr>
-        </p:nvSpPr>
-        <p:spPr>
-          <a:xfrm>
-            <a:off x="685801" y="2142067"/>
-            <a:ext cx="5136093" cy="3649134"/>
-          </a:xfrm>
-        </p:spPr>
-        <p:txBody>
-          <a:bodyPr anchor="t">
-            <a:normAutofit/>
-          </a:bodyPr>
-          <a:lstStyle/>
-          <a:p>
-            <a:pPr marL="0" indent="0">
-              <a:buNone/>
-            </a:pPr>
-            <a:r>
-              <a:rPr lang="en-US" b="1" i="0" u="none" strike="noStrike" dirty="0">
-                <a:solidFill>
-                  <a:srgbClr val="B1B4B9"/>
-                </a:solidFill>
-                <a:effectLst/>
-                <a:latin typeface="Open Sans" panose="020B0606030504020204" pitchFamily="34" charset="0"/>
-              </a:rPr>
-              <a:t>Great engineers are great communicators.</a:t>
-            </a:r>
-          </a:p>
-          <a:p>
-            <a:pPr marL="0" indent="0">
-              <a:buNone/>
-            </a:pPr>
-            <a:r>
-              <a:rPr lang="en-US" b="0" i="0" u="none" strike="noStrike" dirty="0">
-                <a:solidFill>
-                  <a:srgbClr val="B1B4B9"/>
-                </a:solidFill>
-                <a:effectLst/>
-                <a:latin typeface="Open Sans" panose="020B0606030504020204" pitchFamily="34" charset="0"/>
-              </a:rPr>
-              <a:t>We must reliably communicate very complex ideas to many people. </a:t>
-            </a:r>
-          </a:p>
-          <a:p>
-            <a:pPr marL="0" indent="0">
-              <a:buNone/>
-            </a:pPr>
-            <a:r>
-              <a:rPr lang="en-US" b="0" i="0" u="none" strike="noStrike" dirty="0">
-                <a:solidFill>
-                  <a:srgbClr val="B1B4B9"/>
-                </a:solidFill>
-                <a:effectLst/>
-                <a:latin typeface="Open Sans" panose="020B0606030504020204" pitchFamily="34" charset="0"/>
-              </a:rPr>
-              <a:t>Learn to write effectively and get the best writing tools you can afford.</a:t>
-            </a:r>
-          </a:p>
-          <a:p>
-            <a:pPr marL="0" indent="0">
-              <a:buNone/>
-            </a:pPr>
-            <a:r>
-              <a:rPr lang="en-US" dirty="0">
-                <a:solidFill>
-                  <a:srgbClr val="B1B4B9"/>
-                </a:solidFill>
-                <a:latin typeface="Open Sans" panose="020B0606030504020204" pitchFamily="34" charset="0"/>
-              </a:rPr>
-              <a:t>You have two important documentation efforts to complete:</a:t>
-            </a:r>
-          </a:p>
-          <a:p>
-            <a:r>
-              <a:rPr lang="en-US" dirty="0">
-                <a:solidFill>
-                  <a:srgbClr val="B1B4B9"/>
-                </a:solidFill>
-                <a:latin typeface="Open Sans" panose="020B0606030504020204" pitchFamily="34" charset="0"/>
-              </a:rPr>
-              <a:t>Your project’s README.md file, and</a:t>
-            </a:r>
-          </a:p>
-          <a:p>
-            <a:r>
-              <a:rPr lang="en-US" dirty="0">
-                <a:solidFill>
-                  <a:srgbClr val="B1B4B9"/>
-                </a:solidFill>
-                <a:latin typeface="Open Sans" panose="020B0606030504020204" pitchFamily="34" charset="0"/>
-              </a:rPr>
-              <a:t>Your final video presentation.</a:t>
-            </a:r>
-          </a:p>
-        </p:txBody>
-      </p:sp>
-      <p:sp>
-        <p:nvSpPr>
-          <p:cNvPr id="4" name="Content Placeholder 3">
-            <a:extLst>
-              <a:ext uri="{FF2B5EF4-FFF2-40B4-BE49-F238E27FC236}">
-                <a16:creationId xmlns:a16="http://schemas.microsoft.com/office/drawing/2014/main" id="{FC3CD91D-8A3A-1161-890F-B2FEEA75E7EE}"/>
-              </a:ext>
-            </a:extLst>
-          </p:cNvPr>
-          <p:cNvSpPr>
-            <a:spLocks noGrp="1"/>
-          </p:cNvSpPr>
-          <p:nvPr>
-            <p:ph sz="half" idx="2"/>
-          </p:nvPr>
-        </p:nvSpPr>
-        <p:spPr/>
-        <p:txBody>
-          <a:bodyPr anchor="t">
-            <a:normAutofit/>
-          </a:bodyPr>
-          <a:lstStyle/>
-          <a:p>
-            <a:pPr algn="l"/>
-            <a:r>
-              <a:rPr lang="en-US" b="0" i="0" u="none" strike="noStrike" dirty="0">
-                <a:solidFill>
-                  <a:srgbClr val="B1B4B9"/>
-                </a:solidFill>
-                <a:effectLst/>
-                <a:latin typeface="Open Sans" panose="020B0606030504020204" pitchFamily="34" charset="0"/>
-              </a:rPr>
-              <a:t>You get extra credit for visiting the </a:t>
-            </a:r>
-            <a:r>
-              <a:rPr lang="en-US" b="1" i="0" u="none" strike="noStrike" dirty="0">
-                <a:solidFill>
-                  <a:srgbClr val="B1B4B9"/>
-                </a:solidFill>
-                <a:effectLst/>
-                <a:latin typeface="Open Sans" panose="020B0606030504020204" pitchFamily="34" charset="0"/>
-              </a:rPr>
-              <a:t>KSU Writing Center</a:t>
-            </a:r>
-            <a:r>
-              <a:rPr lang="en-US" b="0" i="0" u="none" strike="noStrike" dirty="0">
-                <a:solidFill>
-                  <a:srgbClr val="B1B4B9"/>
-                </a:solidFill>
-                <a:effectLst/>
-                <a:latin typeface="Open Sans" panose="020B0606030504020204" pitchFamily="34" charset="0"/>
-              </a:rPr>
-              <a:t> up to two times. This will help you learn to be a better writer and communicator. </a:t>
-            </a:r>
-          </a:p>
-          <a:p>
-            <a:pPr algn="l"/>
-            <a:r>
-              <a:rPr lang="en-US" b="0" i="0" u="none" strike="noStrike" dirty="0">
-                <a:solidFill>
-                  <a:srgbClr val="B1B4B9"/>
-                </a:solidFill>
-                <a:effectLst/>
-                <a:latin typeface="Open Sans" panose="020B0606030504020204" pitchFamily="34" charset="0"/>
-              </a:rPr>
-              <a:t>Towards the end of the semester after you have pounded out your project documentation, go to the KSU Writing Center and have them help you polish your work. </a:t>
-            </a:r>
-          </a:p>
-        </p:txBody>
-      </p:sp>
-      <p:sp>
-        <p:nvSpPr>
-          <p:cNvPr id="5" name="Title 1">
-            <a:extLst>
-              <a:ext uri="{FF2B5EF4-FFF2-40B4-BE49-F238E27FC236}">
-                <a16:creationId xmlns:a16="http://schemas.microsoft.com/office/drawing/2014/main" id="{F3F8491A-B290-8D1E-F903-78E080EFF98D}"/>
+                <a16:creationId xmlns:a16="http://schemas.microsoft.com/office/drawing/2014/main" id="{9E4C2A4B-A753-FCDA-E089-BA6AE7584DED}"/>
               </a:ext>
             </a:extLst>
           </p:cNvPr>
@@ -12203,8 +12221,8 @@
         </p:nvSpPr>
         <p:spPr>
           <a:xfrm>
-            <a:off x="2429409" y="5867400"/>
-            <a:ext cx="7447248" cy="607707"/>
+            <a:off x="7723694" y="5089004"/>
+            <a:ext cx="4082903" cy="1233853"/>
           </a:xfrm>
           <a:prstGeom prst="rect">
             <a:avLst/>
@@ -12294,7 +12312,7 @@
           <a:p>
             <a:r>
               <a:rPr lang="en-US" sz="1800" dirty="0"/>
-              <a:t>Be opinionated and passionate about the tools you use... they say a lot about you (I always ask what tools people love in interviews).</a:t>
+              <a:t>Be opinionated and passionate about the tools you use... they say a lot about you. I always ask what tools people love in interviews.</a:t>
             </a:r>
             <a:endParaRPr lang="en-US" sz="1800" b="1" dirty="0"/>
           </a:p>
@@ -12303,7 +12321,7 @@
     </p:spTree>
     <p:extLst>
       <p:ext uri="{BB962C8B-B14F-4D97-AF65-F5344CB8AC3E}">
-        <p14:creationId xmlns:p14="http://schemas.microsoft.com/office/powerpoint/2010/main" val="4220714357"/>
+        <p14:creationId xmlns:p14="http://schemas.microsoft.com/office/powerpoint/2010/main" val="1868038843"/>
       </p:ext>
     </p:extLst>
   </p:cSld>
@@ -12344,7 +12362,7 @@
                                           </p:stCondLst>
                                         </p:cTn>
                                         <p:tgtEl>
-                                          <p:spTgt spid="5"/>
+                                          <p:spTgt spid="6"/>
                                         </p:tgtEl>
                                         <p:attrNameLst>
                                           <p:attrName>style.visibility</p:attrName>
@@ -12358,7 +12376,7 @@
                                       <p:cBhvr additive="base">
                                         <p:cTn id="7" dur="500" fill="hold"/>
                                         <p:tgtEl>
-                                          <p:spTgt spid="5"/>
+                                          <p:spTgt spid="6"/>
                                         </p:tgtEl>
                                         <p:attrNameLst>
                                           <p:attrName>ppt_x</p:attrName>
@@ -12381,7 +12399,7 @@
                                       <p:cBhvr additive="base">
                                         <p:cTn id="8" dur="500" fill="hold"/>
                                         <p:tgtEl>
-                                          <p:spTgt spid="5"/>
+                                          <p:spTgt spid="6"/>
                                         </p:tgtEl>
                                         <p:attrNameLst>
                                           <p:attrName>ppt_y</p:attrName>
@@ -12431,13 +12449,298 @@
       </p:par>
     </p:tnLst>
     <p:bldLst>
-      <p:bldP spid="5" grpId="0"/>
+      <p:bldP spid="6" grpId="0"/>
     </p:bldLst>
   </p:timing>
 </p:sld>
 </file>
 
 <file path=ppt/slides/slide22.xml><?xml version="1.0" encoding="utf-8"?>
+<p:sld xmlns:a="http://schemas.openxmlformats.org/drawingml/2006/main" xmlns:r="http://schemas.openxmlformats.org/officeDocument/2006/relationships" xmlns:p="http://schemas.openxmlformats.org/presentationml/2006/main">
+  <p:cSld>
+    <p:spTree>
+      <p:nvGrpSpPr>
+        <p:cNvPr id="1" name=""/>
+        <p:cNvGrpSpPr/>
+        <p:nvPr/>
+      </p:nvGrpSpPr>
+      <p:grpSpPr>
+        <a:xfrm>
+          <a:off x="0" y="0"/>
+          <a:ext cx="0" cy="0"/>
+          <a:chOff x="0" y="0"/>
+          <a:chExt cx="0" cy="0"/>
+        </a:xfrm>
+      </p:grpSpPr>
+      <p:sp>
+        <p:nvSpPr>
+          <p:cNvPr id="2" name="Title 1">
+            <a:extLst>
+              <a:ext uri="{FF2B5EF4-FFF2-40B4-BE49-F238E27FC236}">
+                <a16:creationId xmlns:a16="http://schemas.microsoft.com/office/drawing/2014/main" id="{2F659A74-6F85-0206-3C89-78A1FCE2F014}"/>
+              </a:ext>
+            </a:extLst>
+          </p:cNvPr>
+          <p:cNvSpPr>
+            <a:spLocks noGrp="1"/>
+          </p:cNvSpPr>
+          <p:nvPr>
+            <p:ph type="title"/>
+          </p:nvPr>
+        </p:nvSpPr>
+        <p:spPr/>
+        <p:txBody>
+          <a:bodyPr/>
+          <a:lstStyle/>
+          <a:p>
+            <a:r>
+              <a:rPr lang="en-US" dirty="0"/>
+              <a:t>Learn to Write great documentation</a:t>
+            </a:r>
+          </a:p>
+        </p:txBody>
+      </p:sp>
+      <p:sp>
+        <p:nvSpPr>
+          <p:cNvPr id="3" name="Content Placeholder 2">
+            <a:extLst>
+              <a:ext uri="{FF2B5EF4-FFF2-40B4-BE49-F238E27FC236}">
+                <a16:creationId xmlns:a16="http://schemas.microsoft.com/office/drawing/2014/main" id="{89CCD4E8-21C6-7996-18D1-34222197D797}"/>
+              </a:ext>
+            </a:extLst>
+          </p:cNvPr>
+          <p:cNvSpPr>
+            <a:spLocks noGrp="1"/>
+          </p:cNvSpPr>
+          <p:nvPr>
+            <p:ph sz="half" idx="1"/>
+          </p:nvPr>
+        </p:nvSpPr>
+        <p:spPr>
+          <a:xfrm>
+            <a:off x="685801" y="2142067"/>
+            <a:ext cx="5136093" cy="3649134"/>
+          </a:xfrm>
+        </p:spPr>
+        <p:txBody>
+          <a:bodyPr anchor="t">
+            <a:normAutofit/>
+          </a:bodyPr>
+          <a:lstStyle/>
+          <a:p>
+            <a:pPr marL="0" indent="0">
+              <a:buNone/>
+            </a:pPr>
+            <a:r>
+              <a:rPr lang="en-US" b="1" i="0" u="none" strike="noStrike" dirty="0">
+                <a:solidFill>
+                  <a:srgbClr val="B1B4B9"/>
+                </a:solidFill>
+                <a:effectLst/>
+                <a:latin typeface="Open Sans" panose="020B0606030504020204" pitchFamily="34" charset="0"/>
+              </a:rPr>
+              <a:t>Great engineers are great communicators.</a:t>
+            </a:r>
+          </a:p>
+          <a:p>
+            <a:pPr marL="0" indent="0">
+              <a:buNone/>
+            </a:pPr>
+            <a:r>
+              <a:rPr lang="en-US" b="0" i="0" u="none" strike="noStrike" dirty="0">
+                <a:solidFill>
+                  <a:srgbClr val="B1B4B9"/>
+                </a:solidFill>
+                <a:effectLst/>
+                <a:latin typeface="Open Sans" panose="020B0606030504020204" pitchFamily="34" charset="0"/>
+              </a:rPr>
+              <a:t>We must reliably communicate very complex ideas to many people. </a:t>
+            </a:r>
+          </a:p>
+          <a:p>
+            <a:pPr marL="0" indent="0">
+              <a:buNone/>
+            </a:pPr>
+            <a:r>
+              <a:rPr lang="en-US" b="0" i="0" u="none" strike="noStrike" dirty="0">
+                <a:solidFill>
+                  <a:srgbClr val="B1B4B9"/>
+                </a:solidFill>
+                <a:effectLst/>
+                <a:latin typeface="Open Sans" panose="020B0606030504020204" pitchFamily="34" charset="0"/>
+              </a:rPr>
+              <a:t>Learn to write effectively and get the best writing tools you can afford.</a:t>
+            </a:r>
+          </a:p>
+          <a:p>
+            <a:pPr marL="0" indent="0">
+              <a:buNone/>
+            </a:pPr>
+            <a:r>
+              <a:rPr lang="en-US" dirty="0">
+                <a:solidFill>
+                  <a:srgbClr val="B1B4B9"/>
+                </a:solidFill>
+                <a:latin typeface="Open Sans" panose="020B0606030504020204" pitchFamily="34" charset="0"/>
+              </a:rPr>
+              <a:t>You have two important documentation efforts to complete:</a:t>
+            </a:r>
+          </a:p>
+          <a:p>
+            <a:r>
+              <a:rPr lang="en-US" dirty="0">
+                <a:solidFill>
+                  <a:srgbClr val="B1B4B9"/>
+                </a:solidFill>
+                <a:latin typeface="Open Sans" panose="020B0606030504020204" pitchFamily="34" charset="0"/>
+              </a:rPr>
+              <a:t>Your project’s README.md file, and</a:t>
+            </a:r>
+          </a:p>
+          <a:p>
+            <a:r>
+              <a:rPr lang="en-US" dirty="0">
+                <a:solidFill>
+                  <a:srgbClr val="B1B4B9"/>
+                </a:solidFill>
+                <a:latin typeface="Open Sans" panose="020B0606030504020204" pitchFamily="34" charset="0"/>
+              </a:rPr>
+              <a:t>Your final video presentation.</a:t>
+            </a:r>
+          </a:p>
+        </p:txBody>
+      </p:sp>
+      <p:sp>
+        <p:nvSpPr>
+          <p:cNvPr id="4" name="Content Placeholder 3">
+            <a:extLst>
+              <a:ext uri="{FF2B5EF4-FFF2-40B4-BE49-F238E27FC236}">
+                <a16:creationId xmlns:a16="http://schemas.microsoft.com/office/drawing/2014/main" id="{FC3CD91D-8A3A-1161-890F-B2FEEA75E7EE}"/>
+              </a:ext>
+            </a:extLst>
+          </p:cNvPr>
+          <p:cNvSpPr>
+            <a:spLocks noGrp="1"/>
+          </p:cNvSpPr>
+          <p:nvPr>
+            <p:ph sz="half" idx="2"/>
+          </p:nvPr>
+        </p:nvSpPr>
+        <p:spPr/>
+        <p:txBody>
+          <a:bodyPr anchor="t">
+            <a:normAutofit/>
+          </a:bodyPr>
+          <a:lstStyle/>
+          <a:p>
+            <a:pPr algn="l"/>
+            <a:r>
+              <a:rPr lang="en-US" b="0" i="0" u="none" strike="noStrike" dirty="0">
+                <a:solidFill>
+                  <a:srgbClr val="B1B4B9"/>
+                </a:solidFill>
+                <a:effectLst/>
+                <a:latin typeface="Open Sans" panose="020B0606030504020204" pitchFamily="34" charset="0"/>
+              </a:rPr>
+              <a:t>You get extra credit for visiting the </a:t>
+            </a:r>
+            <a:r>
+              <a:rPr lang="en-US" b="1" i="0" u="none" strike="noStrike" dirty="0">
+                <a:solidFill>
+                  <a:srgbClr val="B1B4B9"/>
+                </a:solidFill>
+                <a:effectLst/>
+                <a:latin typeface="Open Sans" panose="020B0606030504020204" pitchFamily="34" charset="0"/>
+              </a:rPr>
+              <a:t>KSU Writing Center</a:t>
+            </a:r>
+            <a:r>
+              <a:rPr lang="en-US" b="0" i="0" u="none" strike="noStrike" dirty="0">
+                <a:solidFill>
+                  <a:srgbClr val="B1B4B9"/>
+                </a:solidFill>
+                <a:effectLst/>
+                <a:latin typeface="Open Sans" panose="020B0606030504020204" pitchFamily="34" charset="0"/>
+              </a:rPr>
+              <a:t> up to two times. This will help you learn to be a better writer and communicator. </a:t>
+            </a:r>
+          </a:p>
+          <a:p>
+            <a:pPr algn="l"/>
+            <a:r>
+              <a:rPr lang="en-US" b="0" i="0" u="none" strike="noStrike" dirty="0">
+                <a:solidFill>
+                  <a:srgbClr val="B1B4B9"/>
+                </a:solidFill>
+                <a:effectLst/>
+                <a:latin typeface="Open Sans" panose="020B0606030504020204" pitchFamily="34" charset="0"/>
+              </a:rPr>
+              <a:t>Towards the end of the semester after you have pounded out your project documentation, go to the KSU Writing Center and have them help you polish your work. </a:t>
+            </a:r>
+          </a:p>
+        </p:txBody>
+      </p:sp>
+      <p:pic>
+        <p:nvPicPr>
+          <p:cNvPr id="1026" name="Picture 2" descr="KSU Writing Center">
+            <a:extLst>
+              <a:ext uri="{FF2B5EF4-FFF2-40B4-BE49-F238E27FC236}">
+                <a16:creationId xmlns:a16="http://schemas.microsoft.com/office/drawing/2014/main" id="{FC9CAB51-7016-DF30-AF60-16D9A1AAE333}"/>
+              </a:ext>
+            </a:extLst>
+          </p:cNvPr>
+          <p:cNvPicPr>
+            <a:picLocks noChangeAspect="1" noChangeArrowheads="1"/>
+          </p:cNvPicPr>
+          <p:nvPr/>
+        </p:nvPicPr>
+        <p:blipFill>
+          <a:blip r:embed="rId2">
+            <a:extLst>
+              <a:ext uri="{28A0092B-C50C-407E-A947-70E740481C1C}">
+                <a14:useLocalDpi xmlns:a14="http://schemas.microsoft.com/office/drawing/2010/main" val="0"/>
+              </a:ext>
+            </a:extLst>
+          </a:blip>
+          <a:srcRect/>
+          <a:stretch>
+            <a:fillRect/>
+          </a:stretch>
+        </p:blipFill>
+        <p:spPr bwMode="auto">
+          <a:xfrm>
+            <a:off x="6180409" y="5133898"/>
+            <a:ext cx="4465438" cy="887761"/>
+          </a:xfrm>
+          <a:prstGeom prst="rect">
+            <a:avLst/>
+          </a:prstGeom>
+          <a:noFill/>
+          <a:extLst>
+            <a:ext uri="{909E8E84-426E-40DD-AFC4-6F175D3DCCD1}">
+              <a14:hiddenFill xmlns:a14="http://schemas.microsoft.com/office/drawing/2010/main">
+                <a:solidFill>
+                  <a:srgbClr val="FFFFFF"/>
+                </a:solidFill>
+              </a14:hiddenFill>
+            </a:ext>
+          </a:extLst>
+        </p:spPr>
+      </p:pic>
+    </p:spTree>
+    <p:extLst>
+      <p:ext uri="{BB962C8B-B14F-4D97-AF65-F5344CB8AC3E}">
+        <p14:creationId xmlns:p14="http://schemas.microsoft.com/office/powerpoint/2010/main" val="4220714357"/>
+      </p:ext>
+    </p:extLst>
+  </p:cSld>
+  <p:clrMapOvr>
+    <a:masterClrMapping/>
+  </p:clrMapOvr>
+</p:sld>
+</file>
+
+<file path=ppt/slides/slide23.xml><?xml version="1.0" encoding="utf-8"?>
 <p:sld xmlns:a="http://schemas.openxmlformats.org/drawingml/2006/main" xmlns:r="http://schemas.openxmlformats.org/officeDocument/2006/relationships" xmlns:p="http://schemas.openxmlformats.org/presentationml/2006/main">
   <p:cSld>
     <p:spTree>
@@ -12919,7 +13222,7 @@
 </p:sld>
 </file>
 
-<file path=ppt/slides/slide23.xml><?xml version="1.0" encoding="utf-8"?>
+<file path=ppt/slides/slide24.xml><?xml version="1.0" encoding="utf-8"?>
 <p:sld xmlns:a="http://schemas.openxmlformats.org/drawingml/2006/main" xmlns:r="http://schemas.openxmlformats.org/officeDocument/2006/relationships" xmlns:p="http://schemas.openxmlformats.org/presentationml/2006/main">
   <p:cSld>
     <p:spTree>
@@ -13202,7 +13505,7 @@
                 <a:effectLst/>
                 <a:latin typeface="Open Sans" panose="020B0606030504020204" pitchFamily="34" charset="0"/>
               </a:rPr>
-              <a:t>Each progress report is 1.5% of your overall project score. You will submit them via a D2L dropbox. These are obviously very easy points towards your project.</a:t>
+              <a:t>Each progress report is 1.5% of your overall project score. You will submit them via a D2L drop box. These are obviously very easy points towards your project.</a:t>
             </a:r>
             <a:endParaRPr lang="en-US" sz="1400" i="1" dirty="0">
               <a:solidFill>
@@ -13470,7 +13773,7 @@
 </p:sld>
 </file>
 
-<file path=ppt/slides/slide24.xml><?xml version="1.0" encoding="utf-8"?>
+<file path=ppt/slides/slide25.xml><?xml version="1.0" encoding="utf-8"?>
 <p:sld xmlns:a="http://schemas.openxmlformats.org/drawingml/2006/main" xmlns:r="http://schemas.openxmlformats.org/officeDocument/2006/relationships" xmlns:p="http://schemas.openxmlformats.org/presentationml/2006/main">
   <p:cSld>
     <p:spTree>
@@ -13823,413 +14126,6 @@
     <p:extLst>
       <p:ext uri="{BB962C8B-B14F-4D97-AF65-F5344CB8AC3E}">
         <p14:creationId xmlns:p14="http://schemas.microsoft.com/office/powerpoint/2010/main" val="2692880491"/>
-      </p:ext>
-    </p:extLst>
-  </p:cSld>
-  <p:clrMapOvr>
-    <a:masterClrMapping/>
-  </p:clrMapOvr>
-  <p:timing>
-    <p:tnLst>
-      <p:par>
-        <p:cTn id="1" dur="indefinite" restart="never" nodeType="tmRoot">
-          <p:childTnLst>
-            <p:seq concurrent="1" nextAc="seek">
-              <p:cTn id="2" dur="indefinite" nodeType="mainSeq">
-                <p:childTnLst>
-                  <p:par>
-                    <p:cTn id="3" fill="hold">
-                      <p:stCondLst>
-                        <p:cond delay="indefinite"/>
-                      </p:stCondLst>
-                      <p:childTnLst>
-                        <p:par>
-                          <p:cTn id="4" fill="hold">
-                            <p:stCondLst>
-                              <p:cond delay="0"/>
-                            </p:stCondLst>
-                            <p:childTnLst>
-                              <p:par>
-                                <p:cTn id="5" presetID="2" presetClass="entr" presetSubtype="4" fill="hold" grpId="0" nodeType="clickEffect">
-                                  <p:stCondLst>
-                                    <p:cond delay="0"/>
-                                  </p:stCondLst>
-                                  <p:childTnLst>
-                                    <p:set>
-                                      <p:cBhvr>
-                                        <p:cTn id="6" dur="1" fill="hold">
-                                          <p:stCondLst>
-                                            <p:cond delay="0"/>
-                                          </p:stCondLst>
-                                        </p:cTn>
-                                        <p:tgtEl>
-                                          <p:spTgt spid="5"/>
-                                        </p:tgtEl>
-                                        <p:attrNameLst>
-                                          <p:attrName>style.visibility</p:attrName>
-                                        </p:attrNameLst>
-                                      </p:cBhvr>
-                                      <p:to>
-                                        <p:strVal val="visible"/>
-                                      </p:to>
-                                    </p:set>
-                                    <p:anim calcmode="lin" valueType="num">
-                                      <p:cBhvr additive="base">
-                                        <p:cTn id="7" dur="500" fill="hold"/>
-                                        <p:tgtEl>
-                                          <p:spTgt spid="5"/>
-                                        </p:tgtEl>
-                                        <p:attrNameLst>
-                                          <p:attrName>ppt_x</p:attrName>
-                                        </p:attrNameLst>
-                                      </p:cBhvr>
-                                      <p:tavLst>
-                                        <p:tav tm="0">
-                                          <p:val>
-                                            <p:strVal val="#ppt_x"/>
-                                          </p:val>
-                                        </p:tav>
-                                        <p:tav tm="100000">
-                                          <p:val>
-                                            <p:strVal val="#ppt_x"/>
-                                          </p:val>
-                                        </p:tav>
-                                      </p:tavLst>
-                                    </p:anim>
-                                    <p:anim calcmode="lin" valueType="num">
-                                      <p:cBhvr additive="base">
-                                        <p:cTn id="8" dur="500" fill="hold"/>
-                                        <p:tgtEl>
-                                          <p:spTgt spid="5"/>
-                                        </p:tgtEl>
-                                        <p:attrNameLst>
-                                          <p:attrName>ppt_y</p:attrName>
-                                        </p:attrNameLst>
-                                      </p:cBhvr>
-                                      <p:tavLst>
-                                        <p:tav tm="0">
-                                          <p:val>
-                                            <p:strVal val="1+#ppt_h/2"/>
-                                          </p:val>
-                                        </p:tav>
-                                        <p:tav tm="100000">
-                                          <p:val>
-                                            <p:strVal val="#ppt_y"/>
-                                          </p:val>
-                                        </p:tav>
-                                      </p:tavLst>
-                                    </p:anim>
-                                  </p:childTnLst>
-                                </p:cTn>
-                              </p:par>
-                            </p:childTnLst>
-                          </p:cTn>
-                        </p:par>
-                      </p:childTnLst>
-                    </p:cTn>
-                  </p:par>
-                </p:childTnLst>
-              </p:cTn>
-              <p:prevCondLst>
-                <p:cond evt="onPrev" delay="0">
-                  <p:tgtEl>
-                    <p:sldTgt/>
-                  </p:tgtEl>
-                </p:cond>
-              </p:prevCondLst>
-              <p:nextCondLst>
-                <p:cond evt="onNext" delay="0">
-                  <p:tgtEl>
-                    <p:sldTgt/>
-                  </p:tgtEl>
-                </p:cond>
-              </p:nextCondLst>
-            </p:seq>
-          </p:childTnLst>
-        </p:cTn>
-      </p:par>
-    </p:tnLst>
-    <p:bldLst>
-      <p:bldP spid="5" grpId="0"/>
-    </p:bldLst>
-  </p:timing>
-</p:sld>
-</file>
-
-<file path=ppt/slides/slide25.xml><?xml version="1.0" encoding="utf-8"?>
-<p:sld xmlns:a="http://schemas.openxmlformats.org/drawingml/2006/main" xmlns:r="http://schemas.openxmlformats.org/officeDocument/2006/relationships" xmlns:p="http://schemas.openxmlformats.org/presentationml/2006/main">
-  <p:cSld>
-    <p:spTree>
-      <p:nvGrpSpPr>
-        <p:cNvPr id="1" name=""/>
-        <p:cNvGrpSpPr/>
-        <p:nvPr/>
-      </p:nvGrpSpPr>
-      <p:grpSpPr>
-        <a:xfrm>
-          <a:off x="0" y="0"/>
-          <a:ext cx="0" cy="0"/>
-          <a:chOff x="0" y="0"/>
-          <a:chExt cx="0" cy="0"/>
-        </a:xfrm>
-      </p:grpSpPr>
-      <p:sp>
-        <p:nvSpPr>
-          <p:cNvPr id="2" name="Title 1">
-            <a:extLst>
-              <a:ext uri="{FF2B5EF4-FFF2-40B4-BE49-F238E27FC236}">
-                <a16:creationId xmlns:a16="http://schemas.microsoft.com/office/drawing/2014/main" id="{0ECF05F3-80DF-D64E-2220-BD30250A3EBF}"/>
-              </a:ext>
-            </a:extLst>
-          </p:cNvPr>
-          <p:cNvSpPr>
-            <a:spLocks noGrp="1"/>
-          </p:cNvSpPr>
-          <p:nvPr>
-            <p:ph type="title"/>
-          </p:nvPr>
-        </p:nvSpPr>
-        <p:spPr/>
-        <p:txBody>
-          <a:bodyPr/>
-          <a:lstStyle/>
-          <a:p>
-            <a:r>
-              <a:rPr lang="en-US" dirty="0"/>
-              <a:t>grading</a:t>
-            </a:r>
-          </a:p>
-        </p:txBody>
-      </p:sp>
-      <p:sp>
-        <p:nvSpPr>
-          <p:cNvPr id="3" name="Content Placeholder 2">
-            <a:extLst>
-              <a:ext uri="{FF2B5EF4-FFF2-40B4-BE49-F238E27FC236}">
-                <a16:creationId xmlns:a16="http://schemas.microsoft.com/office/drawing/2014/main" id="{E094B513-7C94-283F-9B60-B68C4FDB00CF}"/>
-              </a:ext>
-            </a:extLst>
-          </p:cNvPr>
-          <p:cNvSpPr>
-            <a:spLocks noGrp="1"/>
-          </p:cNvSpPr>
-          <p:nvPr>
-            <p:ph sz="half" idx="1"/>
-          </p:nvPr>
-        </p:nvSpPr>
-        <p:spPr>
-          <a:xfrm>
-            <a:off x="685801" y="2142067"/>
-            <a:ext cx="4995334" cy="3649134"/>
-          </a:xfrm>
-        </p:spPr>
-        <p:txBody>
-          <a:bodyPr anchor="t"/>
-          <a:lstStyle/>
-          <a:p>
-            <a:pPr marL="0" indent="0">
-              <a:buNone/>
-            </a:pPr>
-            <a:r>
-              <a:rPr lang="en-US" b="1" i="0" u="none" strike="noStrike" dirty="0">
-                <a:solidFill>
-                  <a:srgbClr val="B1B4B9"/>
-                </a:solidFill>
-                <a:effectLst/>
-                <a:latin typeface="Open Sans" panose="020B0606030504020204" pitchFamily="34" charset="0"/>
-              </a:rPr>
-              <a:t>This project is 25% of your semester grade, so it is essential that you give yourself enough time to complete it.</a:t>
-            </a:r>
-          </a:p>
-          <a:p>
-            <a:pPr marL="0" indent="0">
-              <a:buNone/>
-            </a:pPr>
-            <a:r>
-              <a:rPr lang="en-US" b="0" i="0" u="none" strike="noStrike" dirty="0">
-                <a:solidFill>
-                  <a:srgbClr val="B1B4B9"/>
-                </a:solidFill>
-                <a:effectLst/>
-                <a:latin typeface="Open Sans" panose="020B0606030504020204" pitchFamily="34" charset="0"/>
-              </a:rPr>
-              <a:t>Your final grade can only be one letter grade higher than your project. If you do poorly on the project, you will do poorly overall.</a:t>
-            </a:r>
-            <a:endParaRPr lang="en-US" dirty="0"/>
-          </a:p>
-        </p:txBody>
-      </p:sp>
-      <p:sp>
-        <p:nvSpPr>
-          <p:cNvPr id="4" name="Content Placeholder 3">
-            <a:extLst>
-              <a:ext uri="{FF2B5EF4-FFF2-40B4-BE49-F238E27FC236}">
-                <a16:creationId xmlns:a16="http://schemas.microsoft.com/office/drawing/2014/main" id="{828E8A29-5A8B-4904-1F7C-D9BFEF35A24D}"/>
-              </a:ext>
-            </a:extLst>
-          </p:cNvPr>
-          <p:cNvSpPr>
-            <a:spLocks noGrp="1"/>
-          </p:cNvSpPr>
-          <p:nvPr>
-            <p:ph sz="half" idx="2"/>
-          </p:nvPr>
-        </p:nvSpPr>
-        <p:spPr/>
-        <p:txBody>
-          <a:bodyPr anchor="t"/>
-          <a:lstStyle/>
-          <a:p>
-            <a:pPr marL="0" indent="0">
-              <a:buNone/>
-            </a:pPr>
-            <a:r>
-              <a:rPr lang="en-US" b="0" i="0" u="none" strike="noStrike" dirty="0">
-                <a:solidFill>
-                  <a:srgbClr val="B1B4B9"/>
-                </a:solidFill>
-                <a:effectLst/>
-                <a:latin typeface="Open Sans" panose="020B0606030504020204" pitchFamily="34" charset="0"/>
-              </a:rPr>
-              <a:t>If your project meets the requirements in this document, not only will you receive a top score, but you will have earned valuable expertise and enhanced your GitHub repository with a great looking project.</a:t>
-            </a:r>
-            <a:endParaRPr lang="en-US" dirty="0"/>
-          </a:p>
-        </p:txBody>
-      </p:sp>
-      <p:sp>
-        <p:nvSpPr>
-          <p:cNvPr id="5" name="Title 1">
-            <a:extLst>
-              <a:ext uri="{FF2B5EF4-FFF2-40B4-BE49-F238E27FC236}">
-                <a16:creationId xmlns:a16="http://schemas.microsoft.com/office/drawing/2014/main" id="{9DDC06B6-8F42-741A-C918-16C3F4133836}"/>
-              </a:ext>
-            </a:extLst>
-          </p:cNvPr>
-          <p:cNvSpPr txBox="1">
-            <a:spLocks/>
-          </p:cNvSpPr>
-          <p:nvPr/>
-        </p:nvSpPr>
-        <p:spPr>
-          <a:xfrm>
-            <a:off x="2283160" y="5717366"/>
-            <a:ext cx="9070166" cy="607707"/>
-          </a:xfrm>
-          <a:prstGeom prst="rect">
-            <a:avLst/>
-          </a:prstGeom>
-          <a:effectLst/>
-        </p:spPr>
-        <p:txBody>
-          <a:bodyPr vert="horz" lIns="91440" tIns="45720" rIns="91440" bIns="45720" rtlCol="0" anchor="b">
-            <a:noAutofit/>
-          </a:bodyPr>
-          <a:lstStyle>
-            <a:lvl1pPr algn="l" defTabSz="457200" rtl="0" eaLnBrk="1" latinLnBrk="0" hangingPunct="1">
-              <a:spcBef>
-                <a:spcPct val="0"/>
-              </a:spcBef>
-              <a:buNone/>
-              <a:defRPr sz="3600" kern="1200" cap="all">
-                <a:ln w="3175" cmpd="sng">
-                  <a:noFill/>
-                </a:ln>
-                <a:solidFill>
-                  <a:schemeClr val="tx1"/>
-                </a:solidFill>
-                <a:effectLst/>
-                <a:latin typeface="+mj-lt"/>
-                <a:ea typeface="+mj-ea"/>
-                <a:cs typeface="+mj-cs"/>
-              </a:defRPr>
-            </a:lvl1pPr>
-            <a:lvl2pPr eaLnBrk="1" hangingPunct="1">
-              <a:defRPr>
-                <a:solidFill>
-                  <a:schemeClr val="tx2"/>
-                </a:solidFill>
-              </a:defRPr>
-            </a:lvl2pPr>
-            <a:lvl3pPr eaLnBrk="1" hangingPunct="1">
-              <a:defRPr>
-                <a:solidFill>
-                  <a:schemeClr val="tx2"/>
-                </a:solidFill>
-              </a:defRPr>
-            </a:lvl3pPr>
-            <a:lvl4pPr eaLnBrk="1" hangingPunct="1">
-              <a:defRPr>
-                <a:solidFill>
-                  <a:schemeClr val="tx2"/>
-                </a:solidFill>
-              </a:defRPr>
-            </a:lvl4pPr>
-            <a:lvl5pPr eaLnBrk="1" hangingPunct="1">
-              <a:defRPr>
-                <a:solidFill>
-                  <a:schemeClr val="tx2"/>
-                </a:solidFill>
-              </a:defRPr>
-            </a:lvl5pPr>
-            <a:lvl6pPr eaLnBrk="1" hangingPunct="1">
-              <a:defRPr>
-                <a:solidFill>
-                  <a:schemeClr val="tx2"/>
-                </a:solidFill>
-              </a:defRPr>
-            </a:lvl6pPr>
-            <a:lvl7pPr eaLnBrk="1" hangingPunct="1">
-              <a:defRPr>
-                <a:solidFill>
-                  <a:schemeClr val="tx2"/>
-                </a:solidFill>
-              </a:defRPr>
-            </a:lvl7pPr>
-            <a:lvl8pPr eaLnBrk="1" hangingPunct="1">
-              <a:defRPr>
-                <a:solidFill>
-                  <a:schemeClr val="tx2"/>
-                </a:solidFill>
-              </a:defRPr>
-            </a:lvl8pPr>
-            <a:lvl9pPr eaLnBrk="1" hangingPunct="1">
-              <a:defRPr>
-                <a:solidFill>
-                  <a:schemeClr val="tx2"/>
-                </a:solidFill>
-              </a:defRPr>
-            </a:lvl9pPr>
-          </a:lstStyle>
-          <a:p>
-            <a:r>
-              <a:rPr lang="en-US" sz="2400" b="1" dirty="0">
-                <a:solidFill>
-                  <a:srgbClr val="FFFF00"/>
-                </a:solidFill>
-              </a:rPr>
-              <a:t>Your completed project is due </a:t>
-            </a:r>
-            <a:r>
-              <a:rPr lang="en-US" sz="2400" dirty="0">
-                <a:solidFill>
-                  <a:srgbClr val="FFFF00"/>
-                </a:solidFill>
-              </a:rPr>
-              <a:t>Friday 4/26 at 11:59 PM</a:t>
-            </a:r>
-            <a:endParaRPr lang="en-US" sz="2400" b="1" dirty="0">
-              <a:solidFill>
-                <a:srgbClr val="FFFF00"/>
-              </a:solidFill>
-            </a:endParaRPr>
-          </a:p>
-        </p:txBody>
-      </p:sp>
-    </p:spTree>
-    <p:extLst>
-      <p:ext uri="{BB962C8B-B14F-4D97-AF65-F5344CB8AC3E}">
-        <p14:creationId xmlns:p14="http://schemas.microsoft.com/office/powerpoint/2010/main" val="3108309500"/>
       </p:ext>
     </p:extLst>
   </p:cSld>
@@ -14385,7 +14281,7 @@
           <p:cNvPr id="2" name="Title 1">
             <a:extLst>
               <a:ext uri="{FF2B5EF4-FFF2-40B4-BE49-F238E27FC236}">
-                <a16:creationId xmlns:a16="http://schemas.microsoft.com/office/drawing/2014/main" id="{94E0573C-AFA9-6C8B-FA31-B195343B5CF6}"/>
+                <a16:creationId xmlns:a16="http://schemas.microsoft.com/office/drawing/2014/main" id="{0ECF05F3-80DF-D64E-2220-BD30250A3EBF}"/>
               </a:ext>
             </a:extLst>
           </p:cNvPr>
@@ -14403,7 +14299,7 @@
           <a:p>
             <a:r>
               <a:rPr lang="en-US" dirty="0"/>
-              <a:t>collaboration</a:t>
+              <a:t>grading</a:t>
             </a:r>
           </a:p>
         </p:txBody>
@@ -14413,7 +14309,7 @@
           <p:cNvPr id="3" name="Content Placeholder 2">
             <a:extLst>
               <a:ext uri="{FF2B5EF4-FFF2-40B4-BE49-F238E27FC236}">
-                <a16:creationId xmlns:a16="http://schemas.microsoft.com/office/drawing/2014/main" id="{2DFD5180-E770-2CC4-3A10-5179088962F1}"/>
+                <a16:creationId xmlns:a16="http://schemas.microsoft.com/office/drawing/2014/main" id="{E094B513-7C94-283F-9B60-B68C4FDB00CF}"/>
               </a:ext>
             </a:extLst>
           </p:cNvPr>
@@ -14424,7 +14320,12 @@
             <p:ph sz="half" idx="1"/>
           </p:nvPr>
         </p:nvSpPr>
-        <p:spPr/>
+        <p:spPr>
+          <a:xfrm>
+            <a:off x="685801" y="2142067"/>
+            <a:ext cx="4995334" cy="3649134"/>
+          </a:xfrm>
+        </p:spPr>
         <p:txBody>
           <a:bodyPr anchor="t"/>
           <a:lstStyle/>
@@ -14440,7 +14341,7 @@
                 <a:effectLst/>
                 <a:latin typeface="Open Sans" panose="020B0606030504020204" pitchFamily="34" charset="0"/>
               </a:rPr>
-              <a:t>You can collaborate with your teammate, but not with other teams. Each team's work must be their own.</a:t>
+              <a:t>This project is 25% of your semester grade, so it is essential that you give yourself enough time to complete it.</a:t>
             </a:r>
           </a:p>
           <a:p>
@@ -14455,32 +14356,9 @@
                 <a:effectLst/>
                 <a:latin typeface="Open Sans" panose="020B0606030504020204" pitchFamily="34" charset="0"/>
               </a:rPr>
-              <a:t>If you choose to work alone, you are committing to that decision for the duration of the project. You cannot change your mind later.</a:t>
-            </a:r>
-          </a:p>
-          <a:p>
-            <a:pPr marL="0" indent="0">
-              <a:buNone/>
-            </a:pPr>
-            <a:r>
-              <a:rPr lang="en-US" dirty="0">
-                <a:solidFill>
-                  <a:srgbClr val="B1B4B9"/>
-                </a:solidFill>
-                <a:latin typeface="Open Sans" panose="020B0606030504020204" pitchFamily="34" charset="0"/>
-              </a:rPr>
-              <a:t>When you are stuck, you are welcome to ask for advice from classmates or visit the KSU computer lab to get you moving again, </a:t>
-            </a:r>
-            <a:r>
-              <a:rPr lang="en-US" i="1" dirty="0">
-                <a:solidFill>
-                  <a:srgbClr val="B1B4B9"/>
-                </a:solidFill>
-                <a:latin typeface="Open Sans" panose="020B0606030504020204" pitchFamily="34" charset="0"/>
-              </a:rPr>
-              <a:t>but your work must be your own.</a:t>
-            </a:r>
-            <a:endParaRPr lang="en-US" b="1" dirty="0"/>
+              <a:t>Your final grade can only be one letter grade higher than your project. If you do poorly on the project, you will do poorly overall.</a:t>
+            </a:r>
+            <a:endParaRPr lang="en-US" dirty="0"/>
           </a:p>
         </p:txBody>
       </p:sp>
@@ -14489,7 +14367,7 @@
           <p:cNvPr id="4" name="Content Placeholder 3">
             <a:extLst>
               <a:ext uri="{FF2B5EF4-FFF2-40B4-BE49-F238E27FC236}">
-                <a16:creationId xmlns:a16="http://schemas.microsoft.com/office/drawing/2014/main" id="{104F11D7-2E6B-EA7C-6C53-31DC85FCCF5B}"/>
+                <a16:creationId xmlns:a16="http://schemas.microsoft.com/office/drawing/2014/main" id="{828E8A29-5A8B-4904-1F7C-D9BFEF35A24D}"/>
               </a:ext>
             </a:extLst>
           </p:cNvPr>
@@ -14516,22 +14394,7 @@
                 <a:effectLst/>
                 <a:latin typeface="Open Sans" panose="020B0606030504020204" pitchFamily="34" charset="0"/>
               </a:rPr>
-              <a:t>Do not consider outsourcing your project to a homework help site like Chegg. I have had that happen before. I am pretty good at spotting unusual work and I will be reading your code. </a:t>
-            </a:r>
-          </a:p>
-          <a:p>
-            <a:pPr marL="0" indent="0">
-              <a:buNone/>
-            </a:pPr>
-            <a:r>
-              <a:rPr lang="en-US" b="0" i="0" u="none" strike="noStrike" dirty="0">
-                <a:solidFill>
-                  <a:srgbClr val="B1B4B9"/>
-                </a:solidFill>
-                <a:effectLst/>
-                <a:latin typeface="Open Sans" panose="020B0606030504020204" pitchFamily="34" charset="0"/>
-              </a:rPr>
-              <a:t>AI tools such as ChatGPT cannot help you much with this project. But even if they can, you are cheating yourself of valuable experience you will need after you graduate.</a:t>
+              <a:t>If your project meets the requirements in this document, not only will you receive a top score, but you will have earned valuable expertise and enhanced your GitHub repository with a great looking project.</a:t>
             </a:r>
             <a:endParaRPr lang="en-US" dirty="0"/>
           </a:p>
@@ -14542,7 +14405,7 @@
           <p:cNvPr id="5" name="Title 1">
             <a:extLst>
               <a:ext uri="{FF2B5EF4-FFF2-40B4-BE49-F238E27FC236}">
-                <a16:creationId xmlns:a16="http://schemas.microsoft.com/office/drawing/2014/main" id="{11E9759B-7A71-D7A1-3CFB-8B726A0E8610}"/>
+                <a16:creationId xmlns:a16="http://schemas.microsoft.com/office/drawing/2014/main" id="{9DDC06B6-8F42-741A-C918-16C3F4133836}"/>
               </a:ext>
             </a:extLst>
           </p:cNvPr>
@@ -14553,7 +14416,7 @@
         </p:nvSpPr>
         <p:spPr>
           <a:xfrm>
-            <a:off x="2305878" y="5944546"/>
+            <a:off x="2283160" y="5717366"/>
             <a:ext cx="9070166" cy="607707"/>
           </a:xfrm>
           <a:prstGeom prst="rect">
@@ -14643,17 +14506,33 @@
           </a:lstStyle>
           <a:p>
             <a:r>
-              <a:rPr lang="en-US" sz="2400" b="1" dirty="0"/>
-              <a:t>Do your own work to learn how to be a top engineer.</a:t>
-            </a:r>
-            <a:endParaRPr lang="en-US" sz="1200" b="1" dirty="0"/>
+              <a:rPr lang="en-US" sz="2400" b="1" dirty="0">
+                <a:solidFill>
+                  <a:srgbClr val="FFFF00"/>
+                </a:solidFill>
+              </a:rPr>
+              <a:t>Your completed project is due </a:t>
+            </a:r>
+            <a:r>
+              <a:rPr lang="en-US" sz="2400" dirty="0">
+                <a:solidFill>
+                  <a:srgbClr val="FFFF00"/>
+                </a:solidFill>
+              </a:rPr>
+              <a:t>Friday 4/26 at 11:59 PM</a:t>
+            </a:r>
+            <a:endParaRPr lang="en-US" sz="2400" b="1" dirty="0">
+              <a:solidFill>
+                <a:srgbClr val="FFFF00"/>
+              </a:solidFill>
+            </a:endParaRPr>
           </a:p>
         </p:txBody>
       </p:sp>
     </p:spTree>
     <p:extLst>
       <p:ext uri="{BB962C8B-B14F-4D97-AF65-F5344CB8AC3E}">
-        <p14:creationId xmlns:p14="http://schemas.microsoft.com/office/powerpoint/2010/main" val="2852785570"/>
+        <p14:creationId xmlns:p14="http://schemas.microsoft.com/office/powerpoint/2010/main" val="3108309500"/>
       </p:ext>
     </p:extLst>
   </p:cSld>
@@ -14809,6 +14688,430 @@
           <p:cNvPr id="2" name="Title 1">
             <a:extLst>
               <a:ext uri="{FF2B5EF4-FFF2-40B4-BE49-F238E27FC236}">
+                <a16:creationId xmlns:a16="http://schemas.microsoft.com/office/drawing/2014/main" id="{94E0573C-AFA9-6C8B-FA31-B195343B5CF6}"/>
+              </a:ext>
+            </a:extLst>
+          </p:cNvPr>
+          <p:cNvSpPr>
+            <a:spLocks noGrp="1"/>
+          </p:cNvSpPr>
+          <p:nvPr>
+            <p:ph type="title"/>
+          </p:nvPr>
+        </p:nvSpPr>
+        <p:spPr/>
+        <p:txBody>
+          <a:bodyPr/>
+          <a:lstStyle/>
+          <a:p>
+            <a:r>
+              <a:rPr lang="en-US" dirty="0"/>
+              <a:t>collaboration</a:t>
+            </a:r>
+          </a:p>
+        </p:txBody>
+      </p:sp>
+      <p:sp>
+        <p:nvSpPr>
+          <p:cNvPr id="3" name="Content Placeholder 2">
+            <a:extLst>
+              <a:ext uri="{FF2B5EF4-FFF2-40B4-BE49-F238E27FC236}">
+                <a16:creationId xmlns:a16="http://schemas.microsoft.com/office/drawing/2014/main" id="{2DFD5180-E770-2CC4-3A10-5179088962F1}"/>
+              </a:ext>
+            </a:extLst>
+          </p:cNvPr>
+          <p:cNvSpPr>
+            <a:spLocks noGrp="1"/>
+          </p:cNvSpPr>
+          <p:nvPr>
+            <p:ph sz="half" idx="1"/>
+          </p:nvPr>
+        </p:nvSpPr>
+        <p:spPr/>
+        <p:txBody>
+          <a:bodyPr anchor="t"/>
+          <a:lstStyle/>
+          <a:p>
+            <a:pPr marL="0" indent="0">
+              <a:buNone/>
+            </a:pPr>
+            <a:r>
+              <a:rPr lang="en-US" b="1" i="0" u="none" strike="noStrike" dirty="0">
+                <a:solidFill>
+                  <a:srgbClr val="B1B4B9"/>
+                </a:solidFill>
+                <a:effectLst/>
+                <a:latin typeface="Open Sans" panose="020B0606030504020204" pitchFamily="34" charset="0"/>
+              </a:rPr>
+              <a:t>You can collaborate with your teammate, but not with other teams. Each team's work must be their own.</a:t>
+            </a:r>
+          </a:p>
+          <a:p>
+            <a:pPr marL="0" indent="0">
+              <a:buNone/>
+            </a:pPr>
+            <a:r>
+              <a:rPr lang="en-US" b="0" i="0" u="none" strike="noStrike" dirty="0">
+                <a:solidFill>
+                  <a:srgbClr val="B1B4B9"/>
+                </a:solidFill>
+                <a:effectLst/>
+                <a:latin typeface="Open Sans" panose="020B0606030504020204" pitchFamily="34" charset="0"/>
+              </a:rPr>
+              <a:t>If you choose to work alone, you are committing to that decision for the duration of the project. You cannot change your mind later.</a:t>
+            </a:r>
+          </a:p>
+          <a:p>
+            <a:pPr marL="0" indent="0">
+              <a:buNone/>
+            </a:pPr>
+            <a:r>
+              <a:rPr lang="en-US" dirty="0">
+                <a:solidFill>
+                  <a:srgbClr val="B1B4B9"/>
+                </a:solidFill>
+                <a:latin typeface="Open Sans" panose="020B0606030504020204" pitchFamily="34" charset="0"/>
+              </a:rPr>
+              <a:t>When you are stuck, you are welcome to ask for advice from classmates or visit the KSU computer lab to get you moving again, </a:t>
+            </a:r>
+            <a:r>
+              <a:rPr lang="en-US" i="1" dirty="0">
+                <a:solidFill>
+                  <a:srgbClr val="B1B4B9"/>
+                </a:solidFill>
+                <a:latin typeface="Open Sans" panose="020B0606030504020204" pitchFamily="34" charset="0"/>
+              </a:rPr>
+              <a:t>but your work must be your own.</a:t>
+            </a:r>
+            <a:endParaRPr lang="en-US" b="1" dirty="0"/>
+          </a:p>
+        </p:txBody>
+      </p:sp>
+      <p:sp>
+        <p:nvSpPr>
+          <p:cNvPr id="4" name="Content Placeholder 3">
+            <a:extLst>
+              <a:ext uri="{FF2B5EF4-FFF2-40B4-BE49-F238E27FC236}">
+                <a16:creationId xmlns:a16="http://schemas.microsoft.com/office/drawing/2014/main" id="{104F11D7-2E6B-EA7C-6C53-31DC85FCCF5B}"/>
+              </a:ext>
+            </a:extLst>
+          </p:cNvPr>
+          <p:cNvSpPr>
+            <a:spLocks noGrp="1"/>
+          </p:cNvSpPr>
+          <p:nvPr>
+            <p:ph sz="half" idx="2"/>
+          </p:nvPr>
+        </p:nvSpPr>
+        <p:spPr/>
+        <p:txBody>
+          <a:bodyPr anchor="t"/>
+          <a:lstStyle/>
+          <a:p>
+            <a:pPr marL="0" indent="0">
+              <a:buNone/>
+            </a:pPr>
+            <a:r>
+              <a:rPr lang="en-US" b="0" i="0" u="none" strike="noStrike" dirty="0">
+                <a:solidFill>
+                  <a:srgbClr val="B1B4B9"/>
+                </a:solidFill>
+                <a:effectLst/>
+                <a:latin typeface="Open Sans" panose="020B0606030504020204" pitchFamily="34" charset="0"/>
+              </a:rPr>
+              <a:t>Do not consider outsourcing your project to a homework help site like Chegg. I have had that happen before. I am pretty good at spotting unusual work and I will be reading your code. </a:t>
+            </a:r>
+          </a:p>
+          <a:p>
+            <a:pPr marL="0" indent="0">
+              <a:buNone/>
+            </a:pPr>
+            <a:r>
+              <a:rPr lang="en-US" b="0" i="0" u="none" strike="noStrike" dirty="0">
+                <a:solidFill>
+                  <a:srgbClr val="B1B4B9"/>
+                </a:solidFill>
+                <a:effectLst/>
+                <a:latin typeface="Open Sans" panose="020B0606030504020204" pitchFamily="34" charset="0"/>
+              </a:rPr>
+              <a:t>AI tools such as ChatGPT cannot help you much with this project. But even if they can, you are cheating yourself of valuable experience you will need after you graduate.</a:t>
+            </a:r>
+            <a:endParaRPr lang="en-US" dirty="0"/>
+          </a:p>
+        </p:txBody>
+      </p:sp>
+      <p:sp>
+        <p:nvSpPr>
+          <p:cNvPr id="5" name="Title 1">
+            <a:extLst>
+              <a:ext uri="{FF2B5EF4-FFF2-40B4-BE49-F238E27FC236}">
+                <a16:creationId xmlns:a16="http://schemas.microsoft.com/office/drawing/2014/main" id="{11E9759B-7A71-D7A1-3CFB-8B726A0E8610}"/>
+              </a:ext>
+            </a:extLst>
+          </p:cNvPr>
+          <p:cNvSpPr txBox="1">
+            <a:spLocks/>
+          </p:cNvSpPr>
+          <p:nvPr/>
+        </p:nvSpPr>
+        <p:spPr>
+          <a:xfrm>
+            <a:off x="2305878" y="5944546"/>
+            <a:ext cx="9070166" cy="607707"/>
+          </a:xfrm>
+          <a:prstGeom prst="rect">
+            <a:avLst/>
+          </a:prstGeom>
+          <a:effectLst/>
+        </p:spPr>
+        <p:txBody>
+          <a:bodyPr vert="horz" lIns="91440" tIns="45720" rIns="91440" bIns="45720" rtlCol="0" anchor="b">
+            <a:noAutofit/>
+          </a:bodyPr>
+          <a:lstStyle>
+            <a:lvl1pPr algn="l" defTabSz="457200" rtl="0" eaLnBrk="1" latinLnBrk="0" hangingPunct="1">
+              <a:spcBef>
+                <a:spcPct val="0"/>
+              </a:spcBef>
+              <a:buNone/>
+              <a:defRPr sz="3600" kern="1200" cap="all">
+                <a:ln w="3175" cmpd="sng">
+                  <a:noFill/>
+                </a:ln>
+                <a:solidFill>
+                  <a:schemeClr val="tx1"/>
+                </a:solidFill>
+                <a:effectLst/>
+                <a:latin typeface="+mj-lt"/>
+                <a:ea typeface="+mj-ea"/>
+                <a:cs typeface="+mj-cs"/>
+              </a:defRPr>
+            </a:lvl1pPr>
+            <a:lvl2pPr eaLnBrk="1" hangingPunct="1">
+              <a:defRPr>
+                <a:solidFill>
+                  <a:schemeClr val="tx2"/>
+                </a:solidFill>
+              </a:defRPr>
+            </a:lvl2pPr>
+            <a:lvl3pPr eaLnBrk="1" hangingPunct="1">
+              <a:defRPr>
+                <a:solidFill>
+                  <a:schemeClr val="tx2"/>
+                </a:solidFill>
+              </a:defRPr>
+            </a:lvl3pPr>
+            <a:lvl4pPr eaLnBrk="1" hangingPunct="1">
+              <a:defRPr>
+                <a:solidFill>
+                  <a:schemeClr val="tx2"/>
+                </a:solidFill>
+              </a:defRPr>
+            </a:lvl4pPr>
+            <a:lvl5pPr eaLnBrk="1" hangingPunct="1">
+              <a:defRPr>
+                <a:solidFill>
+                  <a:schemeClr val="tx2"/>
+                </a:solidFill>
+              </a:defRPr>
+            </a:lvl5pPr>
+            <a:lvl6pPr eaLnBrk="1" hangingPunct="1">
+              <a:defRPr>
+                <a:solidFill>
+                  <a:schemeClr val="tx2"/>
+                </a:solidFill>
+              </a:defRPr>
+            </a:lvl6pPr>
+            <a:lvl7pPr eaLnBrk="1" hangingPunct="1">
+              <a:defRPr>
+                <a:solidFill>
+                  <a:schemeClr val="tx2"/>
+                </a:solidFill>
+              </a:defRPr>
+            </a:lvl7pPr>
+            <a:lvl8pPr eaLnBrk="1" hangingPunct="1">
+              <a:defRPr>
+                <a:solidFill>
+                  <a:schemeClr val="tx2"/>
+                </a:solidFill>
+              </a:defRPr>
+            </a:lvl8pPr>
+            <a:lvl9pPr eaLnBrk="1" hangingPunct="1">
+              <a:defRPr>
+                <a:solidFill>
+                  <a:schemeClr val="tx2"/>
+                </a:solidFill>
+              </a:defRPr>
+            </a:lvl9pPr>
+          </a:lstStyle>
+          <a:p>
+            <a:r>
+              <a:rPr lang="en-US" sz="2400" b="1" dirty="0"/>
+              <a:t>Do your own work to learn how to be a top engineer.</a:t>
+            </a:r>
+            <a:endParaRPr lang="en-US" sz="1200" b="1" dirty="0"/>
+          </a:p>
+        </p:txBody>
+      </p:sp>
+    </p:spTree>
+    <p:extLst>
+      <p:ext uri="{BB962C8B-B14F-4D97-AF65-F5344CB8AC3E}">
+        <p14:creationId xmlns:p14="http://schemas.microsoft.com/office/powerpoint/2010/main" val="2852785570"/>
+      </p:ext>
+    </p:extLst>
+  </p:cSld>
+  <p:clrMapOvr>
+    <a:masterClrMapping/>
+  </p:clrMapOvr>
+  <p:timing>
+    <p:tnLst>
+      <p:par>
+        <p:cTn id="1" dur="indefinite" restart="never" nodeType="tmRoot">
+          <p:childTnLst>
+            <p:seq concurrent="1" nextAc="seek">
+              <p:cTn id="2" dur="indefinite" nodeType="mainSeq">
+                <p:childTnLst>
+                  <p:par>
+                    <p:cTn id="3" fill="hold">
+                      <p:stCondLst>
+                        <p:cond delay="indefinite"/>
+                      </p:stCondLst>
+                      <p:childTnLst>
+                        <p:par>
+                          <p:cTn id="4" fill="hold">
+                            <p:stCondLst>
+                              <p:cond delay="0"/>
+                            </p:stCondLst>
+                            <p:childTnLst>
+                              <p:par>
+                                <p:cTn id="5" presetID="2" presetClass="entr" presetSubtype="4" fill="hold" grpId="0" nodeType="clickEffect">
+                                  <p:stCondLst>
+                                    <p:cond delay="0"/>
+                                  </p:stCondLst>
+                                  <p:childTnLst>
+                                    <p:set>
+                                      <p:cBhvr>
+                                        <p:cTn id="6" dur="1" fill="hold">
+                                          <p:stCondLst>
+                                            <p:cond delay="0"/>
+                                          </p:stCondLst>
+                                        </p:cTn>
+                                        <p:tgtEl>
+                                          <p:spTgt spid="5"/>
+                                        </p:tgtEl>
+                                        <p:attrNameLst>
+                                          <p:attrName>style.visibility</p:attrName>
+                                        </p:attrNameLst>
+                                      </p:cBhvr>
+                                      <p:to>
+                                        <p:strVal val="visible"/>
+                                      </p:to>
+                                    </p:set>
+                                    <p:anim calcmode="lin" valueType="num">
+                                      <p:cBhvr additive="base">
+                                        <p:cTn id="7" dur="500" fill="hold"/>
+                                        <p:tgtEl>
+                                          <p:spTgt spid="5"/>
+                                        </p:tgtEl>
+                                        <p:attrNameLst>
+                                          <p:attrName>ppt_x</p:attrName>
+                                        </p:attrNameLst>
+                                      </p:cBhvr>
+                                      <p:tavLst>
+                                        <p:tav tm="0">
+                                          <p:val>
+                                            <p:strVal val="#ppt_x"/>
+                                          </p:val>
+                                        </p:tav>
+                                        <p:tav tm="100000">
+                                          <p:val>
+                                            <p:strVal val="#ppt_x"/>
+                                          </p:val>
+                                        </p:tav>
+                                      </p:tavLst>
+                                    </p:anim>
+                                    <p:anim calcmode="lin" valueType="num">
+                                      <p:cBhvr additive="base">
+                                        <p:cTn id="8" dur="500" fill="hold"/>
+                                        <p:tgtEl>
+                                          <p:spTgt spid="5"/>
+                                        </p:tgtEl>
+                                        <p:attrNameLst>
+                                          <p:attrName>ppt_y</p:attrName>
+                                        </p:attrNameLst>
+                                      </p:cBhvr>
+                                      <p:tavLst>
+                                        <p:tav tm="0">
+                                          <p:val>
+                                            <p:strVal val="1+#ppt_h/2"/>
+                                          </p:val>
+                                        </p:tav>
+                                        <p:tav tm="100000">
+                                          <p:val>
+                                            <p:strVal val="#ppt_y"/>
+                                          </p:val>
+                                        </p:tav>
+                                      </p:tavLst>
+                                    </p:anim>
+                                  </p:childTnLst>
+                                </p:cTn>
+                              </p:par>
+                            </p:childTnLst>
+                          </p:cTn>
+                        </p:par>
+                      </p:childTnLst>
+                    </p:cTn>
+                  </p:par>
+                </p:childTnLst>
+              </p:cTn>
+              <p:prevCondLst>
+                <p:cond evt="onPrev" delay="0">
+                  <p:tgtEl>
+                    <p:sldTgt/>
+                  </p:tgtEl>
+                </p:cond>
+              </p:prevCondLst>
+              <p:nextCondLst>
+                <p:cond evt="onNext" delay="0">
+                  <p:tgtEl>
+                    <p:sldTgt/>
+                  </p:tgtEl>
+                </p:cond>
+              </p:nextCondLst>
+            </p:seq>
+          </p:childTnLst>
+        </p:cTn>
+      </p:par>
+    </p:tnLst>
+    <p:bldLst>
+      <p:bldP spid="5" grpId="0"/>
+    </p:bldLst>
+  </p:timing>
+</p:sld>
+</file>
+
+<file path=ppt/slides/slide28.xml><?xml version="1.0" encoding="utf-8"?>
+<p:sld xmlns:a="http://schemas.openxmlformats.org/drawingml/2006/main" xmlns:r="http://schemas.openxmlformats.org/officeDocument/2006/relationships" xmlns:p="http://schemas.openxmlformats.org/presentationml/2006/main">
+  <p:cSld>
+    <p:spTree>
+      <p:nvGrpSpPr>
+        <p:cNvPr id="1" name=""/>
+        <p:cNvGrpSpPr/>
+        <p:nvPr/>
+      </p:nvGrpSpPr>
+      <p:grpSpPr>
+        <a:xfrm>
+          <a:off x="0" y="0"/>
+          <a:ext cx="0" cy="0"/>
+          <a:chOff x="0" y="0"/>
+          <a:chExt cx="0" cy="0"/>
+        </a:xfrm>
+      </p:grpSpPr>
+      <p:sp>
+        <p:nvSpPr>
+          <p:cNvPr id="2" name="Title 1">
+            <a:extLst>
+              <a:ext uri="{FF2B5EF4-FFF2-40B4-BE49-F238E27FC236}">
                 <a16:creationId xmlns:a16="http://schemas.microsoft.com/office/drawing/2014/main" id="{882C54FF-F6E2-B97C-2B70-EFBA1B670053}"/>
               </a:ext>
             </a:extLst>
@@ -14988,7 +15291,7 @@
 </p:sld>
 </file>
 
-<file path=ppt/slides/slide28.xml><?xml version="1.0" encoding="utf-8"?>
+<file path=ppt/slides/slide29.xml><?xml version="1.0" encoding="utf-8"?>
 <p:sld xmlns:a="http://schemas.openxmlformats.org/drawingml/2006/main" xmlns:r="http://schemas.openxmlformats.org/officeDocument/2006/relationships" xmlns:p="http://schemas.openxmlformats.org/presentationml/2006/main">
   <p:cSld>
     <p:spTree>
@@ -15287,719 +15590,6 @@
     <p:extLst>
       <p:ext uri="{BB962C8B-B14F-4D97-AF65-F5344CB8AC3E}">
         <p14:creationId xmlns:p14="http://schemas.microsoft.com/office/powerpoint/2010/main" val="3241522177"/>
-      </p:ext>
-    </p:extLst>
-  </p:cSld>
-  <p:clrMapOvr>
-    <a:masterClrMapping/>
-  </p:clrMapOvr>
-</p:sld>
-</file>
-
-<file path=ppt/slides/slide29.xml><?xml version="1.0" encoding="utf-8"?>
-<p:sld xmlns:a="http://schemas.openxmlformats.org/drawingml/2006/main" xmlns:r="http://schemas.openxmlformats.org/officeDocument/2006/relationships" xmlns:p="http://schemas.openxmlformats.org/presentationml/2006/main">
-  <p:cSld>
-    <p:spTree>
-      <p:nvGrpSpPr>
-        <p:cNvPr id="1" name=""/>
-        <p:cNvGrpSpPr/>
-        <p:nvPr/>
-      </p:nvGrpSpPr>
-      <p:grpSpPr>
-        <a:xfrm>
-          <a:off x="0" y="0"/>
-          <a:ext cx="0" cy="0"/>
-          <a:chOff x="0" y="0"/>
-          <a:chExt cx="0" cy="0"/>
-        </a:xfrm>
-      </p:grpSpPr>
-      <p:sp>
-        <p:nvSpPr>
-          <p:cNvPr id="2" name="Title 1">
-            <a:extLst>
-              <a:ext uri="{FF2B5EF4-FFF2-40B4-BE49-F238E27FC236}">
-                <a16:creationId xmlns:a16="http://schemas.microsoft.com/office/drawing/2014/main" id="{905921E9-AFAF-E626-1743-5CF51A573594}"/>
-              </a:ext>
-            </a:extLst>
-          </p:cNvPr>
-          <p:cNvSpPr>
-            <a:spLocks noGrp="1"/>
-          </p:cNvSpPr>
-          <p:nvPr>
-            <p:ph type="title"/>
-          </p:nvPr>
-        </p:nvSpPr>
-        <p:spPr/>
-        <p:txBody>
-          <a:bodyPr/>
-          <a:lstStyle/>
-          <a:p>
-            <a:r>
-              <a:rPr lang="en-US" dirty="0"/>
-              <a:t>Get started immediately</a:t>
-            </a:r>
-          </a:p>
-        </p:txBody>
-      </p:sp>
-      <p:sp>
-        <p:nvSpPr>
-          <p:cNvPr id="3" name="Content Placeholder 2">
-            <a:extLst>
-              <a:ext uri="{FF2B5EF4-FFF2-40B4-BE49-F238E27FC236}">
-                <a16:creationId xmlns:a16="http://schemas.microsoft.com/office/drawing/2014/main" id="{7877A184-0C0F-2B9B-B359-19EAB605AD14}"/>
-              </a:ext>
-            </a:extLst>
-          </p:cNvPr>
-          <p:cNvSpPr>
-            <a:spLocks noGrp="1"/>
-          </p:cNvSpPr>
-          <p:nvPr>
-            <p:ph sz="half" idx="1"/>
-          </p:nvPr>
-        </p:nvSpPr>
-        <p:spPr/>
-        <p:txBody>
-          <a:bodyPr anchor="t">
-            <a:normAutofit fontScale="92500" lnSpcReduction="20000"/>
-          </a:bodyPr>
-          <a:lstStyle/>
-          <a:p>
-            <a:pPr marL="342900" indent="-342900">
-              <a:buFont typeface="+mj-lt"/>
-              <a:buAutoNum type="arabicPeriod"/>
-            </a:pPr>
-            <a:r>
-              <a:rPr lang="en-US" dirty="0">
-                <a:solidFill>
-                  <a:schemeClr val="tx1">
-                    <a:lumMod val="85000"/>
-                  </a:schemeClr>
-                </a:solidFill>
-                <a:latin typeface="Open Sans" panose="020B0606030504020204" pitchFamily="34" charset="0"/>
-                <a:ea typeface="Open Sans" panose="020B0606030504020204" pitchFamily="34" charset="0"/>
-                <a:cs typeface="Open Sans" panose="020B0606030504020204" pitchFamily="34" charset="0"/>
-              </a:rPr>
-              <a:t>Pick your team and submit your team members and GitHub repository URL to the project spreadsheet by Thursday, February 8</a:t>
-            </a:r>
-            <a:r>
-              <a:rPr lang="en-US" baseline="30000" dirty="0">
-                <a:solidFill>
-                  <a:schemeClr val="tx1">
-                    <a:lumMod val="85000"/>
-                  </a:schemeClr>
-                </a:solidFill>
-                <a:latin typeface="Open Sans" panose="020B0606030504020204" pitchFamily="34" charset="0"/>
-                <a:ea typeface="Open Sans" panose="020B0606030504020204" pitchFamily="34" charset="0"/>
-                <a:cs typeface="Open Sans" panose="020B0606030504020204" pitchFamily="34" charset="0"/>
-              </a:rPr>
-              <a:t>th</a:t>
-            </a:r>
-            <a:r>
-              <a:rPr lang="en-US" dirty="0">
-                <a:solidFill>
-                  <a:schemeClr val="tx1">
-                    <a:lumMod val="85000"/>
-                  </a:schemeClr>
-                </a:solidFill>
-                <a:latin typeface="Open Sans" panose="020B0606030504020204" pitchFamily="34" charset="0"/>
-                <a:ea typeface="Open Sans" panose="020B0606030504020204" pitchFamily="34" charset="0"/>
-                <a:cs typeface="Open Sans" panose="020B0606030504020204" pitchFamily="34" charset="0"/>
-              </a:rPr>
-              <a:t>.</a:t>
-            </a:r>
-            <a:br>
-              <a:rPr lang="en-US" dirty="0">
-                <a:solidFill>
-                  <a:schemeClr val="tx1">
-                    <a:lumMod val="85000"/>
-                  </a:schemeClr>
-                </a:solidFill>
-                <a:latin typeface="Open Sans" panose="020B0606030504020204" pitchFamily="34" charset="0"/>
-                <a:ea typeface="Open Sans" panose="020B0606030504020204" pitchFamily="34" charset="0"/>
-                <a:cs typeface="Open Sans" panose="020B0606030504020204" pitchFamily="34" charset="0"/>
-              </a:rPr>
-            </a:br>
-            <a:br>
-              <a:rPr lang="en-US" sz="1400" dirty="0">
-                <a:solidFill>
-                  <a:schemeClr val="tx1">
-                    <a:lumMod val="85000"/>
-                  </a:schemeClr>
-                </a:solidFill>
-                <a:latin typeface="Open Sans" panose="020B0606030504020204" pitchFamily="34" charset="0"/>
-                <a:ea typeface="Open Sans" panose="020B0606030504020204" pitchFamily="34" charset="0"/>
-                <a:cs typeface="Open Sans" panose="020B0606030504020204" pitchFamily="34" charset="0"/>
-              </a:rPr>
-            </a:br>
-            <a:r>
-              <a:rPr lang="en-US" sz="1400" dirty="0">
-                <a:solidFill>
-                  <a:schemeClr val="tx1">
-                    <a:lumMod val="85000"/>
-                  </a:schemeClr>
-                </a:solidFill>
-                <a:latin typeface="Open Sans" panose="020B0606030504020204" pitchFamily="34" charset="0"/>
-                <a:ea typeface="Open Sans" panose="020B0606030504020204" pitchFamily="34" charset="0"/>
-                <a:cs typeface="Open Sans" panose="020B0606030504020204" pitchFamily="34" charset="0"/>
-                <a:hlinkClick r:id="rId2">
-                  <a:extLst>
-                    <a:ext uri="{A12FA001-AC4F-418D-AE19-62706E023703}">
-                      <ahyp:hlinkClr xmlns:ahyp="http://schemas.microsoft.com/office/drawing/2018/hyperlinkcolor" val="tx"/>
-                    </a:ext>
-                  </a:extLst>
-                </a:hlinkClick>
-              </a:rPr>
-              <a:t>https://shorturl.at/eAOSW</a:t>
-            </a:r>
-            <a:r>
-              <a:rPr lang="en-US" sz="1400" dirty="0">
-                <a:solidFill>
-                  <a:schemeClr val="tx1">
-                    <a:lumMod val="85000"/>
-                  </a:schemeClr>
-                </a:solidFill>
-                <a:latin typeface="Open Sans" panose="020B0606030504020204" pitchFamily="34" charset="0"/>
-                <a:ea typeface="Open Sans" panose="020B0606030504020204" pitchFamily="34" charset="0"/>
-                <a:cs typeface="Open Sans" panose="020B0606030504020204" pitchFamily="34" charset="0"/>
-              </a:rPr>
-              <a:t> </a:t>
-            </a:r>
-            <a:br>
-              <a:rPr lang="en-US" dirty="0">
-                <a:solidFill>
-                  <a:schemeClr val="tx1">
-                    <a:lumMod val="85000"/>
-                  </a:schemeClr>
-                </a:solidFill>
-                <a:latin typeface="Open Sans" panose="020B0606030504020204" pitchFamily="34" charset="0"/>
-                <a:ea typeface="Open Sans" panose="020B0606030504020204" pitchFamily="34" charset="0"/>
-                <a:cs typeface="Open Sans" panose="020B0606030504020204" pitchFamily="34" charset="0"/>
-              </a:rPr>
-            </a:br>
-            <a:br>
-              <a:rPr lang="en-US" dirty="0">
-                <a:solidFill>
-                  <a:schemeClr val="tx1">
-                    <a:lumMod val="85000"/>
-                  </a:schemeClr>
-                </a:solidFill>
-                <a:latin typeface="Open Sans" panose="020B0606030504020204" pitchFamily="34" charset="0"/>
-                <a:ea typeface="Open Sans" panose="020B0606030504020204" pitchFamily="34" charset="0"/>
-                <a:cs typeface="Open Sans" panose="020B0606030504020204" pitchFamily="34" charset="0"/>
-              </a:rPr>
-            </a:br>
-            <a:r>
-              <a:rPr lang="en-US" sz="1200" i="1" dirty="0">
-                <a:solidFill>
-                  <a:schemeClr val="tx1">
-                    <a:lumMod val="85000"/>
-                  </a:schemeClr>
-                </a:solidFill>
-                <a:latin typeface="Open Sans" panose="020B0606030504020204" pitchFamily="34" charset="0"/>
-                <a:ea typeface="Open Sans" panose="020B0606030504020204" pitchFamily="34" charset="0"/>
-                <a:cs typeface="Open Sans" panose="020B0606030504020204" pitchFamily="34" charset="0"/>
-              </a:rPr>
-              <a:t>* This is your first project grade. Do not miss this date.</a:t>
-            </a:r>
-          </a:p>
-          <a:p>
-            <a:pPr marL="342900" indent="-342900">
-              <a:buFont typeface="+mj-lt"/>
-              <a:buAutoNum type="arabicPeriod"/>
-            </a:pPr>
-            <a:r>
-              <a:rPr lang="en-US" dirty="0">
-                <a:solidFill>
-                  <a:schemeClr val="tx1">
-                    <a:lumMod val="85000"/>
-                  </a:schemeClr>
-                </a:solidFill>
-                <a:latin typeface="Open Sans" panose="020B0606030504020204" pitchFamily="34" charset="0"/>
-                <a:ea typeface="Open Sans" panose="020B0606030504020204" pitchFamily="34" charset="0"/>
-                <a:cs typeface="Open Sans" panose="020B0606030504020204" pitchFamily="34" charset="0"/>
-              </a:rPr>
-              <a:t>Read the </a:t>
-            </a:r>
-            <a:r>
-              <a:rPr lang="en-US" b="1" dirty="0">
-                <a:solidFill>
-                  <a:schemeClr val="tx1">
-                    <a:lumMod val="85000"/>
-                  </a:schemeClr>
-                </a:solidFill>
-                <a:latin typeface="Open Sans" panose="020B0606030504020204" pitchFamily="34" charset="0"/>
-                <a:ea typeface="Open Sans" panose="020B0606030504020204" pitchFamily="34" charset="0"/>
-                <a:cs typeface="Open Sans" panose="020B0606030504020204" pitchFamily="34" charset="0"/>
-              </a:rPr>
-              <a:t>Project Documentation </a:t>
-            </a:r>
-            <a:r>
-              <a:rPr lang="en-US" dirty="0">
-                <a:solidFill>
-                  <a:schemeClr val="tx1">
-                    <a:lumMod val="85000"/>
-                  </a:schemeClr>
-                </a:solidFill>
-                <a:latin typeface="Open Sans" panose="020B0606030504020204" pitchFamily="34" charset="0"/>
-                <a:ea typeface="Open Sans" panose="020B0606030504020204" pitchFamily="34" charset="0"/>
-                <a:cs typeface="Open Sans" panose="020B0606030504020204" pitchFamily="34" charset="0"/>
-              </a:rPr>
-              <a:t>thoroughly.</a:t>
-            </a:r>
-            <a:br>
-              <a:rPr lang="en-US" dirty="0">
-                <a:solidFill>
-                  <a:schemeClr val="tx1">
-                    <a:lumMod val="85000"/>
-                  </a:schemeClr>
-                </a:solidFill>
-                <a:latin typeface="Open Sans" panose="020B0606030504020204" pitchFamily="34" charset="0"/>
-                <a:ea typeface="Open Sans" panose="020B0606030504020204" pitchFamily="34" charset="0"/>
-                <a:cs typeface="Open Sans" panose="020B0606030504020204" pitchFamily="34" charset="0"/>
-              </a:rPr>
-            </a:br>
-            <a:br>
-              <a:rPr lang="en-US" sz="900" dirty="0">
-                <a:solidFill>
-                  <a:schemeClr val="tx1">
-                    <a:lumMod val="85000"/>
-                  </a:schemeClr>
-                </a:solidFill>
-                <a:latin typeface="Open Sans" panose="020B0606030504020204" pitchFamily="34" charset="0"/>
-                <a:ea typeface="Open Sans" panose="020B0606030504020204" pitchFamily="34" charset="0"/>
-                <a:cs typeface="Open Sans" panose="020B0606030504020204" pitchFamily="34" charset="0"/>
-              </a:rPr>
-            </a:br>
-            <a:r>
-              <a:rPr lang="en-US" sz="1400" dirty="0">
-                <a:solidFill>
-                  <a:schemeClr val="tx1">
-                    <a:lumMod val="85000"/>
-                  </a:schemeClr>
-                </a:solidFill>
-                <a:latin typeface="Open Sans" panose="020B0606030504020204" pitchFamily="34" charset="0"/>
-                <a:ea typeface="Open Sans" panose="020B0606030504020204" pitchFamily="34" charset="0"/>
-                <a:cs typeface="Open Sans" panose="020B0606030504020204" pitchFamily="34" charset="0"/>
-                <a:hlinkClick r:id="rId3">
-                  <a:extLst>
-                    <a:ext uri="{A12FA001-AC4F-418D-AE19-62706E023703}">
-                      <ahyp:hlinkClr xmlns:ahyp="http://schemas.microsoft.com/office/drawing/2018/hyperlinkcolor" val="tx"/>
-                    </a:ext>
-                  </a:extLst>
-                </a:hlinkClick>
-              </a:rPr>
-              <a:t>https://github.com/jeff-adkisson/swe-3643-spring-2024/blob/master/project/README.md</a:t>
-            </a:r>
-            <a:endParaRPr lang="en-US" sz="1400" dirty="0">
-              <a:solidFill>
-                <a:schemeClr val="tx1">
-                  <a:lumMod val="85000"/>
-                </a:schemeClr>
-              </a:solidFill>
-              <a:latin typeface="Open Sans" panose="020B0606030504020204" pitchFamily="34" charset="0"/>
-              <a:ea typeface="Open Sans" panose="020B0606030504020204" pitchFamily="34" charset="0"/>
-              <a:cs typeface="Open Sans" panose="020B0606030504020204" pitchFamily="34" charset="0"/>
-            </a:endParaRPr>
-          </a:p>
-          <a:p>
-            <a:pPr marL="342900" indent="-342900">
-              <a:buFont typeface="+mj-lt"/>
-              <a:buAutoNum type="arabicPeriod"/>
-            </a:pPr>
-            <a:r>
-              <a:rPr lang="en-US" dirty="0">
-                <a:solidFill>
-                  <a:schemeClr val="tx1">
-                    <a:lumMod val="85000"/>
-                  </a:schemeClr>
-                </a:solidFill>
-                <a:latin typeface="Open Sans" panose="020B0606030504020204" pitchFamily="34" charset="0"/>
-                <a:ea typeface="Open Sans" panose="020B0606030504020204" pitchFamily="34" charset="0"/>
-                <a:cs typeface="Open Sans" panose="020B0606030504020204" pitchFamily="34" charset="0"/>
-              </a:rPr>
-              <a:t>Do some research, then pick a language and web server framework from the available choices.</a:t>
-            </a:r>
-            <a:br>
-              <a:rPr lang="en-US" dirty="0">
-                <a:solidFill>
-                  <a:schemeClr val="tx1">
-                    <a:lumMod val="85000"/>
-                  </a:schemeClr>
-                </a:solidFill>
-                <a:latin typeface="Open Sans" panose="020B0606030504020204" pitchFamily="34" charset="0"/>
-                <a:ea typeface="Open Sans" panose="020B0606030504020204" pitchFamily="34" charset="0"/>
-                <a:cs typeface="Open Sans" panose="020B0606030504020204" pitchFamily="34" charset="0"/>
-              </a:rPr>
-            </a:br>
-            <a:br>
-              <a:rPr lang="en-US" sz="900" dirty="0">
-                <a:solidFill>
-                  <a:schemeClr val="tx1">
-                    <a:lumMod val="85000"/>
-                  </a:schemeClr>
-                </a:solidFill>
-                <a:latin typeface="Open Sans" panose="020B0606030504020204" pitchFamily="34" charset="0"/>
-                <a:ea typeface="Open Sans" panose="020B0606030504020204" pitchFamily="34" charset="0"/>
-                <a:cs typeface="Open Sans" panose="020B0606030504020204" pitchFamily="34" charset="0"/>
-              </a:rPr>
-            </a:br>
-            <a:r>
-              <a:rPr lang="en-US" sz="1400" dirty="0">
-                <a:solidFill>
-                  <a:schemeClr val="tx1">
-                    <a:lumMod val="85000"/>
-                  </a:schemeClr>
-                </a:solidFill>
-                <a:latin typeface="Open Sans" panose="020B0606030504020204" pitchFamily="34" charset="0"/>
-                <a:ea typeface="Open Sans" panose="020B0606030504020204" pitchFamily="34" charset="0"/>
-                <a:cs typeface="Open Sans" panose="020B0606030504020204" pitchFamily="34" charset="0"/>
-                <a:hlinkClick r:id="rId4">
-                  <a:extLst>
-                    <a:ext uri="{A12FA001-AC4F-418D-AE19-62706E023703}">
-                      <ahyp:hlinkClr xmlns:ahyp="http://schemas.microsoft.com/office/drawing/2018/hyperlinkcolor" val="tx"/>
-                    </a:ext>
-                  </a:extLst>
-                </a:hlinkClick>
-              </a:rPr>
-              <a:t>https://github.com/jeff-adkisson/swe-3643-spring-2024/blob/master/project/README.md#languages-web-server-architectures-and-test-runners</a:t>
-            </a:r>
-            <a:r>
-              <a:rPr lang="en-US" sz="1400" dirty="0">
-                <a:solidFill>
-                  <a:schemeClr val="tx1">
-                    <a:lumMod val="85000"/>
-                  </a:schemeClr>
-                </a:solidFill>
-                <a:latin typeface="Open Sans" panose="020B0606030504020204" pitchFamily="34" charset="0"/>
-                <a:ea typeface="Open Sans" panose="020B0606030504020204" pitchFamily="34" charset="0"/>
-                <a:cs typeface="Open Sans" panose="020B0606030504020204" pitchFamily="34" charset="0"/>
-              </a:rPr>
-              <a:t> </a:t>
-            </a:r>
-            <a:endParaRPr lang="en-US" sz="1400" i="1" dirty="0">
-              <a:solidFill>
-                <a:schemeClr val="tx1">
-                  <a:lumMod val="85000"/>
-                </a:schemeClr>
-              </a:solidFill>
-              <a:latin typeface="Open Sans" panose="020B0606030504020204" pitchFamily="34" charset="0"/>
-              <a:ea typeface="Open Sans" panose="020B0606030504020204" pitchFamily="34" charset="0"/>
-              <a:cs typeface="Open Sans" panose="020B0606030504020204" pitchFamily="34" charset="0"/>
-            </a:endParaRPr>
-          </a:p>
-          <a:p>
-            <a:pPr marL="0" indent="0">
-              <a:buNone/>
-            </a:pPr>
-            <a:endParaRPr lang="en-US" dirty="0">
-              <a:solidFill>
-                <a:schemeClr val="tx1">
-                  <a:lumMod val="85000"/>
-                </a:schemeClr>
-              </a:solidFill>
-              <a:latin typeface="Open Sans" panose="020B0606030504020204" pitchFamily="34" charset="0"/>
-              <a:ea typeface="Open Sans" panose="020B0606030504020204" pitchFamily="34" charset="0"/>
-              <a:cs typeface="Open Sans" panose="020B0606030504020204" pitchFamily="34" charset="0"/>
-            </a:endParaRPr>
-          </a:p>
-        </p:txBody>
-      </p:sp>
-      <p:sp>
-        <p:nvSpPr>
-          <p:cNvPr id="4" name="Content Placeholder 3">
-            <a:extLst>
-              <a:ext uri="{FF2B5EF4-FFF2-40B4-BE49-F238E27FC236}">
-                <a16:creationId xmlns:a16="http://schemas.microsoft.com/office/drawing/2014/main" id="{1EF0F6A5-9B6E-50CC-CFA4-5ED5BF5D7DFB}"/>
-              </a:ext>
-            </a:extLst>
-          </p:cNvPr>
-          <p:cNvSpPr>
-            <a:spLocks noGrp="1"/>
-          </p:cNvSpPr>
-          <p:nvPr>
-            <p:ph sz="half" idx="2"/>
-          </p:nvPr>
-        </p:nvSpPr>
-        <p:spPr/>
-        <p:txBody>
-          <a:bodyPr anchor="t">
-            <a:normAutofit fontScale="92500" lnSpcReduction="20000"/>
-          </a:bodyPr>
-          <a:lstStyle/>
-          <a:p>
-            <a:pPr marL="342900" indent="-342900">
-              <a:buFont typeface="+mj-lt"/>
-              <a:buAutoNum type="arabicPeriod" startAt="4"/>
-            </a:pPr>
-            <a:r>
-              <a:rPr lang="en-US" dirty="0">
-                <a:solidFill>
-                  <a:schemeClr val="tx1">
-                    <a:lumMod val="85000"/>
-                  </a:schemeClr>
-                </a:solidFill>
-                <a:latin typeface="Open Sans" panose="020B0606030504020204" pitchFamily="34" charset="0"/>
-                <a:ea typeface="Open Sans" panose="020B0606030504020204" pitchFamily="34" charset="0"/>
-                <a:cs typeface="Open Sans" panose="020B0606030504020204" pitchFamily="34" charset="0"/>
-              </a:rPr>
-              <a:t>Start coding. Ask questions at every lecture.</a:t>
-            </a:r>
-          </a:p>
-          <a:p>
-            <a:pPr marL="342900" indent="-342900">
-              <a:buFont typeface="+mj-lt"/>
-              <a:buAutoNum type="arabicPeriod" startAt="4"/>
-            </a:pPr>
-            <a:r>
-              <a:rPr lang="en-US" i="0" u="none" strike="noStrike" dirty="0">
-                <a:solidFill>
-                  <a:schemeClr val="tx1">
-                    <a:lumMod val="85000"/>
-                  </a:schemeClr>
-                </a:solidFill>
-                <a:effectLst/>
-                <a:latin typeface="Open Sans" panose="020B0606030504020204" pitchFamily="34" charset="0"/>
-                <a:ea typeface="Open Sans" panose="020B0606030504020204" pitchFamily="34" charset="0"/>
-                <a:cs typeface="Open Sans" panose="020B0606030504020204" pitchFamily="34" charset="0"/>
-              </a:rPr>
-              <a:t>Submit your </a:t>
-            </a:r>
-            <a:r>
-              <a:rPr lang="en-US" dirty="0">
-                <a:solidFill>
-                  <a:schemeClr val="tx1">
-                    <a:lumMod val="85000"/>
-                  </a:schemeClr>
-                </a:solidFill>
-                <a:latin typeface="Open Sans" panose="020B0606030504020204" pitchFamily="34" charset="0"/>
-                <a:ea typeface="Open Sans" panose="020B0606030504020204" pitchFamily="34" charset="0"/>
-                <a:cs typeface="Open Sans" panose="020B0606030504020204" pitchFamily="34" charset="0"/>
-              </a:rPr>
-              <a:t>Progress Reports via D2L.</a:t>
-            </a:r>
-          </a:p>
-          <a:p>
-            <a:pPr lvl="1"/>
-            <a:r>
-              <a:rPr lang="en-US" i="0" u="none" strike="noStrike" dirty="0">
-                <a:solidFill>
-                  <a:schemeClr val="tx1">
-                    <a:lumMod val="85000"/>
-                  </a:schemeClr>
-                </a:solidFill>
-                <a:effectLst/>
-                <a:latin typeface="Open Sans" panose="020B0606030504020204" pitchFamily="34" charset="0"/>
-                <a:ea typeface="Open Sans" panose="020B0606030504020204" pitchFamily="34" charset="0"/>
-                <a:cs typeface="Open Sans" panose="020B0606030504020204" pitchFamily="34" charset="0"/>
-              </a:rPr>
-              <a:t>Progress Report 1 - Monday 3/18 </a:t>
-            </a:r>
-            <a:br>
-              <a:rPr lang="en-US" i="0" u="none" strike="noStrike" dirty="0">
-                <a:solidFill>
-                  <a:schemeClr val="tx1">
-                    <a:lumMod val="85000"/>
-                  </a:schemeClr>
-                </a:solidFill>
-                <a:effectLst/>
-                <a:latin typeface="Open Sans" panose="020B0606030504020204" pitchFamily="34" charset="0"/>
-                <a:ea typeface="Open Sans" panose="020B0606030504020204" pitchFamily="34" charset="0"/>
-                <a:cs typeface="Open Sans" panose="020B0606030504020204" pitchFamily="34" charset="0"/>
-              </a:rPr>
-            </a:br>
-            <a:br>
-              <a:rPr lang="en-US" sz="500" i="0" u="none" strike="noStrike" dirty="0">
-                <a:solidFill>
-                  <a:schemeClr val="tx1">
-                    <a:lumMod val="85000"/>
-                  </a:schemeClr>
-                </a:solidFill>
-                <a:effectLst/>
-                <a:latin typeface="Open Sans" panose="020B0606030504020204" pitchFamily="34" charset="0"/>
-                <a:ea typeface="Open Sans" panose="020B0606030504020204" pitchFamily="34" charset="0"/>
-                <a:cs typeface="Open Sans" panose="020B0606030504020204" pitchFamily="34" charset="0"/>
-              </a:rPr>
-            </a:br>
-            <a:r>
-              <a:rPr lang="en-US" sz="900" i="1" u="none" strike="noStrike" dirty="0">
-                <a:solidFill>
-                  <a:schemeClr val="tx1">
-                    <a:lumMod val="85000"/>
-                  </a:schemeClr>
-                </a:solidFill>
-                <a:effectLst/>
-                <a:latin typeface="Open Sans" panose="020B0606030504020204" pitchFamily="34" charset="0"/>
-                <a:ea typeface="Open Sans" panose="020B0606030504020204" pitchFamily="34" charset="0"/>
-                <a:cs typeface="Open Sans" panose="020B0606030504020204" pitchFamily="34" charset="0"/>
-              </a:rPr>
-              <a:t>I recommend having your web application fully operational by this point.</a:t>
-            </a:r>
-          </a:p>
-          <a:p>
-            <a:pPr lvl="1"/>
-            <a:r>
-              <a:rPr lang="en-US" i="0" u="none" strike="noStrike" dirty="0">
-                <a:solidFill>
-                  <a:schemeClr val="tx1">
-                    <a:lumMod val="85000"/>
-                  </a:schemeClr>
-                </a:solidFill>
-                <a:effectLst/>
-                <a:latin typeface="Open Sans" panose="020B0606030504020204" pitchFamily="34" charset="0"/>
-                <a:ea typeface="Open Sans" panose="020B0606030504020204" pitchFamily="34" charset="0"/>
-                <a:cs typeface="Open Sans" panose="020B0606030504020204" pitchFamily="34" charset="0"/>
-              </a:rPr>
-              <a:t>Progress Report 2 - Monday 4/15 </a:t>
-            </a:r>
-            <a:br>
-              <a:rPr lang="en-US" i="0" u="none" strike="noStrike" dirty="0">
-                <a:solidFill>
-                  <a:schemeClr val="tx1">
-                    <a:lumMod val="85000"/>
-                  </a:schemeClr>
-                </a:solidFill>
-                <a:effectLst/>
-                <a:latin typeface="Open Sans" panose="020B0606030504020204" pitchFamily="34" charset="0"/>
-                <a:ea typeface="Open Sans" panose="020B0606030504020204" pitchFamily="34" charset="0"/>
-                <a:cs typeface="Open Sans" panose="020B0606030504020204" pitchFamily="34" charset="0"/>
-              </a:rPr>
-            </a:br>
-            <a:br>
-              <a:rPr lang="en-US" sz="600" i="0" u="none" strike="noStrike" dirty="0">
-                <a:solidFill>
-                  <a:schemeClr val="tx1">
-                    <a:lumMod val="85000"/>
-                  </a:schemeClr>
-                </a:solidFill>
-                <a:effectLst/>
-                <a:latin typeface="Open Sans" panose="020B0606030504020204" pitchFamily="34" charset="0"/>
-                <a:ea typeface="Open Sans" panose="020B0606030504020204" pitchFamily="34" charset="0"/>
-                <a:cs typeface="Open Sans" panose="020B0606030504020204" pitchFamily="34" charset="0"/>
-              </a:rPr>
-            </a:br>
-            <a:r>
-              <a:rPr lang="en-US" sz="900" i="1" u="none" strike="noStrike" dirty="0">
-                <a:solidFill>
-                  <a:schemeClr val="tx1">
-                    <a:lumMod val="85000"/>
-                  </a:schemeClr>
-                </a:solidFill>
-                <a:effectLst/>
-                <a:latin typeface="Open Sans" panose="020B0606030504020204" pitchFamily="34" charset="0"/>
-                <a:ea typeface="Open Sans" panose="020B0606030504020204" pitchFamily="34" charset="0"/>
-                <a:cs typeface="Open Sans" panose="020B0606030504020204" pitchFamily="34" charset="0"/>
-              </a:rPr>
-              <a:t>I recommend having 100% unit test coverage by this point.</a:t>
-            </a:r>
-          </a:p>
-          <a:p>
-            <a:pPr marL="457200" indent="-457200">
-              <a:buFont typeface="+mj-lt"/>
-              <a:buAutoNum type="arabicPeriod" startAt="4"/>
-            </a:pPr>
-            <a:r>
-              <a:rPr lang="en-US" dirty="0">
-                <a:solidFill>
-                  <a:schemeClr val="tx1">
-                    <a:lumMod val="85000"/>
-                  </a:schemeClr>
-                </a:solidFill>
-                <a:latin typeface="Open Sans" panose="020B0606030504020204" pitchFamily="34" charset="0"/>
-                <a:ea typeface="Open Sans" panose="020B0606030504020204" pitchFamily="34" charset="0"/>
-                <a:cs typeface="Open Sans" panose="020B0606030504020204" pitchFamily="34" charset="0"/>
-              </a:rPr>
-              <a:t>Come to some or all the project workdays at the end of the semester (see Syllabus for dates) if you need help.</a:t>
-            </a:r>
-            <a:br>
-              <a:rPr lang="en-US" dirty="0">
-                <a:solidFill>
-                  <a:schemeClr val="tx1">
-                    <a:lumMod val="85000"/>
-                  </a:schemeClr>
-                </a:solidFill>
-                <a:latin typeface="Open Sans" panose="020B0606030504020204" pitchFamily="34" charset="0"/>
-                <a:ea typeface="Open Sans" panose="020B0606030504020204" pitchFamily="34" charset="0"/>
-                <a:cs typeface="Open Sans" panose="020B0606030504020204" pitchFamily="34" charset="0"/>
-              </a:rPr>
-            </a:br>
-            <a:br>
-              <a:rPr lang="en-US" sz="900" dirty="0">
-                <a:solidFill>
-                  <a:schemeClr val="tx1">
-                    <a:lumMod val="85000"/>
-                  </a:schemeClr>
-                </a:solidFill>
-                <a:latin typeface="Open Sans" panose="020B0606030504020204" pitchFamily="34" charset="0"/>
-                <a:ea typeface="Open Sans" panose="020B0606030504020204" pitchFamily="34" charset="0"/>
-                <a:cs typeface="Open Sans" panose="020B0606030504020204" pitchFamily="34" charset="0"/>
-              </a:rPr>
-            </a:br>
-            <a:r>
-              <a:rPr lang="en-US" sz="900" i="1" dirty="0">
-                <a:solidFill>
-                  <a:schemeClr val="tx1">
-                    <a:lumMod val="85000"/>
-                  </a:schemeClr>
-                </a:solidFill>
-                <a:latin typeface="Open Sans" panose="020B0606030504020204" pitchFamily="34" charset="0"/>
-                <a:ea typeface="Open Sans" panose="020B0606030504020204" pitchFamily="34" charset="0"/>
-                <a:cs typeface="Open Sans" panose="020B0606030504020204" pitchFamily="34" charset="0"/>
-              </a:rPr>
-              <a:t>If you show up with nothing done on these dates, there is not much I can do to help you.</a:t>
-            </a:r>
-          </a:p>
-          <a:p>
-            <a:pPr marL="457200" indent="-457200">
-              <a:buFont typeface="+mj-lt"/>
-              <a:buAutoNum type="arabicPeriod" startAt="4"/>
-            </a:pPr>
-            <a:r>
-              <a:rPr lang="en-US" dirty="0">
-                <a:solidFill>
-                  <a:schemeClr val="tx1">
-                    <a:lumMod val="85000"/>
-                  </a:schemeClr>
-                </a:solidFill>
-                <a:latin typeface="Open Sans" panose="020B0606030504020204" pitchFamily="34" charset="0"/>
-                <a:ea typeface="Open Sans" panose="020B0606030504020204" pitchFamily="34" charset="0"/>
-                <a:cs typeface="Open Sans" panose="020B0606030504020204" pitchFamily="34" charset="0"/>
-              </a:rPr>
-              <a:t>Check-in your completed project to your team GitHub repo by Friday 4/26 at 11:59 PM. All repos will be cloned by the instructor at midnight.</a:t>
-            </a:r>
-            <a:endParaRPr lang="en-US" b="0" u="none" strike="noStrike" dirty="0">
-              <a:solidFill>
-                <a:schemeClr val="tx1">
-                  <a:lumMod val="85000"/>
-                </a:schemeClr>
-              </a:solidFill>
-              <a:effectLst/>
-              <a:latin typeface="Open Sans" panose="020B0606030504020204" pitchFamily="34" charset="0"/>
-              <a:ea typeface="Open Sans" panose="020B0606030504020204" pitchFamily="34" charset="0"/>
-              <a:cs typeface="Open Sans" panose="020B0606030504020204" pitchFamily="34" charset="0"/>
-            </a:endParaRPr>
-          </a:p>
-          <a:p>
-            <a:pPr marL="342900" indent="-342900">
-              <a:buFont typeface="+mj-lt"/>
-              <a:buAutoNum type="arabicPeriod" startAt="4"/>
-            </a:pPr>
-            <a:endParaRPr lang="en-US" dirty="0">
-              <a:solidFill>
-                <a:schemeClr val="tx1">
-                  <a:lumMod val="85000"/>
-                </a:schemeClr>
-              </a:solidFill>
-              <a:latin typeface="Open Sans" panose="020B0606030504020204" pitchFamily="34" charset="0"/>
-              <a:ea typeface="Open Sans" panose="020B0606030504020204" pitchFamily="34" charset="0"/>
-              <a:cs typeface="Open Sans" panose="020B0606030504020204" pitchFamily="34" charset="0"/>
-            </a:endParaRPr>
-          </a:p>
-        </p:txBody>
-      </p:sp>
-    </p:spTree>
-    <p:extLst>
-      <p:ext uri="{BB962C8B-B14F-4D97-AF65-F5344CB8AC3E}">
-        <p14:creationId xmlns:p14="http://schemas.microsoft.com/office/powerpoint/2010/main" val="1952613273"/>
       </p:ext>
     </p:extLst>
   </p:cSld>
@@ -16189,6 +15779,719 @@
     <p:extLst>
       <p:ext uri="{BB962C8B-B14F-4D97-AF65-F5344CB8AC3E}">
         <p14:creationId xmlns:p14="http://schemas.microsoft.com/office/powerpoint/2010/main" val="1608710383"/>
+      </p:ext>
+    </p:extLst>
+  </p:cSld>
+  <p:clrMapOvr>
+    <a:masterClrMapping/>
+  </p:clrMapOvr>
+</p:sld>
+</file>
+
+<file path=ppt/slides/slide30.xml><?xml version="1.0" encoding="utf-8"?>
+<p:sld xmlns:a="http://schemas.openxmlformats.org/drawingml/2006/main" xmlns:r="http://schemas.openxmlformats.org/officeDocument/2006/relationships" xmlns:p="http://schemas.openxmlformats.org/presentationml/2006/main">
+  <p:cSld>
+    <p:spTree>
+      <p:nvGrpSpPr>
+        <p:cNvPr id="1" name=""/>
+        <p:cNvGrpSpPr/>
+        <p:nvPr/>
+      </p:nvGrpSpPr>
+      <p:grpSpPr>
+        <a:xfrm>
+          <a:off x="0" y="0"/>
+          <a:ext cx="0" cy="0"/>
+          <a:chOff x="0" y="0"/>
+          <a:chExt cx="0" cy="0"/>
+        </a:xfrm>
+      </p:grpSpPr>
+      <p:sp>
+        <p:nvSpPr>
+          <p:cNvPr id="2" name="Title 1">
+            <a:extLst>
+              <a:ext uri="{FF2B5EF4-FFF2-40B4-BE49-F238E27FC236}">
+                <a16:creationId xmlns:a16="http://schemas.microsoft.com/office/drawing/2014/main" id="{905921E9-AFAF-E626-1743-5CF51A573594}"/>
+              </a:ext>
+            </a:extLst>
+          </p:cNvPr>
+          <p:cNvSpPr>
+            <a:spLocks noGrp="1"/>
+          </p:cNvSpPr>
+          <p:nvPr>
+            <p:ph type="title"/>
+          </p:nvPr>
+        </p:nvSpPr>
+        <p:spPr/>
+        <p:txBody>
+          <a:bodyPr/>
+          <a:lstStyle/>
+          <a:p>
+            <a:r>
+              <a:rPr lang="en-US" dirty="0"/>
+              <a:t>Get started immediately</a:t>
+            </a:r>
+          </a:p>
+        </p:txBody>
+      </p:sp>
+      <p:sp>
+        <p:nvSpPr>
+          <p:cNvPr id="3" name="Content Placeholder 2">
+            <a:extLst>
+              <a:ext uri="{FF2B5EF4-FFF2-40B4-BE49-F238E27FC236}">
+                <a16:creationId xmlns:a16="http://schemas.microsoft.com/office/drawing/2014/main" id="{7877A184-0C0F-2B9B-B359-19EAB605AD14}"/>
+              </a:ext>
+            </a:extLst>
+          </p:cNvPr>
+          <p:cNvSpPr>
+            <a:spLocks noGrp="1"/>
+          </p:cNvSpPr>
+          <p:nvPr>
+            <p:ph sz="half" idx="1"/>
+          </p:nvPr>
+        </p:nvSpPr>
+        <p:spPr/>
+        <p:txBody>
+          <a:bodyPr anchor="t">
+            <a:normAutofit fontScale="92500" lnSpcReduction="20000"/>
+          </a:bodyPr>
+          <a:lstStyle/>
+          <a:p>
+            <a:pPr marL="342900" indent="-342900">
+              <a:buFont typeface="+mj-lt"/>
+              <a:buAutoNum type="arabicPeriod"/>
+            </a:pPr>
+            <a:r>
+              <a:rPr lang="en-US" dirty="0">
+                <a:solidFill>
+                  <a:schemeClr val="tx1">
+                    <a:lumMod val="85000"/>
+                  </a:schemeClr>
+                </a:solidFill>
+                <a:latin typeface="Open Sans" panose="020B0606030504020204" pitchFamily="34" charset="0"/>
+                <a:ea typeface="Open Sans" panose="020B0606030504020204" pitchFamily="34" charset="0"/>
+                <a:cs typeface="Open Sans" panose="020B0606030504020204" pitchFamily="34" charset="0"/>
+              </a:rPr>
+              <a:t>Pick your team and submit your team members and GitHub repository URL to the project spreadsheet by Thursday, February 8</a:t>
+            </a:r>
+            <a:r>
+              <a:rPr lang="en-US" baseline="30000" dirty="0">
+                <a:solidFill>
+                  <a:schemeClr val="tx1">
+                    <a:lumMod val="85000"/>
+                  </a:schemeClr>
+                </a:solidFill>
+                <a:latin typeface="Open Sans" panose="020B0606030504020204" pitchFamily="34" charset="0"/>
+                <a:ea typeface="Open Sans" panose="020B0606030504020204" pitchFamily="34" charset="0"/>
+                <a:cs typeface="Open Sans" panose="020B0606030504020204" pitchFamily="34" charset="0"/>
+              </a:rPr>
+              <a:t>th</a:t>
+            </a:r>
+            <a:r>
+              <a:rPr lang="en-US" dirty="0">
+                <a:solidFill>
+                  <a:schemeClr val="tx1">
+                    <a:lumMod val="85000"/>
+                  </a:schemeClr>
+                </a:solidFill>
+                <a:latin typeface="Open Sans" panose="020B0606030504020204" pitchFamily="34" charset="0"/>
+                <a:ea typeface="Open Sans" panose="020B0606030504020204" pitchFamily="34" charset="0"/>
+                <a:cs typeface="Open Sans" panose="020B0606030504020204" pitchFamily="34" charset="0"/>
+              </a:rPr>
+              <a:t>.</a:t>
+            </a:r>
+            <a:br>
+              <a:rPr lang="en-US" dirty="0">
+                <a:solidFill>
+                  <a:schemeClr val="tx1">
+                    <a:lumMod val="85000"/>
+                  </a:schemeClr>
+                </a:solidFill>
+                <a:latin typeface="Open Sans" panose="020B0606030504020204" pitchFamily="34" charset="0"/>
+                <a:ea typeface="Open Sans" panose="020B0606030504020204" pitchFamily="34" charset="0"/>
+                <a:cs typeface="Open Sans" panose="020B0606030504020204" pitchFamily="34" charset="0"/>
+              </a:rPr>
+            </a:br>
+            <a:br>
+              <a:rPr lang="en-US" sz="1400" dirty="0">
+                <a:solidFill>
+                  <a:schemeClr val="tx1">
+                    <a:lumMod val="85000"/>
+                  </a:schemeClr>
+                </a:solidFill>
+                <a:latin typeface="Open Sans" panose="020B0606030504020204" pitchFamily="34" charset="0"/>
+                <a:ea typeface="Open Sans" panose="020B0606030504020204" pitchFamily="34" charset="0"/>
+                <a:cs typeface="Open Sans" panose="020B0606030504020204" pitchFamily="34" charset="0"/>
+              </a:rPr>
+            </a:br>
+            <a:r>
+              <a:rPr lang="en-US" sz="1400" dirty="0">
+                <a:solidFill>
+                  <a:schemeClr val="tx1">
+                    <a:lumMod val="85000"/>
+                  </a:schemeClr>
+                </a:solidFill>
+                <a:latin typeface="Open Sans" panose="020B0606030504020204" pitchFamily="34" charset="0"/>
+                <a:ea typeface="Open Sans" panose="020B0606030504020204" pitchFamily="34" charset="0"/>
+                <a:cs typeface="Open Sans" panose="020B0606030504020204" pitchFamily="34" charset="0"/>
+                <a:hlinkClick r:id="rId2">
+                  <a:extLst>
+                    <a:ext uri="{A12FA001-AC4F-418D-AE19-62706E023703}">
+                      <ahyp:hlinkClr xmlns:ahyp="http://schemas.microsoft.com/office/drawing/2018/hyperlinkcolor" val="tx"/>
+                    </a:ext>
+                  </a:extLst>
+                </a:hlinkClick>
+              </a:rPr>
+              <a:t>https://shorturl.at/eAOSW</a:t>
+            </a:r>
+            <a:r>
+              <a:rPr lang="en-US" sz="1400" dirty="0">
+                <a:solidFill>
+                  <a:schemeClr val="tx1">
+                    <a:lumMod val="85000"/>
+                  </a:schemeClr>
+                </a:solidFill>
+                <a:latin typeface="Open Sans" panose="020B0606030504020204" pitchFamily="34" charset="0"/>
+                <a:ea typeface="Open Sans" panose="020B0606030504020204" pitchFamily="34" charset="0"/>
+                <a:cs typeface="Open Sans" panose="020B0606030504020204" pitchFamily="34" charset="0"/>
+              </a:rPr>
+              <a:t> </a:t>
+            </a:r>
+            <a:br>
+              <a:rPr lang="en-US" dirty="0">
+                <a:solidFill>
+                  <a:schemeClr val="tx1">
+                    <a:lumMod val="85000"/>
+                  </a:schemeClr>
+                </a:solidFill>
+                <a:latin typeface="Open Sans" panose="020B0606030504020204" pitchFamily="34" charset="0"/>
+                <a:ea typeface="Open Sans" panose="020B0606030504020204" pitchFamily="34" charset="0"/>
+                <a:cs typeface="Open Sans" panose="020B0606030504020204" pitchFamily="34" charset="0"/>
+              </a:rPr>
+            </a:br>
+            <a:br>
+              <a:rPr lang="en-US" dirty="0">
+                <a:solidFill>
+                  <a:schemeClr val="tx1">
+                    <a:lumMod val="85000"/>
+                  </a:schemeClr>
+                </a:solidFill>
+                <a:latin typeface="Open Sans" panose="020B0606030504020204" pitchFamily="34" charset="0"/>
+                <a:ea typeface="Open Sans" panose="020B0606030504020204" pitchFamily="34" charset="0"/>
+                <a:cs typeface="Open Sans" panose="020B0606030504020204" pitchFamily="34" charset="0"/>
+              </a:rPr>
+            </a:br>
+            <a:r>
+              <a:rPr lang="en-US" sz="1200" i="1" dirty="0">
+                <a:solidFill>
+                  <a:schemeClr val="tx1">
+                    <a:lumMod val="85000"/>
+                  </a:schemeClr>
+                </a:solidFill>
+                <a:latin typeface="Open Sans" panose="020B0606030504020204" pitchFamily="34" charset="0"/>
+                <a:ea typeface="Open Sans" panose="020B0606030504020204" pitchFamily="34" charset="0"/>
+                <a:cs typeface="Open Sans" panose="020B0606030504020204" pitchFamily="34" charset="0"/>
+              </a:rPr>
+              <a:t>* This is your first project grade. Do not miss this date.</a:t>
+            </a:r>
+          </a:p>
+          <a:p>
+            <a:pPr marL="342900" indent="-342900">
+              <a:buFont typeface="+mj-lt"/>
+              <a:buAutoNum type="arabicPeriod"/>
+            </a:pPr>
+            <a:r>
+              <a:rPr lang="en-US" dirty="0">
+                <a:solidFill>
+                  <a:schemeClr val="tx1">
+                    <a:lumMod val="85000"/>
+                  </a:schemeClr>
+                </a:solidFill>
+                <a:latin typeface="Open Sans" panose="020B0606030504020204" pitchFamily="34" charset="0"/>
+                <a:ea typeface="Open Sans" panose="020B0606030504020204" pitchFamily="34" charset="0"/>
+                <a:cs typeface="Open Sans" panose="020B0606030504020204" pitchFamily="34" charset="0"/>
+              </a:rPr>
+              <a:t>Read the </a:t>
+            </a:r>
+            <a:r>
+              <a:rPr lang="en-US" b="1" dirty="0">
+                <a:solidFill>
+                  <a:schemeClr val="tx1">
+                    <a:lumMod val="85000"/>
+                  </a:schemeClr>
+                </a:solidFill>
+                <a:latin typeface="Open Sans" panose="020B0606030504020204" pitchFamily="34" charset="0"/>
+                <a:ea typeface="Open Sans" panose="020B0606030504020204" pitchFamily="34" charset="0"/>
+                <a:cs typeface="Open Sans" panose="020B0606030504020204" pitchFamily="34" charset="0"/>
+              </a:rPr>
+              <a:t>Project Documentation </a:t>
+            </a:r>
+            <a:r>
+              <a:rPr lang="en-US" dirty="0">
+                <a:solidFill>
+                  <a:schemeClr val="tx1">
+                    <a:lumMod val="85000"/>
+                  </a:schemeClr>
+                </a:solidFill>
+                <a:latin typeface="Open Sans" panose="020B0606030504020204" pitchFamily="34" charset="0"/>
+                <a:ea typeface="Open Sans" panose="020B0606030504020204" pitchFamily="34" charset="0"/>
+                <a:cs typeface="Open Sans" panose="020B0606030504020204" pitchFamily="34" charset="0"/>
+              </a:rPr>
+              <a:t>thoroughly.</a:t>
+            </a:r>
+            <a:br>
+              <a:rPr lang="en-US" dirty="0">
+                <a:solidFill>
+                  <a:schemeClr val="tx1">
+                    <a:lumMod val="85000"/>
+                  </a:schemeClr>
+                </a:solidFill>
+                <a:latin typeface="Open Sans" panose="020B0606030504020204" pitchFamily="34" charset="0"/>
+                <a:ea typeface="Open Sans" panose="020B0606030504020204" pitchFamily="34" charset="0"/>
+                <a:cs typeface="Open Sans" panose="020B0606030504020204" pitchFamily="34" charset="0"/>
+              </a:rPr>
+            </a:br>
+            <a:br>
+              <a:rPr lang="en-US" sz="900" dirty="0">
+                <a:solidFill>
+                  <a:schemeClr val="tx1">
+                    <a:lumMod val="85000"/>
+                  </a:schemeClr>
+                </a:solidFill>
+                <a:latin typeface="Open Sans" panose="020B0606030504020204" pitchFamily="34" charset="0"/>
+                <a:ea typeface="Open Sans" panose="020B0606030504020204" pitchFamily="34" charset="0"/>
+                <a:cs typeface="Open Sans" panose="020B0606030504020204" pitchFamily="34" charset="0"/>
+              </a:rPr>
+            </a:br>
+            <a:r>
+              <a:rPr lang="en-US" sz="1400" dirty="0">
+                <a:solidFill>
+                  <a:schemeClr val="tx1">
+                    <a:lumMod val="85000"/>
+                  </a:schemeClr>
+                </a:solidFill>
+                <a:latin typeface="Open Sans" panose="020B0606030504020204" pitchFamily="34" charset="0"/>
+                <a:ea typeface="Open Sans" panose="020B0606030504020204" pitchFamily="34" charset="0"/>
+                <a:cs typeface="Open Sans" panose="020B0606030504020204" pitchFamily="34" charset="0"/>
+                <a:hlinkClick r:id="rId3">
+                  <a:extLst>
+                    <a:ext uri="{A12FA001-AC4F-418D-AE19-62706E023703}">
+                      <ahyp:hlinkClr xmlns:ahyp="http://schemas.microsoft.com/office/drawing/2018/hyperlinkcolor" val="tx"/>
+                    </a:ext>
+                  </a:extLst>
+                </a:hlinkClick>
+              </a:rPr>
+              <a:t>https://github.com/jeff-adkisson/swe-3643-spring-2024/blob/master/project/README.md</a:t>
+            </a:r>
+            <a:endParaRPr lang="en-US" sz="1400" dirty="0">
+              <a:solidFill>
+                <a:schemeClr val="tx1">
+                  <a:lumMod val="85000"/>
+                </a:schemeClr>
+              </a:solidFill>
+              <a:latin typeface="Open Sans" panose="020B0606030504020204" pitchFamily="34" charset="0"/>
+              <a:ea typeface="Open Sans" panose="020B0606030504020204" pitchFamily="34" charset="0"/>
+              <a:cs typeface="Open Sans" panose="020B0606030504020204" pitchFamily="34" charset="0"/>
+            </a:endParaRPr>
+          </a:p>
+          <a:p>
+            <a:pPr marL="342900" indent="-342900">
+              <a:buFont typeface="+mj-lt"/>
+              <a:buAutoNum type="arabicPeriod"/>
+            </a:pPr>
+            <a:r>
+              <a:rPr lang="en-US" dirty="0">
+                <a:solidFill>
+                  <a:schemeClr val="tx1">
+                    <a:lumMod val="85000"/>
+                  </a:schemeClr>
+                </a:solidFill>
+                <a:latin typeface="Open Sans" panose="020B0606030504020204" pitchFamily="34" charset="0"/>
+                <a:ea typeface="Open Sans" panose="020B0606030504020204" pitchFamily="34" charset="0"/>
+                <a:cs typeface="Open Sans" panose="020B0606030504020204" pitchFamily="34" charset="0"/>
+              </a:rPr>
+              <a:t>Do some research, then pick a language and web server framework from the available choices.</a:t>
+            </a:r>
+            <a:br>
+              <a:rPr lang="en-US" dirty="0">
+                <a:solidFill>
+                  <a:schemeClr val="tx1">
+                    <a:lumMod val="85000"/>
+                  </a:schemeClr>
+                </a:solidFill>
+                <a:latin typeface="Open Sans" panose="020B0606030504020204" pitchFamily="34" charset="0"/>
+                <a:ea typeface="Open Sans" panose="020B0606030504020204" pitchFamily="34" charset="0"/>
+                <a:cs typeface="Open Sans" panose="020B0606030504020204" pitchFamily="34" charset="0"/>
+              </a:rPr>
+            </a:br>
+            <a:br>
+              <a:rPr lang="en-US" sz="900" dirty="0">
+                <a:solidFill>
+                  <a:schemeClr val="tx1">
+                    <a:lumMod val="85000"/>
+                  </a:schemeClr>
+                </a:solidFill>
+                <a:latin typeface="Open Sans" panose="020B0606030504020204" pitchFamily="34" charset="0"/>
+                <a:ea typeface="Open Sans" panose="020B0606030504020204" pitchFamily="34" charset="0"/>
+                <a:cs typeface="Open Sans" panose="020B0606030504020204" pitchFamily="34" charset="0"/>
+              </a:rPr>
+            </a:br>
+            <a:r>
+              <a:rPr lang="en-US" sz="1400" dirty="0">
+                <a:solidFill>
+                  <a:schemeClr val="tx1">
+                    <a:lumMod val="85000"/>
+                  </a:schemeClr>
+                </a:solidFill>
+                <a:latin typeface="Open Sans" panose="020B0606030504020204" pitchFamily="34" charset="0"/>
+                <a:ea typeface="Open Sans" panose="020B0606030504020204" pitchFamily="34" charset="0"/>
+                <a:cs typeface="Open Sans" panose="020B0606030504020204" pitchFamily="34" charset="0"/>
+                <a:hlinkClick r:id="rId4">
+                  <a:extLst>
+                    <a:ext uri="{A12FA001-AC4F-418D-AE19-62706E023703}">
+                      <ahyp:hlinkClr xmlns:ahyp="http://schemas.microsoft.com/office/drawing/2018/hyperlinkcolor" val="tx"/>
+                    </a:ext>
+                  </a:extLst>
+                </a:hlinkClick>
+              </a:rPr>
+              <a:t>https://github.com/jeff-adkisson/swe-3643-spring-2024/blob/master/project/README.md#languages-web-server-architectures-and-test-runners</a:t>
+            </a:r>
+            <a:r>
+              <a:rPr lang="en-US" sz="1400" dirty="0">
+                <a:solidFill>
+                  <a:schemeClr val="tx1">
+                    <a:lumMod val="85000"/>
+                  </a:schemeClr>
+                </a:solidFill>
+                <a:latin typeface="Open Sans" panose="020B0606030504020204" pitchFamily="34" charset="0"/>
+                <a:ea typeface="Open Sans" panose="020B0606030504020204" pitchFamily="34" charset="0"/>
+                <a:cs typeface="Open Sans" panose="020B0606030504020204" pitchFamily="34" charset="0"/>
+              </a:rPr>
+              <a:t> </a:t>
+            </a:r>
+            <a:endParaRPr lang="en-US" sz="1400" i="1" dirty="0">
+              <a:solidFill>
+                <a:schemeClr val="tx1">
+                  <a:lumMod val="85000"/>
+                </a:schemeClr>
+              </a:solidFill>
+              <a:latin typeface="Open Sans" panose="020B0606030504020204" pitchFamily="34" charset="0"/>
+              <a:ea typeface="Open Sans" panose="020B0606030504020204" pitchFamily="34" charset="0"/>
+              <a:cs typeface="Open Sans" panose="020B0606030504020204" pitchFamily="34" charset="0"/>
+            </a:endParaRPr>
+          </a:p>
+          <a:p>
+            <a:pPr marL="0" indent="0">
+              <a:buNone/>
+            </a:pPr>
+            <a:endParaRPr lang="en-US" dirty="0">
+              <a:solidFill>
+                <a:schemeClr val="tx1">
+                  <a:lumMod val="85000"/>
+                </a:schemeClr>
+              </a:solidFill>
+              <a:latin typeface="Open Sans" panose="020B0606030504020204" pitchFamily="34" charset="0"/>
+              <a:ea typeface="Open Sans" panose="020B0606030504020204" pitchFamily="34" charset="0"/>
+              <a:cs typeface="Open Sans" panose="020B0606030504020204" pitchFamily="34" charset="0"/>
+            </a:endParaRPr>
+          </a:p>
+        </p:txBody>
+      </p:sp>
+      <p:sp>
+        <p:nvSpPr>
+          <p:cNvPr id="4" name="Content Placeholder 3">
+            <a:extLst>
+              <a:ext uri="{FF2B5EF4-FFF2-40B4-BE49-F238E27FC236}">
+                <a16:creationId xmlns:a16="http://schemas.microsoft.com/office/drawing/2014/main" id="{1EF0F6A5-9B6E-50CC-CFA4-5ED5BF5D7DFB}"/>
+              </a:ext>
+            </a:extLst>
+          </p:cNvPr>
+          <p:cNvSpPr>
+            <a:spLocks noGrp="1"/>
+          </p:cNvSpPr>
+          <p:nvPr>
+            <p:ph sz="half" idx="2"/>
+          </p:nvPr>
+        </p:nvSpPr>
+        <p:spPr/>
+        <p:txBody>
+          <a:bodyPr anchor="t">
+            <a:normAutofit fontScale="92500" lnSpcReduction="20000"/>
+          </a:bodyPr>
+          <a:lstStyle/>
+          <a:p>
+            <a:pPr marL="342900" indent="-342900">
+              <a:buFont typeface="+mj-lt"/>
+              <a:buAutoNum type="arabicPeriod" startAt="4"/>
+            </a:pPr>
+            <a:r>
+              <a:rPr lang="en-US" dirty="0">
+                <a:solidFill>
+                  <a:schemeClr val="tx1">
+                    <a:lumMod val="85000"/>
+                  </a:schemeClr>
+                </a:solidFill>
+                <a:latin typeface="Open Sans" panose="020B0606030504020204" pitchFamily="34" charset="0"/>
+                <a:ea typeface="Open Sans" panose="020B0606030504020204" pitchFamily="34" charset="0"/>
+                <a:cs typeface="Open Sans" panose="020B0606030504020204" pitchFamily="34" charset="0"/>
+              </a:rPr>
+              <a:t>Start coding. Ask questions at every lecture.</a:t>
+            </a:r>
+          </a:p>
+          <a:p>
+            <a:pPr marL="342900" indent="-342900">
+              <a:buFont typeface="+mj-lt"/>
+              <a:buAutoNum type="arabicPeriod" startAt="4"/>
+            </a:pPr>
+            <a:r>
+              <a:rPr lang="en-US" i="0" u="none" strike="noStrike" dirty="0">
+                <a:solidFill>
+                  <a:schemeClr val="tx1">
+                    <a:lumMod val="85000"/>
+                  </a:schemeClr>
+                </a:solidFill>
+                <a:effectLst/>
+                <a:latin typeface="Open Sans" panose="020B0606030504020204" pitchFamily="34" charset="0"/>
+                <a:ea typeface="Open Sans" panose="020B0606030504020204" pitchFamily="34" charset="0"/>
+                <a:cs typeface="Open Sans" panose="020B0606030504020204" pitchFamily="34" charset="0"/>
+              </a:rPr>
+              <a:t>Submit your </a:t>
+            </a:r>
+            <a:r>
+              <a:rPr lang="en-US" dirty="0">
+                <a:solidFill>
+                  <a:schemeClr val="tx1">
+                    <a:lumMod val="85000"/>
+                  </a:schemeClr>
+                </a:solidFill>
+                <a:latin typeface="Open Sans" panose="020B0606030504020204" pitchFamily="34" charset="0"/>
+                <a:ea typeface="Open Sans" panose="020B0606030504020204" pitchFamily="34" charset="0"/>
+                <a:cs typeface="Open Sans" panose="020B0606030504020204" pitchFamily="34" charset="0"/>
+              </a:rPr>
+              <a:t>Progress Reports via D2L.</a:t>
+            </a:r>
+          </a:p>
+          <a:p>
+            <a:pPr lvl="1"/>
+            <a:r>
+              <a:rPr lang="en-US" i="0" u="none" strike="noStrike" dirty="0">
+                <a:solidFill>
+                  <a:schemeClr val="tx1">
+                    <a:lumMod val="85000"/>
+                  </a:schemeClr>
+                </a:solidFill>
+                <a:effectLst/>
+                <a:latin typeface="Open Sans" panose="020B0606030504020204" pitchFamily="34" charset="0"/>
+                <a:ea typeface="Open Sans" panose="020B0606030504020204" pitchFamily="34" charset="0"/>
+                <a:cs typeface="Open Sans" panose="020B0606030504020204" pitchFamily="34" charset="0"/>
+              </a:rPr>
+              <a:t>Progress Report 1 - Monday 3/18 </a:t>
+            </a:r>
+            <a:br>
+              <a:rPr lang="en-US" i="0" u="none" strike="noStrike" dirty="0">
+                <a:solidFill>
+                  <a:schemeClr val="tx1">
+                    <a:lumMod val="85000"/>
+                  </a:schemeClr>
+                </a:solidFill>
+                <a:effectLst/>
+                <a:latin typeface="Open Sans" panose="020B0606030504020204" pitchFamily="34" charset="0"/>
+                <a:ea typeface="Open Sans" panose="020B0606030504020204" pitchFamily="34" charset="0"/>
+                <a:cs typeface="Open Sans" panose="020B0606030504020204" pitchFamily="34" charset="0"/>
+              </a:rPr>
+            </a:br>
+            <a:br>
+              <a:rPr lang="en-US" sz="500" i="0" u="none" strike="noStrike" dirty="0">
+                <a:solidFill>
+                  <a:schemeClr val="tx1">
+                    <a:lumMod val="85000"/>
+                  </a:schemeClr>
+                </a:solidFill>
+                <a:effectLst/>
+                <a:latin typeface="Open Sans" panose="020B0606030504020204" pitchFamily="34" charset="0"/>
+                <a:ea typeface="Open Sans" panose="020B0606030504020204" pitchFamily="34" charset="0"/>
+                <a:cs typeface="Open Sans" panose="020B0606030504020204" pitchFamily="34" charset="0"/>
+              </a:rPr>
+            </a:br>
+            <a:r>
+              <a:rPr lang="en-US" sz="900" i="1" u="none" strike="noStrike" dirty="0">
+                <a:solidFill>
+                  <a:schemeClr val="tx1">
+                    <a:lumMod val="85000"/>
+                  </a:schemeClr>
+                </a:solidFill>
+                <a:effectLst/>
+                <a:latin typeface="Open Sans" panose="020B0606030504020204" pitchFamily="34" charset="0"/>
+                <a:ea typeface="Open Sans" panose="020B0606030504020204" pitchFamily="34" charset="0"/>
+                <a:cs typeface="Open Sans" panose="020B0606030504020204" pitchFamily="34" charset="0"/>
+              </a:rPr>
+              <a:t>I recommend having your web application fully operational by this point.</a:t>
+            </a:r>
+          </a:p>
+          <a:p>
+            <a:pPr lvl="1"/>
+            <a:r>
+              <a:rPr lang="en-US" i="0" u="none" strike="noStrike" dirty="0">
+                <a:solidFill>
+                  <a:schemeClr val="tx1">
+                    <a:lumMod val="85000"/>
+                  </a:schemeClr>
+                </a:solidFill>
+                <a:effectLst/>
+                <a:latin typeface="Open Sans" panose="020B0606030504020204" pitchFamily="34" charset="0"/>
+                <a:ea typeface="Open Sans" panose="020B0606030504020204" pitchFamily="34" charset="0"/>
+                <a:cs typeface="Open Sans" panose="020B0606030504020204" pitchFamily="34" charset="0"/>
+              </a:rPr>
+              <a:t>Progress Report 2 - Monday 4/15 </a:t>
+            </a:r>
+            <a:br>
+              <a:rPr lang="en-US" i="0" u="none" strike="noStrike" dirty="0">
+                <a:solidFill>
+                  <a:schemeClr val="tx1">
+                    <a:lumMod val="85000"/>
+                  </a:schemeClr>
+                </a:solidFill>
+                <a:effectLst/>
+                <a:latin typeface="Open Sans" panose="020B0606030504020204" pitchFamily="34" charset="0"/>
+                <a:ea typeface="Open Sans" panose="020B0606030504020204" pitchFamily="34" charset="0"/>
+                <a:cs typeface="Open Sans" panose="020B0606030504020204" pitchFamily="34" charset="0"/>
+              </a:rPr>
+            </a:br>
+            <a:br>
+              <a:rPr lang="en-US" sz="600" i="0" u="none" strike="noStrike" dirty="0">
+                <a:solidFill>
+                  <a:schemeClr val="tx1">
+                    <a:lumMod val="85000"/>
+                  </a:schemeClr>
+                </a:solidFill>
+                <a:effectLst/>
+                <a:latin typeface="Open Sans" panose="020B0606030504020204" pitchFamily="34" charset="0"/>
+                <a:ea typeface="Open Sans" panose="020B0606030504020204" pitchFamily="34" charset="0"/>
+                <a:cs typeface="Open Sans" panose="020B0606030504020204" pitchFamily="34" charset="0"/>
+              </a:rPr>
+            </a:br>
+            <a:r>
+              <a:rPr lang="en-US" sz="900" i="1" u="none" strike="noStrike" dirty="0">
+                <a:solidFill>
+                  <a:schemeClr val="tx1">
+                    <a:lumMod val="85000"/>
+                  </a:schemeClr>
+                </a:solidFill>
+                <a:effectLst/>
+                <a:latin typeface="Open Sans" panose="020B0606030504020204" pitchFamily="34" charset="0"/>
+                <a:ea typeface="Open Sans" panose="020B0606030504020204" pitchFamily="34" charset="0"/>
+                <a:cs typeface="Open Sans" panose="020B0606030504020204" pitchFamily="34" charset="0"/>
+              </a:rPr>
+              <a:t>I recommend having 100% unit test coverage by this point.</a:t>
+            </a:r>
+          </a:p>
+          <a:p>
+            <a:pPr marL="457200" indent="-457200">
+              <a:buFont typeface="+mj-lt"/>
+              <a:buAutoNum type="arabicPeriod" startAt="4"/>
+            </a:pPr>
+            <a:r>
+              <a:rPr lang="en-US" dirty="0">
+                <a:solidFill>
+                  <a:schemeClr val="tx1">
+                    <a:lumMod val="85000"/>
+                  </a:schemeClr>
+                </a:solidFill>
+                <a:latin typeface="Open Sans" panose="020B0606030504020204" pitchFamily="34" charset="0"/>
+                <a:ea typeface="Open Sans" panose="020B0606030504020204" pitchFamily="34" charset="0"/>
+                <a:cs typeface="Open Sans" panose="020B0606030504020204" pitchFamily="34" charset="0"/>
+              </a:rPr>
+              <a:t>Come to some or all the project workdays at the end of the semester (see Syllabus for dates) if you need help.</a:t>
+            </a:r>
+            <a:br>
+              <a:rPr lang="en-US" dirty="0">
+                <a:solidFill>
+                  <a:schemeClr val="tx1">
+                    <a:lumMod val="85000"/>
+                  </a:schemeClr>
+                </a:solidFill>
+                <a:latin typeface="Open Sans" panose="020B0606030504020204" pitchFamily="34" charset="0"/>
+                <a:ea typeface="Open Sans" panose="020B0606030504020204" pitchFamily="34" charset="0"/>
+                <a:cs typeface="Open Sans" panose="020B0606030504020204" pitchFamily="34" charset="0"/>
+              </a:rPr>
+            </a:br>
+            <a:br>
+              <a:rPr lang="en-US" sz="900" dirty="0">
+                <a:solidFill>
+                  <a:schemeClr val="tx1">
+                    <a:lumMod val="85000"/>
+                  </a:schemeClr>
+                </a:solidFill>
+                <a:latin typeface="Open Sans" panose="020B0606030504020204" pitchFamily="34" charset="0"/>
+                <a:ea typeface="Open Sans" panose="020B0606030504020204" pitchFamily="34" charset="0"/>
+                <a:cs typeface="Open Sans" panose="020B0606030504020204" pitchFamily="34" charset="0"/>
+              </a:rPr>
+            </a:br>
+            <a:r>
+              <a:rPr lang="en-US" sz="900" i="1" dirty="0">
+                <a:solidFill>
+                  <a:schemeClr val="tx1">
+                    <a:lumMod val="85000"/>
+                  </a:schemeClr>
+                </a:solidFill>
+                <a:latin typeface="Open Sans" panose="020B0606030504020204" pitchFamily="34" charset="0"/>
+                <a:ea typeface="Open Sans" panose="020B0606030504020204" pitchFamily="34" charset="0"/>
+                <a:cs typeface="Open Sans" panose="020B0606030504020204" pitchFamily="34" charset="0"/>
+              </a:rPr>
+              <a:t>If you show up with nothing done on these dates, there is not much I can do to help you.</a:t>
+            </a:r>
+          </a:p>
+          <a:p>
+            <a:pPr marL="457200" indent="-457200">
+              <a:buFont typeface="+mj-lt"/>
+              <a:buAutoNum type="arabicPeriod" startAt="4"/>
+            </a:pPr>
+            <a:r>
+              <a:rPr lang="en-US" dirty="0">
+                <a:solidFill>
+                  <a:schemeClr val="tx1">
+                    <a:lumMod val="85000"/>
+                  </a:schemeClr>
+                </a:solidFill>
+                <a:latin typeface="Open Sans" panose="020B0606030504020204" pitchFamily="34" charset="0"/>
+                <a:ea typeface="Open Sans" panose="020B0606030504020204" pitchFamily="34" charset="0"/>
+                <a:cs typeface="Open Sans" panose="020B0606030504020204" pitchFamily="34" charset="0"/>
+              </a:rPr>
+              <a:t>Check-in your completed project to your team GitHub repo by Friday 4/26 at 11:59 PM. All repos will be cloned by the instructor at midnight.</a:t>
+            </a:r>
+            <a:endParaRPr lang="en-US" b="0" u="none" strike="noStrike" dirty="0">
+              <a:solidFill>
+                <a:schemeClr val="tx1">
+                  <a:lumMod val="85000"/>
+                </a:schemeClr>
+              </a:solidFill>
+              <a:effectLst/>
+              <a:latin typeface="Open Sans" panose="020B0606030504020204" pitchFamily="34" charset="0"/>
+              <a:ea typeface="Open Sans" panose="020B0606030504020204" pitchFamily="34" charset="0"/>
+              <a:cs typeface="Open Sans" panose="020B0606030504020204" pitchFamily="34" charset="0"/>
+            </a:endParaRPr>
+          </a:p>
+          <a:p>
+            <a:pPr marL="342900" indent="-342900">
+              <a:buFont typeface="+mj-lt"/>
+              <a:buAutoNum type="arabicPeriod" startAt="4"/>
+            </a:pPr>
+            <a:endParaRPr lang="en-US" dirty="0">
+              <a:solidFill>
+                <a:schemeClr val="tx1">
+                  <a:lumMod val="85000"/>
+                </a:schemeClr>
+              </a:solidFill>
+              <a:latin typeface="Open Sans" panose="020B0606030504020204" pitchFamily="34" charset="0"/>
+              <a:ea typeface="Open Sans" panose="020B0606030504020204" pitchFamily="34" charset="0"/>
+              <a:cs typeface="Open Sans" panose="020B0606030504020204" pitchFamily="34" charset="0"/>
+            </a:endParaRPr>
+          </a:p>
+        </p:txBody>
+      </p:sp>
+    </p:spTree>
+    <p:extLst>
+      <p:ext uri="{BB962C8B-B14F-4D97-AF65-F5344CB8AC3E}">
+        <p14:creationId xmlns:p14="http://schemas.microsoft.com/office/powerpoint/2010/main" val="1952613273"/>
       </p:ext>
     </p:extLst>
   </p:cSld>
@@ -19605,7 +19908,7 @@
           <p:cNvPr id="2" name="Title 1">
             <a:extLst>
               <a:ext uri="{FF2B5EF4-FFF2-40B4-BE49-F238E27FC236}">
-                <a16:creationId xmlns:a16="http://schemas.microsoft.com/office/drawing/2014/main" id="{849CCA69-BCDF-A430-7E7F-CDD4DFCAA72E}"/>
+                <a16:creationId xmlns:a16="http://schemas.microsoft.com/office/drawing/2014/main" id="{D4CF754A-ADE4-FB62-1295-F0D88985DA9E}"/>
               </a:ext>
             </a:extLst>
           </p:cNvPr>
@@ -19623,17 +19926,17 @@
           <a:p>
             <a:r>
               <a:rPr lang="en-US" dirty="0"/>
-              <a:t>Your development team</a:t>
+              <a:t>Project deliverables</a:t>
             </a:r>
           </a:p>
         </p:txBody>
       </p:sp>
       <p:sp>
         <p:nvSpPr>
-          <p:cNvPr id="3" name="Content Placeholder 2">
+          <p:cNvPr id="4" name="Content Placeholder 3">
             <a:extLst>
               <a:ext uri="{FF2B5EF4-FFF2-40B4-BE49-F238E27FC236}">
-                <a16:creationId xmlns:a16="http://schemas.microsoft.com/office/drawing/2014/main" id="{B95E9312-9D6C-3C8D-EE43-7CDC21DC1CF7}"/>
+                <a16:creationId xmlns:a16="http://schemas.microsoft.com/office/drawing/2014/main" id="{F624F9CB-6F04-A47B-F0FD-F5421DF41F8C}"/>
               </a:ext>
             </a:extLst>
           </p:cNvPr>
@@ -19646,29 +19949,21 @@
         </p:nvSpPr>
         <p:spPr/>
         <p:txBody>
-          <a:bodyPr anchor="t">
-            <a:normAutofit fontScale="92500" lnSpcReduction="20000"/>
-          </a:bodyPr>
+          <a:bodyPr anchor="t"/>
           <a:lstStyle/>
           <a:p>
-            <a:pPr marL="0" indent="0">
-              <a:buNone/>
-            </a:pPr>
-            <a:r>
-              <a:rPr lang="en-US" sz="2600" b="1" i="0" u="none" strike="noStrike" dirty="0">
+            <a:r>
+              <a:rPr lang="en-US" b="0" i="0" u="none" strike="noStrike" dirty="0">
                 <a:solidFill>
                   <a:srgbClr val="B1B4B9"/>
                 </a:solidFill>
                 <a:effectLst/>
                 <a:latin typeface="Open Sans" panose="020B0606030504020204" pitchFamily="34" charset="0"/>
               </a:rPr>
-              <a:t>Team of 1: Work Alone</a:t>
-            </a:r>
-          </a:p>
-          <a:p>
-            <a:pPr marL="0" indent="0">
-              <a:buNone/>
-            </a:pPr>
+              <a:t>Creating a simple web-based calculator that performs basic floating point calculations on single and double operands.</a:t>
+            </a:r>
+          </a:p>
+          <a:p>
             <a:r>
               <a:rPr lang="en-US" b="0" i="0" u="none" strike="noStrike" dirty="0">
                 <a:solidFill>
@@ -19677,47 +19972,19 @@
                 <a:effectLst/>
                 <a:latin typeface="Open Sans" panose="020B0606030504020204" pitchFamily="34" charset="0"/>
               </a:rPr>
-              <a:t>You will execute the entire project alone. This is a good option if you are confident in your abilities, prefer to work alone, like to have high levels of control over your projects, or have a hard time scheduling with another person. </a:t>
-            </a:r>
-          </a:p>
-          <a:p>
-            <a:pPr marL="0" indent="0">
-              <a:buNone/>
-            </a:pPr>
-            <a:r>
-              <a:rPr lang="en-US" b="1" i="0" u="none" strike="noStrike" dirty="0">
+              <a:t>Adding unit tests to the calculator classes (the classes that perform the calculations) to achieve 100% coverage of the calculation methods.</a:t>
+            </a:r>
+          </a:p>
+          <a:p>
+            <a:r>
+              <a:rPr lang="en-US" b="0" i="0" u="none" strike="noStrike" dirty="0">
                 <a:solidFill>
                   <a:srgbClr val="B1B4B9"/>
                 </a:solidFill>
                 <a:effectLst/>
                 <a:latin typeface="Open Sans" panose="020B0606030504020204" pitchFamily="34" charset="0"/>
               </a:rPr>
-              <a:t>If you work alone, you are responsible for all the work.</a:t>
-            </a:r>
-            <a:r>
-              <a:rPr lang="en-US" b="0" i="0" u="none" strike="noStrike" dirty="0">
-                <a:solidFill>
-                  <a:srgbClr val="B1B4B9"/>
-                </a:solidFill>
-                <a:effectLst/>
-                <a:latin typeface="Open Sans" panose="020B0606030504020204" pitchFamily="34" charset="0"/>
-              </a:rPr>
-              <a:t> </a:t>
-            </a:r>
-          </a:p>
-          <a:p>
-            <a:pPr marL="0" indent="0">
-              <a:buNone/>
-            </a:pPr>
-            <a:r>
-              <a:rPr lang="en-US" b="0" i="1" u="none" strike="noStrike" dirty="0">
-                <a:solidFill>
-                  <a:srgbClr val="B1B4B9"/>
-                </a:solidFill>
-                <a:effectLst/>
-                <a:latin typeface="Open Sans" panose="020B0606030504020204" pitchFamily="34" charset="0"/>
-              </a:rPr>
-              <a:t>This was always my preferred choice when I was a student because it left me in 100% control of my success.</a:t>
+              <a:t>Performing automated end-to-end testing on your web-based UI using Playwright scripts.</a:t>
             </a:r>
           </a:p>
           <a:p>
@@ -19727,10 +19994,10 @@
       </p:sp>
       <p:sp>
         <p:nvSpPr>
-          <p:cNvPr id="4" name="Content Placeholder 3">
+          <p:cNvPr id="5" name="Content Placeholder 4">
             <a:extLst>
               <a:ext uri="{FF2B5EF4-FFF2-40B4-BE49-F238E27FC236}">
-                <a16:creationId xmlns:a16="http://schemas.microsoft.com/office/drawing/2014/main" id="{510B76A3-1F2F-4D5F-69F7-39F1D6152726}"/>
+                <a16:creationId xmlns:a16="http://schemas.microsoft.com/office/drawing/2014/main" id="{105EB6E9-5E19-6AE4-920A-2FBC24FA9727}"/>
               </a:ext>
             </a:extLst>
           </p:cNvPr>
@@ -19743,39 +20010,21 @@
         </p:nvSpPr>
         <p:spPr/>
         <p:txBody>
-          <a:bodyPr anchor="t">
-            <a:normAutofit fontScale="92500" lnSpcReduction="20000"/>
-          </a:bodyPr>
+          <a:bodyPr anchor="t"/>
           <a:lstStyle/>
           <a:p>
-            <a:pPr marL="0" indent="0">
-              <a:buNone/>
-            </a:pPr>
-            <a:r>
-              <a:rPr lang="en-US" sz="2600" b="1" i="0" u="none" strike="noStrike" dirty="0">
+            <a:r>
+              <a:rPr lang="en-US" b="0" i="0" u="none" strike="noStrike" dirty="0">
                 <a:solidFill>
                   <a:srgbClr val="B1B4B9"/>
                 </a:solidFill>
                 <a:effectLst/>
                 <a:latin typeface="Open Sans" panose="020B0606030504020204" pitchFamily="34" charset="0"/>
               </a:rPr>
-              <a:t>Team of 2: Work with a Partner</a:t>
-            </a:r>
-            <a:r>
-              <a:rPr lang="en-US" sz="2600" b="1" i="0" u="none" strike="noStrike" dirty="0">
-                <a:solidFill>
-                  <a:srgbClr val="B1B4B9"/>
-                </a:solidFill>
-                <a:effectLst/>
-                <a:latin typeface="var(--monospace)"/>
-              </a:rPr>
-              <a:t> </a:t>
-            </a:r>
-          </a:p>
-          <a:p>
-            <a:pPr marL="0" indent="0">
-              <a:buNone/>
-            </a:pPr>
+              <a:t>Writing documentation in Markdown describing the runtime environment, how to execute your project from the command line, and how to execute your tests from the command line.</a:t>
+            </a:r>
+          </a:p>
+          <a:p>
             <a:r>
               <a:rPr lang="en-US" b="0" i="0" u="none" strike="noStrike" dirty="0">
                 <a:solidFill>
@@ -19784,53 +20033,22 @@
                 <a:effectLst/>
                 <a:latin typeface="Open Sans" panose="020B0606030504020204" pitchFamily="34" charset="0"/>
               </a:rPr>
-              <a:t>You and a teammate will execute the entire project and share the same grade. This is a good option if you find someone who is a good complement to your abilities or shares a similar schedule as you. </a:t>
-            </a:r>
-          </a:p>
-          <a:p>
-            <a:pPr marL="0" indent="0">
-              <a:buNone/>
-            </a:pPr>
-            <a:r>
-              <a:rPr lang="en-US" b="1" i="0" u="none" strike="noStrike" dirty="0">
+              <a:t>Producing a 5-to-8 minute video demonstrating your completed application, your unit tests and Playwright scripts from the command line.</a:t>
+            </a:r>
+          </a:p>
+          <a:p>
+            <a:r>
+              <a:rPr lang="en-US" b="0" i="0" u="none" strike="noStrike" dirty="0">
                 <a:solidFill>
                   <a:srgbClr val="B1B4B9"/>
                 </a:solidFill>
                 <a:effectLst/>
                 <a:latin typeface="Open Sans" panose="020B0606030504020204" pitchFamily="34" charset="0"/>
               </a:rPr>
-              <a:t>Remember - you will share the same grade, so choose wisely.</a:t>
-            </a:r>
-            <a:r>
-              <a:rPr lang="en-US" b="0" i="0" u="none" strike="noStrike" dirty="0">
-                <a:solidFill>
-                  <a:srgbClr val="B1B4B9"/>
-                </a:solidFill>
-                <a:effectLst/>
-                <a:latin typeface="Open Sans" panose="020B0606030504020204" pitchFamily="34" charset="0"/>
-              </a:rPr>
-              <a:t> </a:t>
-            </a:r>
-          </a:p>
-          <a:p>
-            <a:pPr marL="0" indent="0">
-              <a:buNone/>
-            </a:pPr>
-            <a:r>
-              <a:rPr lang="en-US" b="0" i="1" u="none" strike="noStrike" dirty="0">
-                <a:solidFill>
-                  <a:srgbClr val="B1B4B9"/>
-                </a:solidFill>
-                <a:effectLst/>
-                <a:latin typeface="Open Sans" panose="020B0606030504020204" pitchFamily="34" charset="0"/>
-              </a:rPr>
-              <a:t>Sometimes teammates let you down and you must shoulder the burden to ensure your own personal success is not impacted. The possibility exists that your teammate will drop the course. You must be ready to deliver if your teammate does not deliver.</a:t>
-            </a:r>
-          </a:p>
-          <a:p>
-            <a:pPr marL="0" indent="0">
-              <a:buNone/>
-            </a:pPr>
+              <a:t>Checking all of your source code, tests, and documentation into GitHub.</a:t>
+            </a:r>
+          </a:p>
+          <a:p>
             <a:endParaRPr lang="en-US" dirty="0"/>
           </a:p>
         </p:txBody>
@@ -19838,7 +20056,7 @@
     </p:spTree>
     <p:extLst>
       <p:ext uri="{BB962C8B-B14F-4D97-AF65-F5344CB8AC3E}">
-        <p14:creationId xmlns:p14="http://schemas.microsoft.com/office/powerpoint/2010/main" val="1170814739"/>
+        <p14:creationId xmlns:p14="http://schemas.microsoft.com/office/powerpoint/2010/main" val="249722098"/>
       </p:ext>
     </p:extLst>
   </p:cSld>

</xml_diff>